<commit_message>
Eliminados Includes EF + agregados Tips 4 y 5 en PPT
</commit_message>
<xml_diff>
--- a/DesigningTestableApplications - Part II - DB Integration & Legacy Code.pptx
+++ b/DesigningTestableApplications - Part II - DB Integration & Legacy Code.pptx
@@ -6,10 +6,10 @@
     <p:sldMasterId id="2147483944" r:id="rId3"/>
   </p:sldMasterIdLst>
   <p:notesMasterIdLst>
-    <p:notesMasterId r:id="rId34"/>
+    <p:notesMasterId r:id="rId35"/>
   </p:notesMasterIdLst>
   <p:handoutMasterIdLst>
-    <p:handoutMasterId r:id="rId35"/>
+    <p:handoutMasterId r:id="rId36"/>
   </p:handoutMasterIdLst>
   <p:sldIdLst>
     <p:sldId id="321" r:id="rId4"/>
@@ -29,19 +29,20 @@
     <p:sldId id="395" r:id="rId18"/>
     <p:sldId id="396" r:id="rId19"/>
     <p:sldId id="388" r:id="rId20"/>
-    <p:sldId id="397" r:id="rId21"/>
-    <p:sldId id="398" r:id="rId22"/>
-    <p:sldId id="399" r:id="rId23"/>
-    <p:sldId id="390" r:id="rId24"/>
-    <p:sldId id="389" r:id="rId25"/>
-    <p:sldId id="387" r:id="rId26"/>
-    <p:sldId id="383" r:id="rId27"/>
-    <p:sldId id="384" r:id="rId28"/>
-    <p:sldId id="378" r:id="rId29"/>
-    <p:sldId id="382" r:id="rId30"/>
-    <p:sldId id="386" r:id="rId31"/>
-    <p:sldId id="385" r:id="rId32"/>
-    <p:sldId id="349" r:id="rId33"/>
+    <p:sldId id="406" r:id="rId21"/>
+    <p:sldId id="397" r:id="rId22"/>
+    <p:sldId id="398" r:id="rId23"/>
+    <p:sldId id="399" r:id="rId24"/>
+    <p:sldId id="390" r:id="rId25"/>
+    <p:sldId id="389" r:id="rId26"/>
+    <p:sldId id="387" r:id="rId27"/>
+    <p:sldId id="383" r:id="rId28"/>
+    <p:sldId id="384" r:id="rId29"/>
+    <p:sldId id="378" r:id="rId30"/>
+    <p:sldId id="382" r:id="rId31"/>
+    <p:sldId id="386" r:id="rId32"/>
+    <p:sldId id="385" r:id="rId33"/>
+    <p:sldId id="349" r:id="rId34"/>
   </p:sldIdLst>
   <p:sldSz cx="12192000" cy="6858000"/>
   <p:notesSz cx="6858000" cy="9144000"/>
@@ -254,7 +255,7 @@
           <a:p>
             <a:fld id="{D63D5444-F62C-42C3-A75A-D9DBA807730F}" type="datetimeFigureOut">
               <a:rPr lang="en-US" smtClean="0"/>
-              <a:t>7/21/2015</a:t>
+              <a:t>9/15/2015</a:t>
             </a:fld>
             <a:endParaRPr lang="en-US"/>
           </a:p>
@@ -419,7 +420,7 @@
           <a:p>
             <a:fld id="{12CAA1FA-7B6A-47D2-8D61-F225D71B51FF}" type="datetimeFigureOut">
               <a:rPr lang="en-US" smtClean="0"/>
-              <a:t>7/21/2015</a:t>
+              <a:t>9/15/2015</a:t>
             </a:fld>
             <a:endParaRPr lang="en-US"/>
           </a:p>
@@ -752,7 +753,7 @@
           <a:p>
             <a:fld id="{1B9A179D-2D27-49E2-B022-8EDDA2EFE682}" type="slidenum">
               <a:rPr lang="en-US" smtClean="0"/>
-              <a:t>27</a:t>
+              <a:t>28</a:t>
             </a:fld>
             <a:endParaRPr lang="en-US"/>
           </a:p>
@@ -836,7 +837,7 @@
           <a:p>
             <a:fld id="{1B9A179D-2D27-49E2-B022-8EDDA2EFE682}" type="slidenum">
               <a:rPr lang="en-US" smtClean="0"/>
-              <a:t>28</a:t>
+              <a:t>29</a:t>
             </a:fld>
             <a:endParaRPr lang="en-US"/>
           </a:p>
@@ -920,7 +921,7 @@
           <a:p>
             <a:fld id="{1B9A179D-2D27-49E2-B022-8EDDA2EFE682}" type="slidenum">
               <a:rPr lang="en-US" smtClean="0"/>
-              <a:t>29</a:t>
+              <a:t>30</a:t>
             </a:fld>
             <a:endParaRPr lang="en-US"/>
           </a:p>
@@ -17219,7 +17220,7 @@
         <p:spPr>
           <a:xfrm>
             <a:off x="476534" y="1394213"/>
-            <a:ext cx="8142809" cy="4329621"/>
+            <a:ext cx="11151359" cy="4329621"/>
           </a:xfrm>
           <a:prstGeom prst="rect">
             <a:avLst/>
@@ -17432,12 +17433,481 @@
               <a:t> </a:t>
             </a:r>
             <a:r>
-              <a:rPr lang="en-GB" sz="2000" dirty="0" err="1" smtClean="0">
+              <a:rPr lang="en-GB" sz="2000" dirty="0" smtClean="0">
                 <a:latin typeface="+mn-lt"/>
               </a:rPr>
-              <a:t>Abcdefghi</a:t>
-            </a:r>
-            <a:endParaRPr lang="es-AR" sz="1600" b="1" dirty="0">
+              <a:t>Test Initialization</a:t>
+            </a:r>
+          </a:p>
+          <a:p>
+            <a:pPr marL="641350" lvl="1" indent="-285750">
+              <a:buClrTx/>
+              <a:buFont typeface="Wingdings" panose="05000000000000000000" pitchFamily="2" charset="2"/>
+              <a:buChar char="§"/>
+            </a:pPr>
+            <a:r>
+              <a:rPr lang="es-AR" sz="1800" dirty="0">
+                <a:latin typeface="+mn-lt"/>
+              </a:rPr>
+              <a:t> </a:t>
+            </a:r>
+            <a:r>
+              <a:rPr lang="es-AR" sz="1800" dirty="0" err="1">
+                <a:latin typeface="+mn-lt"/>
+              </a:rPr>
+              <a:t>Initialize</a:t>
+            </a:r>
+            <a:r>
+              <a:rPr lang="es-AR" sz="1800" dirty="0">
+                <a:latin typeface="+mn-lt"/>
+              </a:rPr>
+              <a:t> </a:t>
+            </a:r>
+            <a:r>
+              <a:rPr lang="es-AR" sz="1800" dirty="0" err="1">
+                <a:latin typeface="+mn-lt"/>
+              </a:rPr>
+              <a:t>the</a:t>
+            </a:r>
+            <a:r>
+              <a:rPr lang="es-AR" sz="1800" dirty="0">
+                <a:latin typeface="+mn-lt"/>
+              </a:rPr>
+              <a:t> </a:t>
+            </a:r>
+            <a:r>
+              <a:rPr lang="es-AR" sz="1800" dirty="0" err="1">
+                <a:latin typeface="+mn-lt"/>
+              </a:rPr>
+              <a:t>database</a:t>
+            </a:r>
+            <a:r>
+              <a:rPr lang="es-AR" sz="1800" dirty="0">
+                <a:latin typeface="+mn-lt"/>
+              </a:rPr>
+              <a:t> </a:t>
+            </a:r>
+            <a:r>
+              <a:rPr lang="es-AR" sz="1800" dirty="0" err="1">
+                <a:latin typeface="+mn-lt"/>
+              </a:rPr>
+              <a:t>context</a:t>
+            </a:r>
+            <a:r>
+              <a:rPr lang="es-AR" sz="1800" dirty="0">
+                <a:latin typeface="+mn-lt"/>
+              </a:rPr>
+              <a:t> and/</a:t>
+            </a:r>
+            <a:r>
+              <a:rPr lang="es-AR" sz="1800" dirty="0" err="1">
+                <a:latin typeface="+mn-lt"/>
+              </a:rPr>
+              <a:t>or</a:t>
+            </a:r>
+            <a:r>
+              <a:rPr lang="es-AR" sz="1800" dirty="0">
+                <a:latin typeface="+mn-lt"/>
+              </a:rPr>
+              <a:t> </a:t>
+            </a:r>
+            <a:r>
+              <a:rPr lang="es-AR" sz="1800" dirty="0" err="1">
+                <a:latin typeface="+mn-lt"/>
+              </a:rPr>
+              <a:t>transactions</a:t>
+            </a:r>
+            <a:endParaRPr lang="es-AR" sz="1800" dirty="0">
+              <a:latin typeface="+mn-lt"/>
+            </a:endParaRPr>
+          </a:p>
+          <a:p>
+            <a:pPr marL="641350" lvl="1" indent="-285750">
+              <a:buClrTx/>
+              <a:buFont typeface="Wingdings" panose="05000000000000000000" pitchFamily="2" charset="2"/>
+              <a:buChar char="§"/>
+            </a:pPr>
+            <a:r>
+              <a:rPr lang="es-AR" sz="1800" dirty="0">
+                <a:latin typeface="+mn-lt"/>
+              </a:rPr>
+              <a:t> </a:t>
+            </a:r>
+            <a:r>
+              <a:rPr lang="es-AR" sz="1800" dirty="0" err="1">
+                <a:latin typeface="+mn-lt"/>
+              </a:rPr>
+              <a:t>Add</a:t>
+            </a:r>
+            <a:r>
+              <a:rPr lang="es-AR" sz="1800" dirty="0">
+                <a:latin typeface="+mn-lt"/>
+              </a:rPr>
+              <a:t> test data </a:t>
+            </a:r>
+            <a:r>
+              <a:rPr lang="es-AR" sz="1800" dirty="0" err="1">
+                <a:latin typeface="+mn-lt"/>
+              </a:rPr>
+              <a:t>that</a:t>
+            </a:r>
+            <a:r>
+              <a:rPr lang="es-AR" sz="1800" dirty="0">
+                <a:latin typeface="+mn-lt"/>
+              </a:rPr>
+              <a:t> </a:t>
+            </a:r>
+            <a:r>
+              <a:rPr lang="es-AR" sz="1800" dirty="0" err="1">
+                <a:latin typeface="+mn-lt"/>
+              </a:rPr>
+              <a:t>you</a:t>
+            </a:r>
+            <a:r>
+              <a:rPr lang="es-AR" sz="1800" dirty="0">
+                <a:latin typeface="+mn-lt"/>
+              </a:rPr>
+              <a:t> </a:t>
+            </a:r>
+            <a:r>
+              <a:rPr lang="es-AR" sz="1800" dirty="0" err="1">
+                <a:latin typeface="+mn-lt"/>
+              </a:rPr>
+              <a:t>may</a:t>
+            </a:r>
+            <a:r>
+              <a:rPr lang="es-AR" sz="1800" dirty="0">
+                <a:latin typeface="+mn-lt"/>
+              </a:rPr>
+              <a:t> </a:t>
+            </a:r>
+            <a:r>
+              <a:rPr lang="es-AR" sz="1800" dirty="0" err="1">
+                <a:latin typeface="+mn-lt"/>
+              </a:rPr>
+              <a:t>need</a:t>
+            </a:r>
+            <a:r>
+              <a:rPr lang="es-AR" sz="1800" dirty="0">
+                <a:latin typeface="+mn-lt"/>
+              </a:rPr>
+              <a:t> in </a:t>
+            </a:r>
+            <a:r>
+              <a:rPr lang="es-AR" sz="1800" dirty="0" err="1">
+                <a:latin typeface="+mn-lt"/>
+              </a:rPr>
+              <a:t>tests</a:t>
+            </a:r>
+            <a:endParaRPr lang="es-AR" sz="1800" dirty="0">
+              <a:latin typeface="+mn-lt"/>
+            </a:endParaRPr>
+          </a:p>
+          <a:p>
+            <a:pPr marL="527050" lvl="1" indent="-171450">
+              <a:buClrTx/>
+              <a:buFont typeface="Wingdings" panose="05000000000000000000" pitchFamily="2" charset="2"/>
+              <a:buChar char="§"/>
+            </a:pPr>
+            <a:endParaRPr lang="es-AR" sz="1800" dirty="0" smtClean="0">
+              <a:solidFill>
+                <a:srgbClr val="000000"/>
+              </a:solidFill>
+              <a:latin typeface="Avenir 45 Book"/>
+              <a:cs typeface="+mn-cs"/>
+            </a:endParaRPr>
+          </a:p>
+          <a:p>
+            <a:pPr marL="171450" indent="-171450">
+              <a:buClrTx/>
+            </a:pPr>
+            <a:r>
+              <a:rPr lang="es-AR" sz="2000" dirty="0" smtClean="0">
+                <a:latin typeface="+mn-lt"/>
+              </a:rPr>
+              <a:t>Test </a:t>
+            </a:r>
+            <a:r>
+              <a:rPr lang="es-AR" sz="2000" dirty="0" err="1" smtClean="0">
+                <a:latin typeface="+mn-lt"/>
+              </a:rPr>
+              <a:t>Cleanup</a:t>
+            </a:r>
+            <a:endParaRPr lang="es-AR" sz="2000" dirty="0" smtClean="0">
+              <a:latin typeface="+mn-lt"/>
+            </a:endParaRPr>
+          </a:p>
+          <a:p>
+            <a:pPr marL="641350" lvl="1" indent="-285750">
+              <a:buClrTx/>
+              <a:buFont typeface="Wingdings" panose="05000000000000000000" pitchFamily="2" charset="2"/>
+              <a:buChar char="§"/>
+            </a:pPr>
+            <a:r>
+              <a:rPr lang="es-AR" sz="1800" dirty="0" err="1" smtClean="0">
+                <a:latin typeface="+mn-lt"/>
+              </a:rPr>
+              <a:t>Return</a:t>
+            </a:r>
+            <a:r>
+              <a:rPr lang="es-AR" sz="1800" dirty="0" smtClean="0">
+                <a:latin typeface="+mn-lt"/>
+              </a:rPr>
+              <a:t> </a:t>
+            </a:r>
+            <a:r>
+              <a:rPr lang="es-AR" sz="1800" dirty="0" err="1" smtClean="0">
+                <a:latin typeface="+mn-lt"/>
+              </a:rPr>
+              <a:t>the</a:t>
+            </a:r>
+            <a:r>
+              <a:rPr lang="es-AR" sz="1800" dirty="0" smtClean="0">
+                <a:latin typeface="+mn-lt"/>
+              </a:rPr>
+              <a:t> </a:t>
+            </a:r>
+            <a:r>
+              <a:rPr lang="es-AR" sz="1800" dirty="0" err="1" smtClean="0">
+                <a:latin typeface="+mn-lt"/>
+              </a:rPr>
+              <a:t>database</a:t>
+            </a:r>
+            <a:r>
+              <a:rPr lang="es-AR" sz="1800" dirty="0" smtClean="0">
+                <a:latin typeface="+mn-lt"/>
+              </a:rPr>
+              <a:t> to </a:t>
+            </a:r>
+            <a:r>
+              <a:rPr lang="es-AR" sz="1800" dirty="0" err="1" smtClean="0">
+                <a:latin typeface="+mn-lt"/>
+              </a:rPr>
+              <a:t>its</a:t>
+            </a:r>
+            <a:r>
+              <a:rPr lang="es-AR" sz="1800" dirty="0" smtClean="0">
+                <a:latin typeface="+mn-lt"/>
+              </a:rPr>
+              <a:t> original </a:t>
+            </a:r>
+            <a:r>
+              <a:rPr lang="es-AR" sz="1800" dirty="0" err="1" smtClean="0">
+                <a:latin typeface="+mn-lt"/>
+              </a:rPr>
+              <a:t>state</a:t>
+            </a:r>
+            <a:r>
+              <a:rPr lang="es-AR" sz="1800" dirty="0" smtClean="0">
+                <a:latin typeface="+mn-lt"/>
+              </a:rPr>
+              <a:t> to </a:t>
+            </a:r>
+            <a:r>
+              <a:rPr lang="es-AR" sz="1800" dirty="0" err="1" smtClean="0">
+                <a:latin typeface="+mn-lt"/>
+              </a:rPr>
+              <a:t>allow</a:t>
+            </a:r>
+            <a:r>
+              <a:rPr lang="es-AR" sz="1800" dirty="0" smtClean="0">
+                <a:latin typeface="+mn-lt"/>
+              </a:rPr>
+              <a:t> </a:t>
+            </a:r>
+            <a:r>
+              <a:rPr lang="es-AR" sz="1800" dirty="0" err="1" smtClean="0">
+                <a:latin typeface="+mn-lt"/>
+              </a:rPr>
+              <a:t>tests</a:t>
+            </a:r>
+            <a:r>
+              <a:rPr lang="es-AR" sz="1800" dirty="0" smtClean="0">
+                <a:latin typeface="+mn-lt"/>
+              </a:rPr>
+              <a:t> to be run </a:t>
+            </a:r>
+            <a:r>
+              <a:rPr lang="es-AR" sz="1800" dirty="0" err="1" smtClean="0">
+                <a:latin typeface="+mn-lt"/>
+              </a:rPr>
+              <a:t>multiple</a:t>
+            </a:r>
+            <a:r>
+              <a:rPr lang="es-AR" sz="1800" dirty="0" smtClean="0">
+                <a:latin typeface="+mn-lt"/>
+              </a:rPr>
+              <a:t> times </a:t>
+            </a:r>
+            <a:r>
+              <a:rPr lang="es-AR" sz="1800" dirty="0" err="1" smtClean="0">
+                <a:latin typeface="+mn-lt"/>
+              </a:rPr>
+              <a:t>with</a:t>
+            </a:r>
+            <a:r>
+              <a:rPr lang="es-AR" sz="1800" dirty="0" smtClean="0">
+                <a:latin typeface="+mn-lt"/>
+              </a:rPr>
+              <a:t> </a:t>
+            </a:r>
+            <a:r>
+              <a:rPr lang="es-AR" sz="1800" dirty="0" err="1" smtClean="0">
+                <a:latin typeface="+mn-lt"/>
+              </a:rPr>
+              <a:t>the</a:t>
+            </a:r>
+            <a:r>
+              <a:rPr lang="es-AR" sz="1800" dirty="0" smtClean="0">
+                <a:latin typeface="+mn-lt"/>
+              </a:rPr>
+              <a:t> </a:t>
+            </a:r>
+            <a:r>
+              <a:rPr lang="es-AR" sz="1800" dirty="0" err="1" smtClean="0">
+                <a:latin typeface="+mn-lt"/>
+              </a:rPr>
+              <a:t>expected</a:t>
+            </a:r>
+            <a:r>
+              <a:rPr lang="es-AR" sz="1800" dirty="0" smtClean="0">
+                <a:latin typeface="+mn-lt"/>
+              </a:rPr>
+              <a:t> </a:t>
+            </a:r>
+            <a:r>
+              <a:rPr lang="es-AR" sz="1800" dirty="0" err="1" smtClean="0">
+                <a:latin typeface="+mn-lt"/>
+              </a:rPr>
+              <a:t>result</a:t>
+            </a:r>
+            <a:endParaRPr lang="es-AR" sz="1800" dirty="0" smtClean="0">
+              <a:latin typeface="+mn-lt"/>
+            </a:endParaRPr>
+          </a:p>
+          <a:p>
+            <a:pPr marL="641350" lvl="1" indent="-285750">
+              <a:buClrTx/>
+              <a:buFont typeface="Wingdings" panose="05000000000000000000" pitchFamily="2" charset="2"/>
+              <a:buChar char="§"/>
+            </a:pPr>
+            <a:r>
+              <a:rPr lang="es-AR" sz="1800" dirty="0" err="1" smtClean="0">
+                <a:latin typeface="+mn-lt"/>
+              </a:rPr>
+              <a:t>Delete</a:t>
+            </a:r>
+            <a:r>
+              <a:rPr lang="es-AR" sz="1800" dirty="0" smtClean="0">
+                <a:latin typeface="+mn-lt"/>
+              </a:rPr>
+              <a:t> test data and/</a:t>
+            </a:r>
+            <a:r>
+              <a:rPr lang="es-AR" sz="1800" dirty="0" err="1" smtClean="0">
+                <a:latin typeface="+mn-lt"/>
+              </a:rPr>
+              <a:t>or</a:t>
+            </a:r>
+            <a:r>
+              <a:rPr lang="es-AR" sz="1800" dirty="0" smtClean="0">
+                <a:latin typeface="+mn-lt"/>
+              </a:rPr>
+              <a:t> </a:t>
+            </a:r>
+            <a:r>
+              <a:rPr lang="es-AR" sz="1800" dirty="0" err="1" smtClean="0">
+                <a:latin typeface="+mn-lt"/>
+              </a:rPr>
+              <a:t>rollback</a:t>
+            </a:r>
+            <a:r>
+              <a:rPr lang="es-AR" sz="1800" dirty="0" smtClean="0">
+                <a:latin typeface="+mn-lt"/>
+              </a:rPr>
+              <a:t> </a:t>
+            </a:r>
+            <a:r>
+              <a:rPr lang="es-AR" sz="1800" dirty="0" err="1" smtClean="0">
+                <a:latin typeface="+mn-lt"/>
+              </a:rPr>
+              <a:t>transactions</a:t>
+            </a:r>
+            <a:endParaRPr lang="es-AR" sz="1800" dirty="0" smtClean="0">
+              <a:latin typeface="+mn-lt"/>
+            </a:endParaRPr>
+          </a:p>
+          <a:p>
+            <a:pPr marL="641350" lvl="1" indent="-285750">
+              <a:buClrTx/>
+              <a:buFont typeface="Wingdings" panose="05000000000000000000" pitchFamily="2" charset="2"/>
+              <a:buChar char="§"/>
+            </a:pPr>
+            <a:r>
+              <a:rPr lang="es-AR" sz="1800" dirty="0" err="1" smtClean="0">
+                <a:latin typeface="+mn-lt"/>
+              </a:rPr>
+              <a:t>Make</a:t>
+            </a:r>
+            <a:r>
+              <a:rPr lang="es-AR" sz="1800" dirty="0" smtClean="0">
+                <a:latin typeface="+mn-lt"/>
+              </a:rPr>
+              <a:t> </a:t>
+            </a:r>
+            <a:r>
+              <a:rPr lang="es-AR" sz="1800" dirty="0" err="1" smtClean="0">
+                <a:latin typeface="+mn-lt"/>
+              </a:rPr>
+              <a:t>sure</a:t>
+            </a:r>
+            <a:r>
+              <a:rPr lang="es-AR" sz="1800" dirty="0" smtClean="0">
+                <a:latin typeface="+mn-lt"/>
+              </a:rPr>
+              <a:t> </a:t>
+            </a:r>
+            <a:r>
+              <a:rPr lang="es-AR" sz="1800" dirty="0" err="1" smtClean="0">
+                <a:latin typeface="+mn-lt"/>
+              </a:rPr>
+              <a:t>database</a:t>
+            </a:r>
+            <a:r>
+              <a:rPr lang="es-AR" sz="1800" dirty="0" smtClean="0">
+                <a:latin typeface="+mn-lt"/>
+              </a:rPr>
+              <a:t> </a:t>
+            </a:r>
+            <a:r>
+              <a:rPr lang="es-AR" sz="1800" dirty="0" err="1" smtClean="0">
+                <a:latin typeface="+mn-lt"/>
+              </a:rPr>
+              <a:t>connections</a:t>
+            </a:r>
+            <a:r>
+              <a:rPr lang="es-AR" sz="1800" dirty="0" smtClean="0">
+                <a:latin typeface="+mn-lt"/>
+              </a:rPr>
+              <a:t> are </a:t>
+            </a:r>
+            <a:r>
+              <a:rPr lang="es-AR" sz="1800" dirty="0" err="1" smtClean="0">
+                <a:latin typeface="+mn-lt"/>
+              </a:rPr>
+              <a:t>disposed</a:t>
+            </a:r>
+            <a:endParaRPr lang="es-AR" sz="1800" dirty="0">
+              <a:latin typeface="+mn-lt"/>
+            </a:endParaRPr>
+          </a:p>
+          <a:p>
+            <a:pPr marL="527050" lvl="1" indent="-171450">
+              <a:buClrTx/>
+              <a:buFont typeface="Wingdings" panose="05000000000000000000" pitchFamily="2" charset="2"/>
+              <a:buChar char="§"/>
+            </a:pPr>
+            <a:endParaRPr lang="es-AR" sz="1800" dirty="0">
               <a:solidFill>
                 <a:srgbClr val="000000"/>
               </a:solidFill>
@@ -17633,245 +18103,6 @@
       </p:grpSpPr>
       <p:sp>
         <p:nvSpPr>
-          <p:cNvPr id="13" name="Content Placeholder 2"/>
-          <p:cNvSpPr txBox="1">
-            <a:spLocks/>
-          </p:cNvSpPr>
-          <p:nvPr/>
-        </p:nvSpPr>
-        <p:spPr>
-          <a:xfrm>
-            <a:off x="476534" y="1394213"/>
-            <a:ext cx="8142809" cy="4329621"/>
-          </a:xfrm>
-          <a:prstGeom prst="rect">
-            <a:avLst/>
-          </a:prstGeom>
-        </p:spPr>
-        <p:txBody>
-          <a:bodyPr vert="horz" lIns="91440" tIns="45720" rIns="91440" bIns="45720" rtlCol="0">
-            <a:noAutofit/>
-          </a:bodyPr>
-          <a:lstStyle>
-            <a:lvl1pPr marL="273050" marR="0" indent="-273050" algn="l" defTabSz="914400" rtl="0" eaLnBrk="1" fontAlgn="auto" latinLnBrk="0" hangingPunct="1">
-              <a:lnSpc>
-                <a:spcPct val="100000"/>
-              </a:lnSpc>
-              <a:spcBef>
-                <a:spcPts val="1200"/>
-              </a:spcBef>
-              <a:spcAft>
-                <a:spcPts val="0"/>
-              </a:spcAft>
-              <a:buClr>
-                <a:srgbClr val="DA1218"/>
-              </a:buClr>
-              <a:buSzTx/>
-              <a:buFont typeface="Wingdings" pitchFamily="2" charset="2"/>
-              <a:buChar char="§"/>
-              <a:tabLst/>
-              <a:defRPr lang="en-US" sz="2400" kern="1200">
-                <a:solidFill>
-                  <a:schemeClr val="tx1"/>
-                </a:solidFill>
-                <a:latin typeface="Arial" pitchFamily="34" charset="0"/>
-                <a:ea typeface="+mn-ea"/>
-                <a:cs typeface="Arial" pitchFamily="34" charset="0"/>
-              </a:defRPr>
-            </a:lvl1pPr>
-            <a:lvl2pPr marL="628650" marR="0" indent="-355600" algn="l" defTabSz="914400" rtl="0" eaLnBrk="1" fontAlgn="auto" latinLnBrk="0" hangingPunct="1">
-              <a:lnSpc>
-                <a:spcPct val="100000"/>
-              </a:lnSpc>
-              <a:spcBef>
-                <a:spcPct val="20000"/>
-              </a:spcBef>
-              <a:spcAft>
-                <a:spcPts val="0"/>
-              </a:spcAft>
-              <a:buClr>
-                <a:srgbClr val="DA1218"/>
-              </a:buClr>
-              <a:buSzTx/>
-              <a:buFont typeface="Wingdings" pitchFamily="2" charset="2"/>
-              <a:buChar char=""/>
-              <a:tabLst/>
-              <a:defRPr lang="en-US" sz="2000" kern="1200">
-                <a:solidFill>
-                  <a:schemeClr val="tx1"/>
-                </a:solidFill>
-                <a:latin typeface="Arial" pitchFamily="34" charset="0"/>
-                <a:ea typeface="+mn-ea"/>
-                <a:cs typeface="Arial" pitchFamily="34" charset="0"/>
-              </a:defRPr>
-            </a:lvl2pPr>
-            <a:lvl3pPr marL="903288" marR="0" indent="-274638" algn="l" defTabSz="914400" rtl="0" eaLnBrk="1" fontAlgn="auto" latinLnBrk="0" hangingPunct="1">
-              <a:lnSpc>
-                <a:spcPct val="100000"/>
-              </a:lnSpc>
-              <a:spcBef>
-                <a:spcPct val="20000"/>
-              </a:spcBef>
-              <a:spcAft>
-                <a:spcPts val="0"/>
-              </a:spcAft>
-              <a:buClr>
-                <a:srgbClr val="DA1218"/>
-              </a:buClr>
-              <a:buSzTx/>
-              <a:buFont typeface="Wingdings" pitchFamily="2" charset="2"/>
-              <a:buChar char="ü"/>
-              <a:tabLst/>
-              <a:defRPr lang="en-US" sz="1800" kern="1200">
-                <a:solidFill>
-                  <a:schemeClr val="tx1"/>
-                </a:solidFill>
-                <a:latin typeface="Arial" pitchFamily="34" charset="0"/>
-                <a:ea typeface="+mn-ea"/>
-                <a:cs typeface="Arial" pitchFamily="34" charset="0"/>
-              </a:defRPr>
-            </a:lvl3pPr>
-            <a:lvl4pPr marL="1081088" marR="0" indent="-177800" algn="l" defTabSz="914400" rtl="0" eaLnBrk="1" fontAlgn="auto" latinLnBrk="0" hangingPunct="1">
-              <a:lnSpc>
-                <a:spcPct val="100000"/>
-              </a:lnSpc>
-              <a:spcBef>
-                <a:spcPct val="20000"/>
-              </a:spcBef>
-              <a:spcAft>
-                <a:spcPts val="0"/>
-              </a:spcAft>
-              <a:buClr>
-                <a:srgbClr val="DA1218"/>
-              </a:buClr>
-              <a:buSzTx/>
-              <a:buFont typeface="Arial" pitchFamily="34" charset="0"/>
-              <a:buChar char="•"/>
-              <a:tabLst/>
-              <a:defRPr lang="en-US" sz="1600" kern="1200">
-                <a:solidFill>
-                  <a:schemeClr val="tx1"/>
-                </a:solidFill>
-                <a:latin typeface="Arial" pitchFamily="34" charset="0"/>
-                <a:ea typeface="+mn-ea"/>
-                <a:cs typeface="Arial" pitchFamily="34" charset="0"/>
-              </a:defRPr>
-            </a:lvl4pPr>
-            <a:lvl5pPr marL="1258888" marR="0" indent="-177800" algn="l" defTabSz="914400" rtl="0" eaLnBrk="1" fontAlgn="auto" latinLnBrk="0" hangingPunct="1">
-              <a:lnSpc>
-                <a:spcPct val="100000"/>
-              </a:lnSpc>
-              <a:spcBef>
-                <a:spcPct val="20000"/>
-              </a:spcBef>
-              <a:spcAft>
-                <a:spcPts val="0"/>
-              </a:spcAft>
-              <a:buClr>
-                <a:srgbClr val="DA1218"/>
-              </a:buClr>
-              <a:buSzPct val="100000"/>
-              <a:buFont typeface="Courier New" pitchFamily="49" charset="0"/>
-              <a:buChar char="o"/>
-              <a:tabLst/>
-              <a:defRPr lang="es-AR" sz="1400" kern="1200">
-                <a:solidFill>
-                  <a:schemeClr val="tx1"/>
-                </a:solidFill>
-                <a:latin typeface="Arial" pitchFamily="34" charset="0"/>
-                <a:ea typeface="+mn-ea"/>
-                <a:cs typeface="Arial" pitchFamily="34" charset="0"/>
-              </a:defRPr>
-            </a:lvl5pPr>
-            <a:lvl6pPr marL="2514600" indent="-228600" algn="l" defTabSz="914400" rtl="0" eaLnBrk="1" latinLnBrk="0" hangingPunct="1">
-              <a:spcBef>
-                <a:spcPct val="20000"/>
-              </a:spcBef>
-              <a:buFont typeface="Arial" pitchFamily="34" charset="0"/>
-              <a:buChar char="•"/>
-              <a:defRPr sz="2000" kern="1200">
-                <a:solidFill>
-                  <a:schemeClr val="tx1"/>
-                </a:solidFill>
-                <a:latin typeface="+mn-lt"/>
-                <a:ea typeface="+mn-ea"/>
-                <a:cs typeface="+mn-cs"/>
-              </a:defRPr>
-            </a:lvl6pPr>
-            <a:lvl7pPr marL="2971800" indent="-228600" algn="l" defTabSz="914400" rtl="0" eaLnBrk="1" latinLnBrk="0" hangingPunct="1">
-              <a:spcBef>
-                <a:spcPct val="20000"/>
-              </a:spcBef>
-              <a:buFont typeface="Arial" pitchFamily="34" charset="0"/>
-              <a:buChar char="•"/>
-              <a:defRPr sz="2000" kern="1200">
-                <a:solidFill>
-                  <a:schemeClr val="tx1"/>
-                </a:solidFill>
-                <a:latin typeface="+mn-lt"/>
-                <a:ea typeface="+mn-ea"/>
-                <a:cs typeface="+mn-cs"/>
-              </a:defRPr>
-            </a:lvl7pPr>
-            <a:lvl8pPr marL="3429000" indent="-228600" algn="l" defTabSz="914400" rtl="0" eaLnBrk="1" latinLnBrk="0" hangingPunct="1">
-              <a:spcBef>
-                <a:spcPct val="20000"/>
-              </a:spcBef>
-              <a:buFont typeface="Arial" pitchFamily="34" charset="0"/>
-              <a:buChar char="•"/>
-              <a:defRPr sz="2000" kern="1200">
-                <a:solidFill>
-                  <a:schemeClr val="tx1"/>
-                </a:solidFill>
-                <a:latin typeface="+mn-lt"/>
-                <a:ea typeface="+mn-ea"/>
-                <a:cs typeface="+mn-cs"/>
-              </a:defRPr>
-            </a:lvl8pPr>
-            <a:lvl9pPr marL="3886200" indent="-228600" algn="l" defTabSz="914400" rtl="0" eaLnBrk="1" latinLnBrk="0" hangingPunct="1">
-              <a:spcBef>
-                <a:spcPct val="20000"/>
-              </a:spcBef>
-              <a:buFont typeface="Arial" pitchFamily="34" charset="0"/>
-              <a:buChar char="•"/>
-              <a:defRPr sz="2000" kern="1200">
-                <a:solidFill>
-                  <a:schemeClr val="tx1"/>
-                </a:solidFill>
-                <a:latin typeface="+mn-lt"/>
-                <a:ea typeface="+mn-ea"/>
-                <a:cs typeface="+mn-cs"/>
-              </a:defRPr>
-            </a:lvl9pPr>
-          </a:lstStyle>
-          <a:p>
-            <a:pPr marL="0" indent="0">
-              <a:buClrTx/>
-            </a:pPr>
-            <a:r>
-              <a:rPr lang="en-GB" sz="2000" b="1" dirty="0" smtClean="0">
-                <a:latin typeface="+mn-lt"/>
-              </a:rPr>
-              <a:t> </a:t>
-            </a:r>
-            <a:r>
-              <a:rPr lang="en-GB" sz="2000" dirty="0" err="1" smtClean="0">
-                <a:latin typeface="+mn-lt"/>
-              </a:rPr>
-              <a:t>Abcdefghi</a:t>
-            </a:r>
-            <a:endParaRPr lang="es-AR" sz="1600" b="1" dirty="0">
-              <a:solidFill>
-                <a:srgbClr val="000000"/>
-              </a:solidFill>
-              <a:latin typeface="Avenir 45 Book"/>
-              <a:cs typeface="+mn-cs"/>
-            </a:endParaRPr>
-          </a:p>
-        </p:txBody>
-      </p:sp>
-      <p:sp>
-        <p:nvSpPr>
           <p:cNvPr id="15" name="Rectangle 14"/>
           <p:cNvSpPr/>
           <p:nvPr/>
@@ -18010,6 +18241,484 @@
               <a:solidFill>
                 <a:schemeClr val="bg1"/>
               </a:solidFill>
+            </a:endParaRPr>
+          </a:p>
+        </p:txBody>
+      </p:sp>
+      <p:sp>
+        <p:nvSpPr>
+          <p:cNvPr id="5" name="Content Placeholder 2"/>
+          <p:cNvSpPr txBox="1">
+            <a:spLocks/>
+          </p:cNvSpPr>
+          <p:nvPr/>
+        </p:nvSpPr>
+        <p:spPr>
+          <a:xfrm>
+            <a:off x="476534" y="1039366"/>
+            <a:ext cx="11052856" cy="4329621"/>
+          </a:xfrm>
+          <a:prstGeom prst="rect">
+            <a:avLst/>
+          </a:prstGeom>
+        </p:spPr>
+        <p:txBody>
+          <a:bodyPr vert="horz" lIns="91440" tIns="45720" rIns="91440" bIns="45720" rtlCol="0">
+            <a:noAutofit/>
+          </a:bodyPr>
+          <a:lstStyle>
+            <a:lvl1pPr marL="273050" marR="0" indent="-273050" algn="l" defTabSz="914400" rtl="0" eaLnBrk="1" fontAlgn="auto" latinLnBrk="0" hangingPunct="1">
+              <a:lnSpc>
+                <a:spcPct val="100000"/>
+              </a:lnSpc>
+              <a:spcBef>
+                <a:spcPts val="1200"/>
+              </a:spcBef>
+              <a:spcAft>
+                <a:spcPts val="0"/>
+              </a:spcAft>
+              <a:buClr>
+                <a:srgbClr val="DA1218"/>
+              </a:buClr>
+              <a:buSzTx/>
+              <a:buFont typeface="Wingdings" pitchFamily="2" charset="2"/>
+              <a:buChar char="§"/>
+              <a:tabLst/>
+              <a:defRPr lang="en-US" sz="2400" kern="1200">
+                <a:solidFill>
+                  <a:schemeClr val="tx1"/>
+                </a:solidFill>
+                <a:latin typeface="Arial" pitchFamily="34" charset="0"/>
+                <a:ea typeface="+mn-ea"/>
+                <a:cs typeface="Arial" pitchFamily="34" charset="0"/>
+              </a:defRPr>
+            </a:lvl1pPr>
+            <a:lvl2pPr marL="628650" marR="0" indent="-355600" algn="l" defTabSz="914400" rtl="0" eaLnBrk="1" fontAlgn="auto" latinLnBrk="0" hangingPunct="1">
+              <a:lnSpc>
+                <a:spcPct val="100000"/>
+              </a:lnSpc>
+              <a:spcBef>
+                <a:spcPct val="20000"/>
+              </a:spcBef>
+              <a:spcAft>
+                <a:spcPts val="0"/>
+              </a:spcAft>
+              <a:buClr>
+                <a:srgbClr val="DA1218"/>
+              </a:buClr>
+              <a:buSzTx/>
+              <a:buFont typeface="Wingdings" pitchFamily="2" charset="2"/>
+              <a:buChar char=""/>
+              <a:tabLst/>
+              <a:defRPr lang="en-US" sz="2000" kern="1200">
+                <a:solidFill>
+                  <a:schemeClr val="tx1"/>
+                </a:solidFill>
+                <a:latin typeface="Arial" pitchFamily="34" charset="0"/>
+                <a:ea typeface="+mn-ea"/>
+                <a:cs typeface="Arial" pitchFamily="34" charset="0"/>
+              </a:defRPr>
+            </a:lvl2pPr>
+            <a:lvl3pPr marL="903288" marR="0" indent="-274638" algn="l" defTabSz="914400" rtl="0" eaLnBrk="1" fontAlgn="auto" latinLnBrk="0" hangingPunct="1">
+              <a:lnSpc>
+                <a:spcPct val="100000"/>
+              </a:lnSpc>
+              <a:spcBef>
+                <a:spcPct val="20000"/>
+              </a:spcBef>
+              <a:spcAft>
+                <a:spcPts val="0"/>
+              </a:spcAft>
+              <a:buClr>
+                <a:srgbClr val="DA1218"/>
+              </a:buClr>
+              <a:buSzTx/>
+              <a:buFont typeface="Wingdings" pitchFamily="2" charset="2"/>
+              <a:buChar char="ü"/>
+              <a:tabLst/>
+              <a:defRPr lang="en-US" sz="1800" kern="1200">
+                <a:solidFill>
+                  <a:schemeClr val="tx1"/>
+                </a:solidFill>
+                <a:latin typeface="Arial" pitchFamily="34" charset="0"/>
+                <a:ea typeface="+mn-ea"/>
+                <a:cs typeface="Arial" pitchFamily="34" charset="0"/>
+              </a:defRPr>
+            </a:lvl3pPr>
+            <a:lvl4pPr marL="1081088" marR="0" indent="-177800" algn="l" defTabSz="914400" rtl="0" eaLnBrk="1" fontAlgn="auto" latinLnBrk="0" hangingPunct="1">
+              <a:lnSpc>
+                <a:spcPct val="100000"/>
+              </a:lnSpc>
+              <a:spcBef>
+                <a:spcPct val="20000"/>
+              </a:spcBef>
+              <a:spcAft>
+                <a:spcPts val="0"/>
+              </a:spcAft>
+              <a:buClr>
+                <a:srgbClr val="DA1218"/>
+              </a:buClr>
+              <a:buSzTx/>
+              <a:buFont typeface="Arial" pitchFamily="34" charset="0"/>
+              <a:buChar char="•"/>
+              <a:tabLst/>
+              <a:defRPr lang="en-US" sz="1600" kern="1200">
+                <a:solidFill>
+                  <a:schemeClr val="tx1"/>
+                </a:solidFill>
+                <a:latin typeface="Arial" pitchFamily="34" charset="0"/>
+                <a:ea typeface="+mn-ea"/>
+                <a:cs typeface="Arial" pitchFamily="34" charset="0"/>
+              </a:defRPr>
+            </a:lvl4pPr>
+            <a:lvl5pPr marL="1258888" marR="0" indent="-177800" algn="l" defTabSz="914400" rtl="0" eaLnBrk="1" fontAlgn="auto" latinLnBrk="0" hangingPunct="1">
+              <a:lnSpc>
+                <a:spcPct val="100000"/>
+              </a:lnSpc>
+              <a:spcBef>
+                <a:spcPct val="20000"/>
+              </a:spcBef>
+              <a:spcAft>
+                <a:spcPts val="0"/>
+              </a:spcAft>
+              <a:buClr>
+                <a:srgbClr val="DA1218"/>
+              </a:buClr>
+              <a:buSzPct val="100000"/>
+              <a:buFont typeface="Courier New" pitchFamily="49" charset="0"/>
+              <a:buChar char="o"/>
+              <a:tabLst/>
+              <a:defRPr lang="es-AR" sz="1400" kern="1200">
+                <a:solidFill>
+                  <a:schemeClr val="tx1"/>
+                </a:solidFill>
+                <a:latin typeface="Arial" pitchFamily="34" charset="0"/>
+                <a:ea typeface="+mn-ea"/>
+                <a:cs typeface="Arial" pitchFamily="34" charset="0"/>
+              </a:defRPr>
+            </a:lvl5pPr>
+            <a:lvl6pPr marL="2514600" indent="-228600" algn="l" defTabSz="914400" rtl="0" eaLnBrk="1" latinLnBrk="0" hangingPunct="1">
+              <a:spcBef>
+                <a:spcPct val="20000"/>
+              </a:spcBef>
+              <a:buFont typeface="Arial" pitchFamily="34" charset="0"/>
+              <a:buChar char="•"/>
+              <a:defRPr sz="2000" kern="1200">
+                <a:solidFill>
+                  <a:schemeClr val="tx1"/>
+                </a:solidFill>
+                <a:latin typeface="+mn-lt"/>
+                <a:ea typeface="+mn-ea"/>
+                <a:cs typeface="+mn-cs"/>
+              </a:defRPr>
+            </a:lvl6pPr>
+            <a:lvl7pPr marL="2971800" indent="-228600" algn="l" defTabSz="914400" rtl="0" eaLnBrk="1" latinLnBrk="0" hangingPunct="1">
+              <a:spcBef>
+                <a:spcPct val="20000"/>
+              </a:spcBef>
+              <a:buFont typeface="Arial" pitchFamily="34" charset="0"/>
+              <a:buChar char="•"/>
+              <a:defRPr sz="2000" kern="1200">
+                <a:solidFill>
+                  <a:schemeClr val="tx1"/>
+                </a:solidFill>
+                <a:latin typeface="+mn-lt"/>
+                <a:ea typeface="+mn-ea"/>
+                <a:cs typeface="+mn-cs"/>
+              </a:defRPr>
+            </a:lvl7pPr>
+            <a:lvl8pPr marL="3429000" indent="-228600" algn="l" defTabSz="914400" rtl="0" eaLnBrk="1" latinLnBrk="0" hangingPunct="1">
+              <a:spcBef>
+                <a:spcPct val="20000"/>
+              </a:spcBef>
+              <a:buFont typeface="Arial" pitchFamily="34" charset="0"/>
+              <a:buChar char="•"/>
+              <a:defRPr sz="2000" kern="1200">
+                <a:solidFill>
+                  <a:schemeClr val="tx1"/>
+                </a:solidFill>
+                <a:latin typeface="+mn-lt"/>
+                <a:ea typeface="+mn-ea"/>
+                <a:cs typeface="+mn-cs"/>
+              </a:defRPr>
+            </a:lvl8pPr>
+            <a:lvl9pPr marL="3886200" indent="-228600" algn="l" defTabSz="914400" rtl="0" eaLnBrk="1" latinLnBrk="0" hangingPunct="1">
+              <a:spcBef>
+                <a:spcPct val="20000"/>
+              </a:spcBef>
+              <a:buFont typeface="Arial" pitchFamily="34" charset="0"/>
+              <a:buChar char="•"/>
+              <a:defRPr sz="2000" kern="1200">
+                <a:solidFill>
+                  <a:schemeClr val="tx1"/>
+                </a:solidFill>
+                <a:latin typeface="+mn-lt"/>
+                <a:ea typeface="+mn-ea"/>
+                <a:cs typeface="+mn-cs"/>
+              </a:defRPr>
+            </a:lvl9pPr>
+          </a:lstStyle>
+          <a:p>
+            <a:pPr>
+              <a:buClrTx/>
+            </a:pPr>
+            <a:r>
+              <a:rPr lang="en-GB" sz="2000" dirty="0">
+                <a:latin typeface="Avenir 45 Book (Body)"/>
+              </a:rPr>
+              <a:t>How to write </a:t>
+            </a:r>
+            <a:r>
+              <a:rPr lang="en-GB" sz="2000" dirty="0" smtClean="0">
+                <a:latin typeface="Avenir 45 Book (Body)"/>
+              </a:rPr>
+              <a:t>integration tests</a:t>
+            </a:r>
+            <a:r>
+              <a:rPr lang="en-GB" sz="2000" dirty="0">
+                <a:latin typeface="Avenir 45 Book (Body)"/>
+              </a:rPr>
+              <a:t>:</a:t>
+            </a:r>
+          </a:p>
+          <a:p>
+            <a:pPr marL="547688" lvl="1" indent="-285750">
+              <a:spcBef>
+                <a:spcPts val="1200"/>
+              </a:spcBef>
+              <a:buClrTx/>
+              <a:buFont typeface="Wingdings" panose="05000000000000000000" pitchFamily="2" charset="2"/>
+              <a:buChar char="§"/>
+            </a:pPr>
+            <a:r>
+              <a:rPr lang="en-US" sz="1800" dirty="0">
+                <a:latin typeface="Avenir 45 Book (Body)"/>
+              </a:rPr>
+              <a:t>Setup preconditions</a:t>
+            </a:r>
+          </a:p>
+          <a:p>
+            <a:pPr marL="547688" lvl="1" indent="-285750">
+              <a:spcBef>
+                <a:spcPts val="1200"/>
+              </a:spcBef>
+              <a:buClrTx/>
+              <a:buFont typeface="Wingdings" panose="05000000000000000000" pitchFamily="2" charset="2"/>
+              <a:buChar char="§"/>
+            </a:pPr>
+            <a:r>
+              <a:rPr lang="en-US" sz="1800" dirty="0">
+                <a:latin typeface="Avenir 45 Book (Body)"/>
+              </a:rPr>
+              <a:t>Execute the code to be tested</a:t>
+            </a:r>
+          </a:p>
+          <a:p>
+            <a:pPr marL="547688" lvl="1" indent="-285750">
+              <a:spcBef>
+                <a:spcPts val="1200"/>
+              </a:spcBef>
+              <a:buClrTx/>
+              <a:buFont typeface="Wingdings" panose="05000000000000000000" pitchFamily="2" charset="2"/>
+              <a:buChar char="§"/>
+            </a:pPr>
+            <a:r>
+              <a:rPr lang="en-US" sz="1800" dirty="0">
+                <a:latin typeface="Avenir 45 Book (Body)"/>
+              </a:rPr>
+              <a:t>Assert on the expected </a:t>
+            </a:r>
+            <a:r>
+              <a:rPr lang="en-US" sz="1800" dirty="0" smtClean="0">
+                <a:latin typeface="Avenir 45 Book (Body)"/>
+              </a:rPr>
+              <a:t>results</a:t>
+            </a:r>
+          </a:p>
+          <a:p>
+            <a:pPr marL="547688" lvl="1" indent="-285750">
+              <a:spcBef>
+                <a:spcPts val="1200"/>
+              </a:spcBef>
+              <a:buClrTx/>
+              <a:buFont typeface="Wingdings" panose="05000000000000000000" pitchFamily="2" charset="2"/>
+              <a:buChar char="§"/>
+            </a:pPr>
+            <a:endParaRPr lang="en-US" sz="1800" dirty="0">
+              <a:latin typeface="Avenir 45 Book (Body)"/>
+            </a:endParaRPr>
+          </a:p>
+          <a:p>
+            <a:pPr marL="0" indent="0">
+              <a:buClrTx/>
+            </a:pPr>
+            <a:r>
+              <a:rPr lang="en-US" sz="2000" dirty="0">
+                <a:latin typeface="Avenir 45 Book (Body)"/>
+              </a:rPr>
+              <a:t> A good </a:t>
+            </a:r>
+            <a:r>
+              <a:rPr lang="en-US" sz="2000" dirty="0" smtClean="0">
+                <a:latin typeface="Avenir 45 Book (Body)"/>
+              </a:rPr>
+              <a:t>integration test</a:t>
+            </a:r>
+            <a:r>
+              <a:rPr lang="en-US" sz="2000" dirty="0">
+                <a:latin typeface="Avenir 45 Book (Body)"/>
+              </a:rPr>
+              <a:t>:</a:t>
+            </a:r>
+          </a:p>
+          <a:p>
+            <a:pPr marL="547688" lvl="1" indent="-285750">
+              <a:spcBef>
+                <a:spcPts val="1200"/>
+              </a:spcBef>
+              <a:buClrTx/>
+              <a:buFont typeface="Wingdings" panose="05000000000000000000" pitchFamily="2" charset="2"/>
+              <a:buChar char="§"/>
+            </a:pPr>
+            <a:r>
+              <a:rPr lang="en-US" sz="1800" dirty="0">
+                <a:latin typeface="Avenir 45 Book (Body)"/>
+              </a:rPr>
+              <a:t>Documents your design</a:t>
+            </a:r>
+          </a:p>
+          <a:p>
+            <a:pPr marL="547688" lvl="1" indent="-285750">
+              <a:spcBef>
+                <a:spcPts val="1200"/>
+              </a:spcBef>
+              <a:buClrTx/>
+              <a:buFont typeface="Wingdings" panose="05000000000000000000" pitchFamily="2" charset="2"/>
+              <a:buChar char="§"/>
+            </a:pPr>
+            <a:r>
+              <a:rPr lang="en-US" sz="1800" dirty="0" smtClean="0">
+                <a:latin typeface="Avenir 45 Book (Body)"/>
+              </a:rPr>
+              <a:t>Can </a:t>
+            </a:r>
+            <a:r>
+              <a:rPr lang="en-US" sz="1800" dirty="0">
+                <a:latin typeface="Avenir 45 Book (Body)"/>
+              </a:rPr>
+              <a:t>be run in any order if part of many other tests</a:t>
+            </a:r>
+          </a:p>
+          <a:p>
+            <a:pPr marL="547688" lvl="1" indent="-285750">
+              <a:spcBef>
+                <a:spcPts val="1200"/>
+              </a:spcBef>
+              <a:buClrTx/>
+              <a:buFont typeface="Wingdings" panose="05000000000000000000" pitchFamily="2" charset="2"/>
+              <a:buChar char="§"/>
+            </a:pPr>
+            <a:r>
+              <a:rPr lang="en-US" sz="1800" dirty="0">
+                <a:latin typeface="Avenir 45 Book (Body)"/>
+              </a:rPr>
+              <a:t>Consistently returns the same result</a:t>
+            </a:r>
+          </a:p>
+          <a:p>
+            <a:pPr marL="547688" lvl="1" indent="-285750">
+              <a:spcBef>
+                <a:spcPts val="1200"/>
+              </a:spcBef>
+              <a:buClrTx/>
+              <a:buFont typeface="Wingdings" panose="05000000000000000000" pitchFamily="2" charset="2"/>
+              <a:buChar char="§"/>
+            </a:pPr>
+            <a:r>
+              <a:rPr lang="en-US" sz="1800" dirty="0">
+                <a:latin typeface="Avenir 45 Book (Body)"/>
+              </a:rPr>
+              <a:t>Tests a single logical concept in the system</a:t>
+            </a:r>
+          </a:p>
+          <a:p>
+            <a:pPr marL="547688" lvl="1" indent="-285750">
+              <a:spcBef>
+                <a:spcPts val="1200"/>
+              </a:spcBef>
+              <a:buClrTx/>
+              <a:buFont typeface="Wingdings" panose="05000000000000000000" pitchFamily="2" charset="2"/>
+              <a:buChar char="§"/>
+            </a:pPr>
+            <a:r>
+              <a:rPr lang="en-US" sz="1800" dirty="0">
+                <a:latin typeface="Avenir 45 Book (Body)"/>
+              </a:rPr>
+              <a:t>Is named clearly and consistently</a:t>
+            </a:r>
+          </a:p>
+          <a:p>
+            <a:pPr marL="547688" lvl="1" indent="-285750">
+              <a:spcBef>
+                <a:spcPts val="1200"/>
+              </a:spcBef>
+              <a:buClrTx/>
+              <a:buFont typeface="Wingdings" panose="05000000000000000000" pitchFamily="2" charset="2"/>
+              <a:buChar char="§"/>
+            </a:pPr>
+            <a:r>
+              <a:rPr lang="en-US" sz="1800" dirty="0">
+                <a:latin typeface="Avenir 45 Book (Body)"/>
+              </a:rPr>
+              <a:t>Is readable</a:t>
+            </a:r>
+          </a:p>
+          <a:p>
+            <a:pPr marL="547688" lvl="1" indent="-285750">
+              <a:spcBef>
+                <a:spcPts val="1200"/>
+              </a:spcBef>
+              <a:buClrTx/>
+              <a:buFont typeface="Wingdings" panose="05000000000000000000" pitchFamily="2" charset="2"/>
+              <a:buChar char="§"/>
+            </a:pPr>
+            <a:r>
+              <a:rPr lang="en-US" sz="1800" dirty="0">
+                <a:latin typeface="Avenir 45 Book (Body)"/>
+              </a:rPr>
+              <a:t>Is maintainable</a:t>
+            </a:r>
+            <a:endParaRPr lang="en-GB" sz="1800" i="1" dirty="0">
+              <a:latin typeface="Avenir 45 Book (Body)"/>
+            </a:endParaRPr>
+          </a:p>
+          <a:p>
+            <a:pPr lvl="0" defTabSz="914363">
+              <a:lnSpc>
+                <a:spcPct val="90000"/>
+              </a:lnSpc>
+              <a:spcBef>
+                <a:spcPts val="0"/>
+              </a:spcBef>
+              <a:spcAft>
+                <a:spcPts val="400"/>
+              </a:spcAft>
+              <a:buClr>
+                <a:schemeClr val="tx1">
+                  <a:lumMod val="75000"/>
+                  <a:lumOff val="25000"/>
+                </a:schemeClr>
+              </a:buClr>
+              <a:buSzPct val="100000"/>
+              <a:buFont typeface="Wingdings" panose="05000000000000000000" pitchFamily="2" charset="2"/>
+              <a:buChar char="ä"/>
+            </a:pPr>
+            <a:endParaRPr lang="es-AR" sz="1400" b="1" dirty="0">
+              <a:solidFill>
+                <a:srgbClr val="000000"/>
+              </a:solidFill>
+              <a:latin typeface="Avenir 45 Book (Body)"/>
+              <a:cs typeface="+mn-cs"/>
             </a:endParaRPr>
           </a:p>
         </p:txBody>
@@ -18942,20 +19651,25 @@
           <a:lstStyle/>
           <a:p>
             <a:r>
-              <a:rPr lang="en-US" sz="3600" dirty="0">
+              <a:rPr lang="en-US" sz="3600" dirty="0" smtClean="0">
                 <a:solidFill>
                   <a:schemeClr val="bg1"/>
                 </a:solidFill>
               </a:rPr>
-              <a:t>Tip 1: Decouple method code</a:t>
-            </a:r>
+              <a:t>Working with Legacy Code</a:t>
+            </a:r>
+            <a:endParaRPr lang="en-US" sz="3600" dirty="0">
+              <a:solidFill>
+                <a:schemeClr val="bg1"/>
+              </a:solidFill>
+            </a:endParaRPr>
           </a:p>
         </p:txBody>
       </p:sp>
     </p:spTree>
     <p:extLst>
       <p:ext uri="{BB962C8B-B14F-4D97-AF65-F5344CB8AC3E}">
-        <p14:creationId xmlns:p14="http://schemas.microsoft.com/office/powerpoint/2010/main" val="1368165989"/>
+        <p14:creationId xmlns:p14="http://schemas.microsoft.com/office/powerpoint/2010/main" val="2184142410"/>
       </p:ext>
     </p:extLst>
   </p:cSld>
@@ -19349,7 +20063,7 @@
                   <a:schemeClr val="bg1"/>
                 </a:solidFill>
               </a:rPr>
-              <a:t>Tip 2: Test method</a:t>
+              <a:t>Tip 1: Decouple method code</a:t>
             </a:r>
           </a:p>
         </p:txBody>
@@ -19357,7 +20071,7 @@
     </p:spTree>
     <p:extLst>
       <p:ext uri="{BB962C8B-B14F-4D97-AF65-F5344CB8AC3E}">
-        <p14:creationId xmlns:p14="http://schemas.microsoft.com/office/powerpoint/2010/main" val="234987853"/>
+        <p14:creationId xmlns:p14="http://schemas.microsoft.com/office/powerpoint/2010/main" val="1368165989"/>
       </p:ext>
     </p:extLst>
   </p:cSld>
@@ -21219,6 +21933,408 @@
                   <a:schemeClr val="bg1"/>
                 </a:solidFill>
               </a:rPr>
+              <a:t>Tip 2: Test method</a:t>
+            </a:r>
+          </a:p>
+        </p:txBody>
+      </p:sp>
+    </p:spTree>
+    <p:extLst>
+      <p:ext uri="{BB962C8B-B14F-4D97-AF65-F5344CB8AC3E}">
+        <p14:creationId xmlns:p14="http://schemas.microsoft.com/office/powerpoint/2010/main" val="234987853"/>
+      </p:ext>
+    </p:extLst>
+  </p:cSld>
+  <p:clrMapOvr>
+    <a:masterClrMapping/>
+  </p:clrMapOvr>
+  <p:transition spd="slow">
+    <p:wipe/>
+  </p:transition>
+  <p:timing>
+    <p:tnLst>
+      <p:par>
+        <p:cTn id="1" dur="indefinite" restart="never" nodeType="tmRoot"/>
+      </p:par>
+    </p:tnLst>
+  </p:timing>
+</p:sld>
+</file>
+
+<file path=ppt/slides/slide21.xml><?xml version="1.0" encoding="utf-8"?>
+<p:sld xmlns:a="http://schemas.openxmlformats.org/drawingml/2006/main" xmlns:r="http://schemas.openxmlformats.org/officeDocument/2006/relationships" xmlns:p="http://schemas.openxmlformats.org/presentationml/2006/main">
+  <p:cSld>
+    <p:spTree>
+      <p:nvGrpSpPr>
+        <p:cNvPr id="1" name=""/>
+        <p:cNvGrpSpPr/>
+        <p:nvPr/>
+      </p:nvGrpSpPr>
+      <p:grpSpPr>
+        <a:xfrm>
+          <a:off x="0" y="0"/>
+          <a:ext cx="0" cy="0"/>
+          <a:chOff x="0" y="0"/>
+          <a:chExt cx="0" cy="0"/>
+        </a:xfrm>
+      </p:grpSpPr>
+      <p:sp>
+        <p:nvSpPr>
+          <p:cNvPr id="13" name="Content Placeholder 2"/>
+          <p:cNvSpPr txBox="1">
+            <a:spLocks/>
+          </p:cNvSpPr>
+          <p:nvPr/>
+        </p:nvSpPr>
+        <p:spPr>
+          <a:xfrm>
+            <a:off x="476534" y="1394213"/>
+            <a:ext cx="8142809" cy="4329621"/>
+          </a:xfrm>
+          <a:prstGeom prst="rect">
+            <a:avLst/>
+          </a:prstGeom>
+        </p:spPr>
+        <p:txBody>
+          <a:bodyPr vert="horz" lIns="91440" tIns="45720" rIns="91440" bIns="45720" rtlCol="0">
+            <a:noAutofit/>
+          </a:bodyPr>
+          <a:lstStyle>
+            <a:lvl1pPr marL="273050" marR="0" indent="-273050" algn="l" defTabSz="914400" rtl="0" eaLnBrk="1" fontAlgn="auto" latinLnBrk="0" hangingPunct="1">
+              <a:lnSpc>
+                <a:spcPct val="100000"/>
+              </a:lnSpc>
+              <a:spcBef>
+                <a:spcPts val="1200"/>
+              </a:spcBef>
+              <a:spcAft>
+                <a:spcPts val="0"/>
+              </a:spcAft>
+              <a:buClr>
+                <a:srgbClr val="DA1218"/>
+              </a:buClr>
+              <a:buSzTx/>
+              <a:buFont typeface="Wingdings" pitchFamily="2" charset="2"/>
+              <a:buChar char="§"/>
+              <a:tabLst/>
+              <a:defRPr lang="en-US" sz="2400" kern="1200">
+                <a:solidFill>
+                  <a:schemeClr val="tx1"/>
+                </a:solidFill>
+                <a:latin typeface="Arial" pitchFamily="34" charset="0"/>
+                <a:ea typeface="+mn-ea"/>
+                <a:cs typeface="Arial" pitchFamily="34" charset="0"/>
+              </a:defRPr>
+            </a:lvl1pPr>
+            <a:lvl2pPr marL="628650" marR="0" indent="-355600" algn="l" defTabSz="914400" rtl="0" eaLnBrk="1" fontAlgn="auto" latinLnBrk="0" hangingPunct="1">
+              <a:lnSpc>
+                <a:spcPct val="100000"/>
+              </a:lnSpc>
+              <a:spcBef>
+                <a:spcPct val="20000"/>
+              </a:spcBef>
+              <a:spcAft>
+                <a:spcPts val="0"/>
+              </a:spcAft>
+              <a:buClr>
+                <a:srgbClr val="DA1218"/>
+              </a:buClr>
+              <a:buSzTx/>
+              <a:buFont typeface="Wingdings" pitchFamily="2" charset="2"/>
+              <a:buChar char=""/>
+              <a:tabLst/>
+              <a:defRPr lang="en-US" sz="2000" kern="1200">
+                <a:solidFill>
+                  <a:schemeClr val="tx1"/>
+                </a:solidFill>
+                <a:latin typeface="Arial" pitchFamily="34" charset="0"/>
+                <a:ea typeface="+mn-ea"/>
+                <a:cs typeface="Arial" pitchFamily="34" charset="0"/>
+              </a:defRPr>
+            </a:lvl2pPr>
+            <a:lvl3pPr marL="903288" marR="0" indent="-274638" algn="l" defTabSz="914400" rtl="0" eaLnBrk="1" fontAlgn="auto" latinLnBrk="0" hangingPunct="1">
+              <a:lnSpc>
+                <a:spcPct val="100000"/>
+              </a:lnSpc>
+              <a:spcBef>
+                <a:spcPct val="20000"/>
+              </a:spcBef>
+              <a:spcAft>
+                <a:spcPts val="0"/>
+              </a:spcAft>
+              <a:buClr>
+                <a:srgbClr val="DA1218"/>
+              </a:buClr>
+              <a:buSzTx/>
+              <a:buFont typeface="Wingdings" pitchFamily="2" charset="2"/>
+              <a:buChar char="ü"/>
+              <a:tabLst/>
+              <a:defRPr lang="en-US" sz="1800" kern="1200">
+                <a:solidFill>
+                  <a:schemeClr val="tx1"/>
+                </a:solidFill>
+                <a:latin typeface="Arial" pitchFamily="34" charset="0"/>
+                <a:ea typeface="+mn-ea"/>
+                <a:cs typeface="Arial" pitchFamily="34" charset="0"/>
+              </a:defRPr>
+            </a:lvl3pPr>
+            <a:lvl4pPr marL="1081088" marR="0" indent="-177800" algn="l" defTabSz="914400" rtl="0" eaLnBrk="1" fontAlgn="auto" latinLnBrk="0" hangingPunct="1">
+              <a:lnSpc>
+                <a:spcPct val="100000"/>
+              </a:lnSpc>
+              <a:spcBef>
+                <a:spcPct val="20000"/>
+              </a:spcBef>
+              <a:spcAft>
+                <a:spcPts val="0"/>
+              </a:spcAft>
+              <a:buClr>
+                <a:srgbClr val="DA1218"/>
+              </a:buClr>
+              <a:buSzTx/>
+              <a:buFont typeface="Arial" pitchFamily="34" charset="0"/>
+              <a:buChar char="•"/>
+              <a:tabLst/>
+              <a:defRPr lang="en-US" sz="1600" kern="1200">
+                <a:solidFill>
+                  <a:schemeClr val="tx1"/>
+                </a:solidFill>
+                <a:latin typeface="Arial" pitchFamily="34" charset="0"/>
+                <a:ea typeface="+mn-ea"/>
+                <a:cs typeface="Arial" pitchFamily="34" charset="0"/>
+              </a:defRPr>
+            </a:lvl4pPr>
+            <a:lvl5pPr marL="1258888" marR="0" indent="-177800" algn="l" defTabSz="914400" rtl="0" eaLnBrk="1" fontAlgn="auto" latinLnBrk="0" hangingPunct="1">
+              <a:lnSpc>
+                <a:spcPct val="100000"/>
+              </a:lnSpc>
+              <a:spcBef>
+                <a:spcPct val="20000"/>
+              </a:spcBef>
+              <a:spcAft>
+                <a:spcPts val="0"/>
+              </a:spcAft>
+              <a:buClr>
+                <a:srgbClr val="DA1218"/>
+              </a:buClr>
+              <a:buSzPct val="100000"/>
+              <a:buFont typeface="Courier New" pitchFamily="49" charset="0"/>
+              <a:buChar char="o"/>
+              <a:tabLst/>
+              <a:defRPr lang="es-AR" sz="1400" kern="1200">
+                <a:solidFill>
+                  <a:schemeClr val="tx1"/>
+                </a:solidFill>
+                <a:latin typeface="Arial" pitchFamily="34" charset="0"/>
+                <a:ea typeface="+mn-ea"/>
+                <a:cs typeface="Arial" pitchFamily="34" charset="0"/>
+              </a:defRPr>
+            </a:lvl5pPr>
+            <a:lvl6pPr marL="2514600" indent="-228600" algn="l" defTabSz="914400" rtl="0" eaLnBrk="1" latinLnBrk="0" hangingPunct="1">
+              <a:spcBef>
+                <a:spcPct val="20000"/>
+              </a:spcBef>
+              <a:buFont typeface="Arial" pitchFamily="34" charset="0"/>
+              <a:buChar char="•"/>
+              <a:defRPr sz="2000" kern="1200">
+                <a:solidFill>
+                  <a:schemeClr val="tx1"/>
+                </a:solidFill>
+                <a:latin typeface="+mn-lt"/>
+                <a:ea typeface="+mn-ea"/>
+                <a:cs typeface="+mn-cs"/>
+              </a:defRPr>
+            </a:lvl6pPr>
+            <a:lvl7pPr marL="2971800" indent="-228600" algn="l" defTabSz="914400" rtl="0" eaLnBrk="1" latinLnBrk="0" hangingPunct="1">
+              <a:spcBef>
+                <a:spcPct val="20000"/>
+              </a:spcBef>
+              <a:buFont typeface="Arial" pitchFamily="34" charset="0"/>
+              <a:buChar char="•"/>
+              <a:defRPr sz="2000" kern="1200">
+                <a:solidFill>
+                  <a:schemeClr val="tx1"/>
+                </a:solidFill>
+                <a:latin typeface="+mn-lt"/>
+                <a:ea typeface="+mn-ea"/>
+                <a:cs typeface="+mn-cs"/>
+              </a:defRPr>
+            </a:lvl7pPr>
+            <a:lvl8pPr marL="3429000" indent="-228600" algn="l" defTabSz="914400" rtl="0" eaLnBrk="1" latinLnBrk="0" hangingPunct="1">
+              <a:spcBef>
+                <a:spcPct val="20000"/>
+              </a:spcBef>
+              <a:buFont typeface="Arial" pitchFamily="34" charset="0"/>
+              <a:buChar char="•"/>
+              <a:defRPr sz="2000" kern="1200">
+                <a:solidFill>
+                  <a:schemeClr val="tx1"/>
+                </a:solidFill>
+                <a:latin typeface="+mn-lt"/>
+                <a:ea typeface="+mn-ea"/>
+                <a:cs typeface="+mn-cs"/>
+              </a:defRPr>
+            </a:lvl8pPr>
+            <a:lvl9pPr marL="3886200" indent="-228600" algn="l" defTabSz="914400" rtl="0" eaLnBrk="1" latinLnBrk="0" hangingPunct="1">
+              <a:spcBef>
+                <a:spcPct val="20000"/>
+              </a:spcBef>
+              <a:buFont typeface="Arial" pitchFamily="34" charset="0"/>
+              <a:buChar char="•"/>
+              <a:defRPr sz="2000" kern="1200">
+                <a:solidFill>
+                  <a:schemeClr val="tx1"/>
+                </a:solidFill>
+                <a:latin typeface="+mn-lt"/>
+                <a:ea typeface="+mn-ea"/>
+                <a:cs typeface="+mn-cs"/>
+              </a:defRPr>
+            </a:lvl9pPr>
+          </a:lstStyle>
+          <a:p>
+            <a:pPr marL="0" indent="0">
+              <a:buClrTx/>
+            </a:pPr>
+            <a:r>
+              <a:rPr lang="en-GB" sz="2000" b="1" dirty="0" smtClean="0">
+                <a:latin typeface="+mn-lt"/>
+              </a:rPr>
+              <a:t> </a:t>
+            </a:r>
+            <a:r>
+              <a:rPr lang="en-GB" sz="2000" dirty="0" err="1" smtClean="0">
+                <a:latin typeface="+mn-lt"/>
+              </a:rPr>
+              <a:t>Abcdefghi</a:t>
+            </a:r>
+            <a:endParaRPr lang="es-AR" sz="1600" b="1" dirty="0">
+              <a:solidFill>
+                <a:srgbClr val="000000"/>
+              </a:solidFill>
+              <a:latin typeface="Avenir 45 Book"/>
+              <a:cs typeface="+mn-cs"/>
+            </a:endParaRPr>
+          </a:p>
+        </p:txBody>
+      </p:sp>
+      <p:sp>
+        <p:nvSpPr>
+          <p:cNvPr id="15" name="Rectangle 14"/>
+          <p:cNvSpPr/>
+          <p:nvPr/>
+        </p:nvSpPr>
+        <p:spPr>
+          <a:xfrm>
+            <a:off x="-13252" y="1"/>
+            <a:ext cx="12218504" cy="1016000"/>
+          </a:xfrm>
+          <a:prstGeom prst="rect">
+            <a:avLst/>
+          </a:prstGeom>
+          <a:solidFill>
+            <a:srgbClr val="FF9600"/>
+          </a:solidFill>
+          <a:ln>
+            <a:noFill/>
+          </a:ln>
+        </p:spPr>
+        <p:style>
+          <a:lnRef idx="1">
+            <a:schemeClr val="accent6"/>
+          </a:lnRef>
+          <a:fillRef idx="3">
+            <a:schemeClr val="accent6"/>
+          </a:fillRef>
+          <a:effectRef idx="2">
+            <a:schemeClr val="accent6"/>
+          </a:effectRef>
+          <a:fontRef idx="minor">
+            <a:schemeClr val="lt1"/>
+          </a:fontRef>
+        </p:style>
+        <p:txBody>
+          <a:bodyPr anchor="ctr"/>
+          <a:lstStyle/>
+          <a:p>
+            <a:pPr marL="0" marR="0" lvl="0" indent="0" algn="ctr" defTabSz="914400" eaLnBrk="1" fontAlgn="auto" latinLnBrk="0" hangingPunct="1">
+              <a:lnSpc>
+                <a:spcPct val="100000"/>
+              </a:lnSpc>
+              <a:spcBef>
+                <a:spcPts val="0"/>
+              </a:spcBef>
+              <a:spcAft>
+                <a:spcPts val="0"/>
+              </a:spcAft>
+              <a:buClrTx/>
+              <a:buSzTx/>
+              <a:buFontTx/>
+              <a:buNone/>
+              <a:tabLst/>
+              <a:defRPr/>
+            </a:pPr>
+            <a:r>
+              <a:rPr kumimoji="0" lang="es-ES_tradnl" sz="1800" b="0" i="0" u="none" strike="noStrike" kern="0" cap="none" spc="0" normalizeH="0" baseline="0" noProof="0" dirty="0" smtClean="0">
+                <a:ln>
+                  <a:noFill/>
+                </a:ln>
+                <a:solidFill>
+                  <a:srgbClr val="FFFFFF"/>
+                </a:solidFill>
+                <a:effectLst/>
+                <a:uLnTx/>
+                <a:uFillTx/>
+                <a:latin typeface="Arial"/>
+                <a:ea typeface="ＭＳ Ｐゴシック" pitchFamily="-108" charset="-128"/>
+                <a:cs typeface="+mn-cs"/>
+              </a:rPr>
+              <a:t>  </a:t>
+            </a:r>
+            <a:endParaRPr kumimoji="0" lang="es-ES_tradnl" sz="1800" b="0" i="0" u="none" strike="noStrike" kern="0" cap="none" spc="0" normalizeH="0" baseline="0" noProof="0" dirty="0">
+              <a:ln>
+                <a:noFill/>
+              </a:ln>
+              <a:solidFill>
+                <a:srgbClr val="FFFFFF"/>
+              </a:solidFill>
+              <a:effectLst/>
+              <a:uLnTx/>
+              <a:uFillTx/>
+              <a:latin typeface="Arial"/>
+              <a:ea typeface="ＭＳ Ｐゴシック" pitchFamily="-108" charset="-128"/>
+              <a:cs typeface="+mn-cs"/>
+            </a:endParaRPr>
+          </a:p>
+        </p:txBody>
+      </p:sp>
+      <p:sp>
+        <p:nvSpPr>
+          <p:cNvPr id="16" name="TextBox 15"/>
+          <p:cNvSpPr txBox="1"/>
+          <p:nvPr/>
+        </p:nvSpPr>
+        <p:spPr>
+          <a:xfrm>
+            <a:off x="515937" y="212035"/>
+            <a:ext cx="11013453" cy="553998"/>
+          </a:xfrm>
+          <a:prstGeom prst="rect">
+            <a:avLst/>
+          </a:prstGeom>
+          <a:noFill/>
+        </p:spPr>
+        <p:txBody>
+          <a:bodyPr wrap="square" lIns="0" tIns="0" rIns="0" bIns="0" rtlCol="0">
+            <a:spAutoFit/>
+          </a:bodyPr>
+          <a:lstStyle/>
+          <a:p>
+            <a:r>
+              <a:rPr lang="en-US" sz="3600" dirty="0">
+                <a:solidFill>
+                  <a:schemeClr val="bg1"/>
+                </a:solidFill>
+              </a:rPr>
               <a:t>Tip 3: Refactoring</a:t>
             </a:r>
           </a:p>
@@ -21247,7 +22363,7 @@
 </p:sld>
 </file>
 
-<file path=ppt/slides/slide21.xml><?xml version="1.0" encoding="utf-8"?>
+<file path=ppt/slides/slide22.xml><?xml version="1.0" encoding="utf-8"?>
 <p:sld xmlns:a="http://schemas.openxmlformats.org/drawingml/2006/main" xmlns:r="http://schemas.openxmlformats.org/officeDocument/2006/relationships" xmlns:p="http://schemas.openxmlformats.org/presentationml/2006/main">
   <p:cSld>
     <p:spTree>
@@ -21465,7 +22581,7 @@
 </p:sld>
 </file>
 
-<file path=ppt/slides/slide22.xml><?xml version="1.0" encoding="utf-8"?>
+<file path=ppt/slides/slide23.xml><?xml version="1.0" encoding="utf-8"?>
 <p:sld xmlns:a="http://schemas.openxmlformats.org/drawingml/2006/main" xmlns:r="http://schemas.openxmlformats.org/officeDocument/2006/relationships" xmlns:p="http://schemas.openxmlformats.org/presentationml/2006/main">
   <p:cSld>
     <p:spTree>
@@ -21534,7 +22650,7 @@
 </p:sld>
 </file>
 
-<file path=ppt/slides/slide23.xml><?xml version="1.0" encoding="utf-8"?>
+<file path=ppt/slides/slide24.xml><?xml version="1.0" encoding="utf-8"?>
 <p:sld xmlns:a="http://schemas.openxmlformats.org/drawingml/2006/main" xmlns:r="http://schemas.openxmlformats.org/officeDocument/2006/relationships" xmlns:p="http://schemas.openxmlformats.org/presentationml/2006/main">
   <p:cSld>
     <p:spTree>
@@ -21985,7 +23101,7 @@
 </p:sld>
 </file>
 
-<file path=ppt/slides/slide24.xml><?xml version="1.0" encoding="utf-8"?>
+<file path=ppt/slides/slide25.xml><?xml version="1.0" encoding="utf-8"?>
 <p:sld xmlns:a="http://schemas.openxmlformats.org/drawingml/2006/main" xmlns:r="http://schemas.openxmlformats.org/officeDocument/2006/relationships" xmlns:p="http://schemas.openxmlformats.org/presentationml/2006/main">
   <p:cSld>
     <p:spTree>
@@ -22048,7 +23164,7 @@
 </p:sld>
 </file>
 
-<file path=ppt/slides/slide25.xml><?xml version="1.0" encoding="utf-8"?>
+<file path=ppt/slides/slide26.xml><?xml version="1.0" encoding="utf-8"?>
 <p:sld xmlns:a="http://schemas.openxmlformats.org/drawingml/2006/main" xmlns:r="http://schemas.openxmlformats.org/officeDocument/2006/relationships" xmlns:p="http://schemas.openxmlformats.org/presentationml/2006/main">
   <p:cSld>
     <p:spTree>
@@ -22528,7 +23644,7 @@
 </p:sld>
 </file>
 
-<file path=ppt/slides/slide26.xml><?xml version="1.0" encoding="utf-8"?>
+<file path=ppt/slides/slide27.xml><?xml version="1.0" encoding="utf-8"?>
 <p:sld xmlns:a="http://schemas.openxmlformats.org/drawingml/2006/main" xmlns:r="http://schemas.openxmlformats.org/officeDocument/2006/relationships" xmlns:p="http://schemas.openxmlformats.org/presentationml/2006/main">
   <p:cSld>
     <p:spTree>
@@ -22572,557 +23688,6 @@
     <p:extLst>
       <p:ext uri="{BB962C8B-B14F-4D97-AF65-F5344CB8AC3E}">
         <p14:creationId xmlns:p14="http://schemas.microsoft.com/office/powerpoint/2010/main" val="689075145"/>
-      </p:ext>
-    </p:extLst>
-  </p:cSld>
-  <p:clrMapOvr>
-    <a:masterClrMapping/>
-  </p:clrMapOvr>
-  <p:transition spd="slow">
-    <p:wipe/>
-  </p:transition>
-  <p:timing>
-    <p:tnLst>
-      <p:par>
-        <p:cTn id="1" dur="indefinite" restart="never" nodeType="tmRoot"/>
-      </p:par>
-    </p:tnLst>
-  </p:timing>
-</p:sld>
-</file>
-
-<file path=ppt/slides/slide27.xml><?xml version="1.0" encoding="utf-8"?>
-<p:sld xmlns:a="http://schemas.openxmlformats.org/drawingml/2006/main" xmlns:r="http://schemas.openxmlformats.org/officeDocument/2006/relationships" xmlns:p="http://schemas.openxmlformats.org/presentationml/2006/main">
-  <p:cSld>
-    <p:spTree>
-      <p:nvGrpSpPr>
-        <p:cNvPr id="1" name=""/>
-        <p:cNvGrpSpPr/>
-        <p:nvPr/>
-      </p:nvGrpSpPr>
-      <p:grpSpPr>
-        <a:xfrm>
-          <a:off x="0" y="0"/>
-          <a:ext cx="0" cy="0"/>
-          <a:chOff x="0" y="0"/>
-          <a:chExt cx="0" cy="0"/>
-        </a:xfrm>
-      </p:grpSpPr>
-      <p:sp>
-        <p:nvSpPr>
-          <p:cNvPr id="15" name="Rectangle 14"/>
-          <p:cNvSpPr/>
-          <p:nvPr/>
-        </p:nvSpPr>
-        <p:spPr>
-          <a:xfrm>
-            <a:off x="-13252" y="1"/>
-            <a:ext cx="12218504" cy="1016000"/>
-          </a:xfrm>
-          <a:prstGeom prst="rect">
-            <a:avLst/>
-          </a:prstGeom>
-          <a:solidFill>
-            <a:srgbClr val="FF9600"/>
-          </a:solidFill>
-          <a:ln>
-            <a:noFill/>
-          </a:ln>
-        </p:spPr>
-        <p:style>
-          <a:lnRef idx="1">
-            <a:schemeClr val="accent6"/>
-          </a:lnRef>
-          <a:fillRef idx="3">
-            <a:schemeClr val="accent6"/>
-          </a:fillRef>
-          <a:effectRef idx="2">
-            <a:schemeClr val="accent6"/>
-          </a:effectRef>
-          <a:fontRef idx="minor">
-            <a:schemeClr val="lt1"/>
-          </a:fontRef>
-        </p:style>
-        <p:txBody>
-          <a:bodyPr anchor="ctr"/>
-          <a:lstStyle/>
-          <a:p>
-            <a:pPr marL="0" marR="0" lvl="0" indent="0" algn="ctr" defTabSz="914400" eaLnBrk="1" fontAlgn="auto" latinLnBrk="0" hangingPunct="1">
-              <a:lnSpc>
-                <a:spcPct val="100000"/>
-              </a:lnSpc>
-              <a:spcBef>
-                <a:spcPts val="0"/>
-              </a:spcBef>
-              <a:spcAft>
-                <a:spcPts val="0"/>
-              </a:spcAft>
-              <a:buClrTx/>
-              <a:buSzTx/>
-              <a:buFontTx/>
-              <a:buNone/>
-              <a:tabLst/>
-              <a:defRPr/>
-            </a:pPr>
-            <a:r>
-              <a:rPr kumimoji="0" lang="es-ES_tradnl" sz="1800" b="0" i="0" u="none" strike="noStrike" kern="0" cap="none" spc="0" normalizeH="0" baseline="0" noProof="0" dirty="0" smtClean="0">
-                <a:ln>
-                  <a:noFill/>
-                </a:ln>
-                <a:solidFill>
-                  <a:srgbClr val="FFFFFF"/>
-                </a:solidFill>
-                <a:effectLst/>
-                <a:uLnTx/>
-                <a:uFillTx/>
-                <a:latin typeface="Arial"/>
-                <a:ea typeface="ＭＳ Ｐゴシック" pitchFamily="-108" charset="-128"/>
-                <a:cs typeface="+mn-cs"/>
-              </a:rPr>
-              <a:t>  </a:t>
-            </a:r>
-            <a:endParaRPr kumimoji="0" lang="es-ES_tradnl" sz="1800" b="0" i="0" u="none" strike="noStrike" kern="0" cap="none" spc="0" normalizeH="0" baseline="0" noProof="0" dirty="0">
-              <a:ln>
-                <a:noFill/>
-              </a:ln>
-              <a:solidFill>
-                <a:srgbClr val="FFFFFF"/>
-              </a:solidFill>
-              <a:effectLst/>
-              <a:uLnTx/>
-              <a:uFillTx/>
-              <a:latin typeface="Arial"/>
-              <a:ea typeface="ＭＳ Ｐゴシック" pitchFamily="-108" charset="-128"/>
-              <a:cs typeface="+mn-cs"/>
-            </a:endParaRPr>
-          </a:p>
-        </p:txBody>
-      </p:sp>
-      <p:sp>
-        <p:nvSpPr>
-          <p:cNvPr id="16" name="TextBox 15"/>
-          <p:cNvSpPr txBox="1"/>
-          <p:nvPr/>
-        </p:nvSpPr>
-        <p:spPr>
-          <a:xfrm>
-            <a:off x="515936" y="212035"/>
-            <a:ext cx="11676063" cy="553998"/>
-          </a:xfrm>
-          <a:prstGeom prst="rect">
-            <a:avLst/>
-          </a:prstGeom>
-          <a:noFill/>
-        </p:spPr>
-        <p:txBody>
-          <a:bodyPr wrap="square" lIns="0" tIns="0" rIns="0" bIns="0" rtlCol="0">
-            <a:spAutoFit/>
-          </a:bodyPr>
-          <a:lstStyle/>
-          <a:p>
-            <a:r>
-              <a:rPr lang="en-US" sz="3600" dirty="0" smtClean="0">
-                <a:solidFill>
-                  <a:schemeClr val="bg1"/>
-                </a:solidFill>
-              </a:rPr>
-              <a:t>Summary</a:t>
-            </a:r>
-            <a:endParaRPr lang="es-AR" sz="3600" dirty="0">
-              <a:solidFill>
-                <a:schemeClr val="bg1"/>
-              </a:solidFill>
-            </a:endParaRPr>
-          </a:p>
-        </p:txBody>
-      </p:sp>
-      <p:sp>
-        <p:nvSpPr>
-          <p:cNvPr id="6" name="Content Placeholder 2"/>
-          <p:cNvSpPr txBox="1">
-            <a:spLocks/>
-          </p:cNvSpPr>
-          <p:nvPr/>
-        </p:nvSpPr>
-        <p:spPr>
-          <a:xfrm>
-            <a:off x="476534" y="1312325"/>
-            <a:ext cx="10987585" cy="4329621"/>
-          </a:xfrm>
-          <a:prstGeom prst="rect">
-            <a:avLst/>
-          </a:prstGeom>
-        </p:spPr>
-        <p:txBody>
-          <a:bodyPr vert="horz" lIns="91440" tIns="45720" rIns="91440" bIns="45720" rtlCol="0">
-            <a:noAutofit/>
-          </a:bodyPr>
-          <a:lstStyle>
-            <a:lvl1pPr marL="273050" marR="0" indent="-273050" algn="l" defTabSz="914400" rtl="0" eaLnBrk="1" fontAlgn="auto" latinLnBrk="0" hangingPunct="1">
-              <a:lnSpc>
-                <a:spcPct val="100000"/>
-              </a:lnSpc>
-              <a:spcBef>
-                <a:spcPts val="1200"/>
-              </a:spcBef>
-              <a:spcAft>
-                <a:spcPts val="0"/>
-              </a:spcAft>
-              <a:buClr>
-                <a:srgbClr val="DA1218"/>
-              </a:buClr>
-              <a:buSzTx/>
-              <a:buFont typeface="Wingdings" pitchFamily="2" charset="2"/>
-              <a:buChar char="§"/>
-              <a:tabLst/>
-              <a:defRPr lang="en-US" sz="2400" kern="1200">
-                <a:solidFill>
-                  <a:schemeClr val="tx1"/>
-                </a:solidFill>
-                <a:latin typeface="Arial" pitchFamily="34" charset="0"/>
-                <a:ea typeface="+mn-ea"/>
-                <a:cs typeface="Arial" pitchFamily="34" charset="0"/>
-              </a:defRPr>
-            </a:lvl1pPr>
-            <a:lvl2pPr marL="628650" marR="0" indent="-355600" algn="l" defTabSz="914400" rtl="0" eaLnBrk="1" fontAlgn="auto" latinLnBrk="0" hangingPunct="1">
-              <a:lnSpc>
-                <a:spcPct val="100000"/>
-              </a:lnSpc>
-              <a:spcBef>
-                <a:spcPct val="20000"/>
-              </a:spcBef>
-              <a:spcAft>
-                <a:spcPts val="0"/>
-              </a:spcAft>
-              <a:buClr>
-                <a:srgbClr val="DA1218"/>
-              </a:buClr>
-              <a:buSzTx/>
-              <a:buFont typeface="Wingdings" pitchFamily="2" charset="2"/>
-              <a:buChar char=""/>
-              <a:tabLst/>
-              <a:defRPr lang="en-US" sz="2000" kern="1200">
-                <a:solidFill>
-                  <a:schemeClr val="tx1"/>
-                </a:solidFill>
-                <a:latin typeface="Arial" pitchFamily="34" charset="0"/>
-                <a:ea typeface="+mn-ea"/>
-                <a:cs typeface="Arial" pitchFamily="34" charset="0"/>
-              </a:defRPr>
-            </a:lvl2pPr>
-            <a:lvl3pPr marL="903288" marR="0" indent="-274638" algn="l" defTabSz="914400" rtl="0" eaLnBrk="1" fontAlgn="auto" latinLnBrk="0" hangingPunct="1">
-              <a:lnSpc>
-                <a:spcPct val="100000"/>
-              </a:lnSpc>
-              <a:spcBef>
-                <a:spcPct val="20000"/>
-              </a:spcBef>
-              <a:spcAft>
-                <a:spcPts val="0"/>
-              </a:spcAft>
-              <a:buClr>
-                <a:srgbClr val="DA1218"/>
-              </a:buClr>
-              <a:buSzTx/>
-              <a:buFont typeface="Wingdings" pitchFamily="2" charset="2"/>
-              <a:buChar char="ü"/>
-              <a:tabLst/>
-              <a:defRPr lang="en-US" sz="1800" kern="1200">
-                <a:solidFill>
-                  <a:schemeClr val="tx1"/>
-                </a:solidFill>
-                <a:latin typeface="Arial" pitchFamily="34" charset="0"/>
-                <a:ea typeface="+mn-ea"/>
-                <a:cs typeface="Arial" pitchFamily="34" charset="0"/>
-              </a:defRPr>
-            </a:lvl3pPr>
-            <a:lvl4pPr marL="1081088" marR="0" indent="-177800" algn="l" defTabSz="914400" rtl="0" eaLnBrk="1" fontAlgn="auto" latinLnBrk="0" hangingPunct="1">
-              <a:lnSpc>
-                <a:spcPct val="100000"/>
-              </a:lnSpc>
-              <a:spcBef>
-                <a:spcPct val="20000"/>
-              </a:spcBef>
-              <a:spcAft>
-                <a:spcPts val="0"/>
-              </a:spcAft>
-              <a:buClr>
-                <a:srgbClr val="DA1218"/>
-              </a:buClr>
-              <a:buSzTx/>
-              <a:buFont typeface="Arial" pitchFamily="34" charset="0"/>
-              <a:buChar char="•"/>
-              <a:tabLst/>
-              <a:defRPr lang="en-US" sz="1600" kern="1200">
-                <a:solidFill>
-                  <a:schemeClr val="tx1"/>
-                </a:solidFill>
-                <a:latin typeface="Arial" pitchFamily="34" charset="0"/>
-                <a:ea typeface="+mn-ea"/>
-                <a:cs typeface="Arial" pitchFamily="34" charset="0"/>
-              </a:defRPr>
-            </a:lvl4pPr>
-            <a:lvl5pPr marL="1258888" marR="0" indent="-177800" algn="l" defTabSz="914400" rtl="0" eaLnBrk="1" fontAlgn="auto" latinLnBrk="0" hangingPunct="1">
-              <a:lnSpc>
-                <a:spcPct val="100000"/>
-              </a:lnSpc>
-              <a:spcBef>
-                <a:spcPct val="20000"/>
-              </a:spcBef>
-              <a:spcAft>
-                <a:spcPts val="0"/>
-              </a:spcAft>
-              <a:buClr>
-                <a:srgbClr val="DA1218"/>
-              </a:buClr>
-              <a:buSzPct val="100000"/>
-              <a:buFont typeface="Courier New" pitchFamily="49" charset="0"/>
-              <a:buChar char="o"/>
-              <a:tabLst/>
-              <a:defRPr lang="es-AR" sz="1400" kern="1200">
-                <a:solidFill>
-                  <a:schemeClr val="tx1"/>
-                </a:solidFill>
-                <a:latin typeface="Arial" pitchFamily="34" charset="0"/>
-                <a:ea typeface="+mn-ea"/>
-                <a:cs typeface="Arial" pitchFamily="34" charset="0"/>
-              </a:defRPr>
-            </a:lvl5pPr>
-            <a:lvl6pPr marL="2514600" indent="-228600" algn="l" defTabSz="914400" rtl="0" eaLnBrk="1" latinLnBrk="0" hangingPunct="1">
-              <a:spcBef>
-                <a:spcPct val="20000"/>
-              </a:spcBef>
-              <a:buFont typeface="Arial" pitchFamily="34" charset="0"/>
-              <a:buChar char="•"/>
-              <a:defRPr sz="2000" kern="1200">
-                <a:solidFill>
-                  <a:schemeClr val="tx1"/>
-                </a:solidFill>
-                <a:latin typeface="+mn-lt"/>
-                <a:ea typeface="+mn-ea"/>
-                <a:cs typeface="+mn-cs"/>
-              </a:defRPr>
-            </a:lvl6pPr>
-            <a:lvl7pPr marL="2971800" indent="-228600" algn="l" defTabSz="914400" rtl="0" eaLnBrk="1" latinLnBrk="0" hangingPunct="1">
-              <a:spcBef>
-                <a:spcPct val="20000"/>
-              </a:spcBef>
-              <a:buFont typeface="Arial" pitchFamily="34" charset="0"/>
-              <a:buChar char="•"/>
-              <a:defRPr sz="2000" kern="1200">
-                <a:solidFill>
-                  <a:schemeClr val="tx1"/>
-                </a:solidFill>
-                <a:latin typeface="+mn-lt"/>
-                <a:ea typeface="+mn-ea"/>
-                <a:cs typeface="+mn-cs"/>
-              </a:defRPr>
-            </a:lvl7pPr>
-            <a:lvl8pPr marL="3429000" indent="-228600" algn="l" defTabSz="914400" rtl="0" eaLnBrk="1" latinLnBrk="0" hangingPunct="1">
-              <a:spcBef>
-                <a:spcPct val="20000"/>
-              </a:spcBef>
-              <a:buFont typeface="Arial" pitchFamily="34" charset="0"/>
-              <a:buChar char="•"/>
-              <a:defRPr sz="2000" kern="1200">
-                <a:solidFill>
-                  <a:schemeClr val="tx1"/>
-                </a:solidFill>
-                <a:latin typeface="+mn-lt"/>
-                <a:ea typeface="+mn-ea"/>
-                <a:cs typeface="+mn-cs"/>
-              </a:defRPr>
-            </a:lvl8pPr>
-            <a:lvl9pPr marL="3886200" indent="-228600" algn="l" defTabSz="914400" rtl="0" eaLnBrk="1" latinLnBrk="0" hangingPunct="1">
-              <a:spcBef>
-                <a:spcPct val="20000"/>
-              </a:spcBef>
-              <a:buFont typeface="Arial" pitchFamily="34" charset="0"/>
-              <a:buChar char="•"/>
-              <a:defRPr sz="2000" kern="1200">
-                <a:solidFill>
-                  <a:schemeClr val="tx1"/>
-                </a:solidFill>
-                <a:latin typeface="+mn-lt"/>
-                <a:ea typeface="+mn-ea"/>
-                <a:cs typeface="+mn-cs"/>
-              </a:defRPr>
-            </a:lvl9pPr>
-          </a:lstStyle>
-          <a:p>
-            <a:pPr marL="0" lvl="1" indent="0">
-              <a:spcBef>
-                <a:spcPts val="1200"/>
-              </a:spcBef>
-              <a:buClrTx/>
-              <a:buNone/>
-            </a:pPr>
-            <a:r>
-              <a:rPr lang="en-GB" dirty="0" smtClean="0">
-                <a:latin typeface="Avenir 45 Book (Body)"/>
-              </a:rPr>
-              <a:t>These practices:</a:t>
-            </a:r>
-          </a:p>
-          <a:p>
-            <a:pPr marL="0" lvl="1" indent="0">
-              <a:spcBef>
-                <a:spcPts val="1200"/>
-              </a:spcBef>
-              <a:buClrTx/>
-              <a:buFont typeface="Wingdings" panose="05000000000000000000" pitchFamily="2" charset="2"/>
-              <a:buChar char="§"/>
-            </a:pPr>
-            <a:endParaRPr lang="en-GB" dirty="0" smtClean="0">
-              <a:latin typeface="Avenir 45 Book (Body)"/>
-            </a:endParaRPr>
-          </a:p>
-          <a:p>
-            <a:pPr marL="0" lvl="1" indent="0">
-              <a:spcBef>
-                <a:spcPts val="1200"/>
-              </a:spcBef>
-              <a:buClrTx/>
-              <a:buFont typeface="Wingdings" panose="05000000000000000000" pitchFamily="2" charset="2"/>
-              <a:buChar char="§"/>
-            </a:pPr>
-            <a:r>
-              <a:rPr lang="en-GB" dirty="0" smtClean="0">
-                <a:latin typeface="Avenir 45 Book (Body)"/>
-              </a:rPr>
-              <a:t> Make your code more maintainable</a:t>
-            </a:r>
-            <a:endParaRPr lang="en-GB" dirty="0">
-              <a:latin typeface="Avenir 45 Book (Body)"/>
-            </a:endParaRPr>
-          </a:p>
-          <a:p>
-            <a:pPr marL="0" lvl="1" indent="0">
-              <a:spcBef>
-                <a:spcPts val="1200"/>
-              </a:spcBef>
-              <a:buClrTx/>
-              <a:buFont typeface="Wingdings" panose="05000000000000000000" pitchFamily="2" charset="2"/>
-              <a:buChar char="§"/>
-            </a:pPr>
-            <a:r>
-              <a:rPr lang="en-GB" dirty="0">
-                <a:latin typeface="Avenir 45 Book (Body)"/>
-              </a:rPr>
-              <a:t> </a:t>
-            </a:r>
-            <a:r>
-              <a:rPr lang="en-GB" dirty="0" smtClean="0">
-                <a:latin typeface="Avenir 45 Book (Body)"/>
-              </a:rPr>
-              <a:t>Minimize the number of errors in the final product</a:t>
-            </a:r>
-          </a:p>
-          <a:p>
-            <a:pPr marL="0" lvl="1" indent="0">
-              <a:spcBef>
-                <a:spcPts val="1200"/>
-              </a:spcBef>
-              <a:buClrTx/>
-              <a:buFont typeface="Wingdings" panose="05000000000000000000" pitchFamily="2" charset="2"/>
-              <a:buChar char="§"/>
-            </a:pPr>
-            <a:r>
-              <a:rPr lang="en-GB" dirty="0" smtClean="0">
-                <a:latin typeface="Avenir 45 Book (Body)"/>
-              </a:rPr>
-              <a:t> Allow early detection of errors in the development environment</a:t>
-            </a:r>
-          </a:p>
-          <a:p>
-            <a:pPr marL="0" lvl="1" indent="0">
-              <a:spcBef>
-                <a:spcPts val="1200"/>
-              </a:spcBef>
-              <a:buClrTx/>
-              <a:buFont typeface="Wingdings" panose="05000000000000000000" pitchFamily="2" charset="2"/>
-              <a:buChar char="§"/>
-            </a:pPr>
-            <a:r>
-              <a:rPr lang="en-GB" dirty="0">
-                <a:latin typeface="Avenir 45 Book (Body)"/>
-              </a:rPr>
-              <a:t> </a:t>
-            </a:r>
-            <a:r>
-              <a:rPr lang="en-GB" dirty="0" smtClean="0">
-                <a:latin typeface="Avenir 45 Book (Body)"/>
-              </a:rPr>
-              <a:t>Reduce development and maintenance time over the project’s lifecycle</a:t>
-            </a:r>
-          </a:p>
-          <a:p>
-            <a:pPr marL="0" lvl="1" indent="0">
-              <a:spcBef>
-                <a:spcPts val="1200"/>
-              </a:spcBef>
-              <a:buClrTx/>
-              <a:buFont typeface="Wingdings" panose="05000000000000000000" pitchFamily="2" charset="2"/>
-              <a:buChar char="§"/>
-            </a:pPr>
-            <a:r>
-              <a:rPr lang="en-GB" b="1" dirty="0" smtClean="0">
-                <a:latin typeface="Avenir 45 Book (Body)"/>
-              </a:rPr>
-              <a:t> Improve the quality of the final product</a:t>
-            </a:r>
-            <a:endParaRPr lang="en-GB" b="1" dirty="0">
-              <a:latin typeface="Avenir 45 Book (Body)"/>
-            </a:endParaRPr>
-          </a:p>
-          <a:p>
-            <a:pPr marL="0" lvl="1" indent="0">
-              <a:spcBef>
-                <a:spcPts val="1200"/>
-              </a:spcBef>
-              <a:buClrTx/>
-              <a:buFont typeface="Wingdings" panose="05000000000000000000" pitchFamily="2" charset="2"/>
-              <a:buChar char="§"/>
-            </a:pPr>
-            <a:endParaRPr lang="en-GB" dirty="0">
-              <a:latin typeface="Avenir 45 Book (Body)"/>
-            </a:endParaRPr>
-          </a:p>
-          <a:p>
-            <a:pPr lvl="0" defTabSz="914363">
-              <a:lnSpc>
-                <a:spcPct val="90000"/>
-              </a:lnSpc>
-              <a:spcBef>
-                <a:spcPts val="0"/>
-              </a:spcBef>
-              <a:spcAft>
-                <a:spcPts val="400"/>
-              </a:spcAft>
-              <a:buClr>
-                <a:schemeClr val="tx1">
-                  <a:lumMod val="75000"/>
-                  <a:lumOff val="25000"/>
-                </a:schemeClr>
-              </a:buClr>
-              <a:buSzPct val="100000"/>
-              <a:buFont typeface="Wingdings" panose="05000000000000000000" pitchFamily="2" charset="2"/>
-              <a:buChar char="ä"/>
-            </a:pPr>
-            <a:endParaRPr lang="es-AR" sz="1600" b="1" dirty="0">
-              <a:solidFill>
-                <a:srgbClr val="000000"/>
-              </a:solidFill>
-              <a:latin typeface="Avenir 45 Book (Body)"/>
-              <a:cs typeface="+mn-cs"/>
-            </a:endParaRPr>
-          </a:p>
-        </p:txBody>
-      </p:sp>
-    </p:spTree>
-    <p:extLst>
-      <p:ext uri="{BB962C8B-B14F-4D97-AF65-F5344CB8AC3E}">
-        <p14:creationId xmlns:p14="http://schemas.microsoft.com/office/powerpoint/2010/main" val="3539865254"/>
       </p:ext>
     </p:extLst>
   </p:cSld>
@@ -23509,28 +24074,10 @@
               <a:buNone/>
             </a:pPr>
             <a:r>
-              <a:rPr lang="en-US" dirty="0" smtClean="0">
-                <a:latin typeface="Avenir 45 Book (Body)"/>
-              </a:rPr>
-              <a:t>These </a:t>
-            </a:r>
-            <a:r>
-              <a:rPr lang="en-US" dirty="0">
-                <a:latin typeface="Avenir 45 Book (Body)"/>
-              </a:rPr>
-              <a:t>practices </a:t>
-            </a:r>
-            <a:r>
-              <a:rPr lang="en-US" dirty="0" smtClean="0">
-                <a:latin typeface="Avenir 45 Book (Body)"/>
-              </a:rPr>
-              <a:t>will also</a:t>
-            </a:r>
-            <a:r>
               <a:rPr lang="en-GB" dirty="0" smtClean="0">
                 <a:latin typeface="Avenir 45 Book (Body)"/>
               </a:rPr>
-              <a:t>:</a:t>
+              <a:t>These practices:</a:t>
             </a:r>
           </a:p>
           <a:p>
@@ -23559,8 +24106,11 @@
               <a:rPr lang="en-GB" dirty="0" smtClean="0">
                 <a:latin typeface="Avenir 45 Book (Body)"/>
               </a:rPr>
-              <a:t> Improve the development team’s internal organization</a:t>
-            </a:r>
+              <a:t> Make your code more maintainable</a:t>
+            </a:r>
+            <a:endParaRPr lang="en-GB" dirty="0">
+              <a:latin typeface="Avenir 45 Book (Body)"/>
+            </a:endParaRPr>
           </a:p>
           <a:p>
             <a:pPr marL="0" lvl="1" indent="0">
@@ -23581,7 +24131,7 @@
               <a:rPr lang="en-GB" dirty="0" smtClean="0">
                 <a:latin typeface="Avenir 45 Book (Body)"/>
               </a:rPr>
-              <a:t>Maintain a current build always available for testing, demos or deployment</a:t>
+              <a:t>Minimize the number of errors in the final product</a:t>
             </a:r>
           </a:p>
           <a:p>
@@ -23597,8 +24147,59 @@
               <a:rPr lang="en-GB" dirty="0" smtClean="0">
                 <a:latin typeface="Avenir 45 Book (Body)"/>
               </a:rPr>
-              <a:t> Allow you to generate metrics of code quality, test coverage, etc.</a:t>
-            </a:r>
+              <a:t> Allow early detection of errors in the development environment</a:t>
+            </a:r>
+          </a:p>
+          <a:p>
+            <a:pPr marL="0" lvl="1" indent="0">
+              <a:spcBef>
+                <a:spcPts val="1200"/>
+              </a:spcBef>
+              <a:buClrTx/>
+              <a:buFont typeface="Wingdings" panose="05000000000000000000" pitchFamily="2" charset="2"/>
+              <a:buChar char="§"/>
+            </a:pPr>
+            <a:r>
+              <a:rPr lang="en-GB" dirty="0">
+                <a:latin typeface="Avenir 45 Book (Body)"/>
+              </a:rPr>
+              <a:t> </a:t>
+            </a:r>
+            <a:r>
+              <a:rPr lang="en-GB" dirty="0" smtClean="0">
+                <a:latin typeface="Avenir 45 Book (Body)"/>
+              </a:rPr>
+              <a:t>Reduce development and maintenance time over the project’s lifecycle</a:t>
+            </a:r>
+          </a:p>
+          <a:p>
+            <a:pPr marL="0" lvl="1" indent="0">
+              <a:spcBef>
+                <a:spcPts val="1200"/>
+              </a:spcBef>
+              <a:buClrTx/>
+              <a:buFont typeface="Wingdings" panose="05000000000000000000" pitchFamily="2" charset="2"/>
+              <a:buChar char="§"/>
+            </a:pPr>
+            <a:r>
+              <a:rPr lang="en-GB" b="1" dirty="0" smtClean="0">
+                <a:latin typeface="Avenir 45 Book (Body)"/>
+              </a:rPr>
+              <a:t> Improve the quality of the final product</a:t>
+            </a:r>
+            <a:endParaRPr lang="en-GB" b="1" dirty="0">
+              <a:latin typeface="Avenir 45 Book (Body)"/>
+            </a:endParaRPr>
+          </a:p>
+          <a:p>
+            <a:pPr marL="0" lvl="1" indent="0">
+              <a:spcBef>
+                <a:spcPts val="1200"/>
+              </a:spcBef>
+              <a:buClrTx/>
+              <a:buFont typeface="Wingdings" panose="05000000000000000000" pitchFamily="2" charset="2"/>
+              <a:buChar char="§"/>
+            </a:pPr>
             <a:endParaRPr lang="en-GB" dirty="0">
               <a:latin typeface="Avenir 45 Book (Body)"/>
             </a:endParaRPr>
@@ -23637,7 +24238,7 @@
     </p:spTree>
     <p:extLst>
       <p:ext uri="{BB962C8B-B14F-4D97-AF65-F5344CB8AC3E}">
-        <p14:creationId xmlns:p14="http://schemas.microsoft.com/office/powerpoint/2010/main" val="1925881899"/>
+        <p14:creationId xmlns:p14="http://schemas.microsoft.com/office/powerpoint/2010/main" val="3539865254"/>
       </p:ext>
     </p:extLst>
   </p:cSld>
@@ -23792,7 +24393,7 @@
                   <a:schemeClr val="bg1"/>
                 </a:solidFill>
               </a:rPr>
-              <a:t>Part III: Scenes of the next episode…</a:t>
+              <a:t>Summary</a:t>
             </a:r>
             <a:endParaRPr lang="es-AR" sz="3600" dirty="0">
               <a:solidFill>
@@ -24021,14 +24622,31 @@
                 <a:spcPts val="1200"/>
               </a:spcBef>
               <a:buClrTx/>
-              <a:buFont typeface="Wingdings" panose="05000000000000000000" pitchFamily="2" charset="2"/>
-              <a:buChar char="§"/>
+              <a:buNone/>
             </a:pPr>
+            <a:r>
+              <a:rPr lang="en-US" dirty="0" smtClean="0">
+                <a:latin typeface="Avenir 45 Book (Body)"/>
+              </a:rPr>
+              <a:t>These </a:t>
+            </a:r>
+            <a:r>
+              <a:rPr lang="en-US" dirty="0">
+                <a:latin typeface="Avenir 45 Book (Body)"/>
+              </a:rPr>
+              <a:t>practices </a:t>
+            </a:r>
+            <a:r>
+              <a:rPr lang="en-US" dirty="0" smtClean="0">
+                <a:latin typeface="Avenir 45 Book (Body)"/>
+              </a:rPr>
+              <a:t>will also</a:t>
+            </a:r>
             <a:r>
               <a:rPr lang="en-GB" dirty="0" smtClean="0">
                 <a:latin typeface="Avenir 45 Book (Body)"/>
               </a:rPr>
-              <a:t> No, it’s over, just kidding…</a:t>
+              <a:t>:</a:t>
             </a:r>
           </a:p>
           <a:p>
@@ -24037,8 +24655,66 @@
                 <a:spcPts val="1200"/>
               </a:spcBef>
               <a:buClrTx/>
-              <a:buNone/>
+              <a:buFont typeface="Wingdings" panose="05000000000000000000" pitchFamily="2" charset="2"/>
+              <a:buChar char="§"/>
             </a:pPr>
+            <a:endParaRPr lang="en-GB" dirty="0" smtClean="0">
+              <a:latin typeface="Avenir 45 Book (Body)"/>
+            </a:endParaRPr>
+          </a:p>
+          <a:p>
+            <a:pPr marL="0" lvl="1" indent="0">
+              <a:spcBef>
+                <a:spcPts val="1200"/>
+              </a:spcBef>
+              <a:buClrTx/>
+              <a:buFont typeface="Wingdings" panose="05000000000000000000" pitchFamily="2" charset="2"/>
+              <a:buChar char="§"/>
+            </a:pPr>
+            <a:r>
+              <a:rPr lang="en-GB" dirty="0" smtClean="0">
+                <a:latin typeface="Avenir 45 Book (Body)"/>
+              </a:rPr>
+              <a:t> Improve the development team’s internal organization</a:t>
+            </a:r>
+          </a:p>
+          <a:p>
+            <a:pPr marL="0" lvl="1" indent="0">
+              <a:spcBef>
+                <a:spcPts val="1200"/>
+              </a:spcBef>
+              <a:buClrTx/>
+              <a:buFont typeface="Wingdings" panose="05000000000000000000" pitchFamily="2" charset="2"/>
+              <a:buChar char="§"/>
+            </a:pPr>
+            <a:r>
+              <a:rPr lang="en-GB" dirty="0">
+                <a:latin typeface="Avenir 45 Book (Body)"/>
+              </a:rPr>
+              <a:t> </a:t>
+            </a:r>
+            <a:r>
+              <a:rPr lang="en-GB" dirty="0" smtClean="0">
+                <a:latin typeface="Avenir 45 Book (Body)"/>
+              </a:rPr>
+              <a:t>Maintain a current build always available for testing, demos or deployment</a:t>
+            </a:r>
+          </a:p>
+          <a:p>
+            <a:pPr marL="0" lvl="1" indent="0">
+              <a:spcBef>
+                <a:spcPts val="1200"/>
+              </a:spcBef>
+              <a:buClrTx/>
+              <a:buFont typeface="Wingdings" panose="05000000000000000000" pitchFamily="2" charset="2"/>
+              <a:buChar char="§"/>
+            </a:pPr>
+            <a:r>
+              <a:rPr lang="en-GB" dirty="0" smtClean="0">
+                <a:latin typeface="Avenir 45 Book (Body)"/>
+              </a:rPr>
+              <a:t> Allow you to generate metrics of code quality, test coverage, etc.</a:t>
+            </a:r>
             <a:endParaRPr lang="en-GB" dirty="0">
               <a:latin typeface="Avenir 45 Book (Body)"/>
             </a:endParaRPr>
@@ -24077,7 +24753,7 @@
     </p:spTree>
     <p:extLst>
       <p:ext uri="{BB962C8B-B14F-4D97-AF65-F5344CB8AC3E}">
-        <p14:creationId xmlns:p14="http://schemas.microsoft.com/office/powerpoint/2010/main" val="2265722533"/>
+        <p14:creationId xmlns:p14="http://schemas.microsoft.com/office/powerpoint/2010/main" val="1925881899"/>
       </p:ext>
     </p:extLst>
   </p:cSld>
@@ -24716,6 +25392,446 @@
 </file>
 
 <file path=ppt/slides/slide30.xml><?xml version="1.0" encoding="utf-8"?>
+<p:sld xmlns:a="http://schemas.openxmlformats.org/drawingml/2006/main" xmlns:r="http://schemas.openxmlformats.org/officeDocument/2006/relationships" xmlns:p="http://schemas.openxmlformats.org/presentationml/2006/main">
+  <p:cSld>
+    <p:spTree>
+      <p:nvGrpSpPr>
+        <p:cNvPr id="1" name=""/>
+        <p:cNvGrpSpPr/>
+        <p:nvPr/>
+      </p:nvGrpSpPr>
+      <p:grpSpPr>
+        <a:xfrm>
+          <a:off x="0" y="0"/>
+          <a:ext cx="0" cy="0"/>
+          <a:chOff x="0" y="0"/>
+          <a:chExt cx="0" cy="0"/>
+        </a:xfrm>
+      </p:grpSpPr>
+      <p:sp>
+        <p:nvSpPr>
+          <p:cNvPr id="15" name="Rectangle 14"/>
+          <p:cNvSpPr/>
+          <p:nvPr/>
+        </p:nvSpPr>
+        <p:spPr>
+          <a:xfrm>
+            <a:off x="-13252" y="1"/>
+            <a:ext cx="12218504" cy="1016000"/>
+          </a:xfrm>
+          <a:prstGeom prst="rect">
+            <a:avLst/>
+          </a:prstGeom>
+          <a:solidFill>
+            <a:srgbClr val="FF9600"/>
+          </a:solidFill>
+          <a:ln>
+            <a:noFill/>
+          </a:ln>
+        </p:spPr>
+        <p:style>
+          <a:lnRef idx="1">
+            <a:schemeClr val="accent6"/>
+          </a:lnRef>
+          <a:fillRef idx="3">
+            <a:schemeClr val="accent6"/>
+          </a:fillRef>
+          <a:effectRef idx="2">
+            <a:schemeClr val="accent6"/>
+          </a:effectRef>
+          <a:fontRef idx="minor">
+            <a:schemeClr val="lt1"/>
+          </a:fontRef>
+        </p:style>
+        <p:txBody>
+          <a:bodyPr anchor="ctr"/>
+          <a:lstStyle/>
+          <a:p>
+            <a:pPr marL="0" marR="0" lvl="0" indent="0" algn="ctr" defTabSz="914400" eaLnBrk="1" fontAlgn="auto" latinLnBrk="0" hangingPunct="1">
+              <a:lnSpc>
+                <a:spcPct val="100000"/>
+              </a:lnSpc>
+              <a:spcBef>
+                <a:spcPts val="0"/>
+              </a:spcBef>
+              <a:spcAft>
+                <a:spcPts val="0"/>
+              </a:spcAft>
+              <a:buClrTx/>
+              <a:buSzTx/>
+              <a:buFontTx/>
+              <a:buNone/>
+              <a:tabLst/>
+              <a:defRPr/>
+            </a:pPr>
+            <a:r>
+              <a:rPr kumimoji="0" lang="es-ES_tradnl" sz="1800" b="0" i="0" u="none" strike="noStrike" kern="0" cap="none" spc="0" normalizeH="0" baseline="0" noProof="0" dirty="0" smtClean="0">
+                <a:ln>
+                  <a:noFill/>
+                </a:ln>
+                <a:solidFill>
+                  <a:srgbClr val="FFFFFF"/>
+                </a:solidFill>
+                <a:effectLst/>
+                <a:uLnTx/>
+                <a:uFillTx/>
+                <a:latin typeface="Arial"/>
+                <a:ea typeface="ＭＳ Ｐゴシック" pitchFamily="-108" charset="-128"/>
+                <a:cs typeface="+mn-cs"/>
+              </a:rPr>
+              <a:t>  </a:t>
+            </a:r>
+            <a:endParaRPr kumimoji="0" lang="es-ES_tradnl" sz="1800" b="0" i="0" u="none" strike="noStrike" kern="0" cap="none" spc="0" normalizeH="0" baseline="0" noProof="0" dirty="0">
+              <a:ln>
+                <a:noFill/>
+              </a:ln>
+              <a:solidFill>
+                <a:srgbClr val="FFFFFF"/>
+              </a:solidFill>
+              <a:effectLst/>
+              <a:uLnTx/>
+              <a:uFillTx/>
+              <a:latin typeface="Arial"/>
+              <a:ea typeface="ＭＳ Ｐゴシック" pitchFamily="-108" charset="-128"/>
+              <a:cs typeface="+mn-cs"/>
+            </a:endParaRPr>
+          </a:p>
+        </p:txBody>
+      </p:sp>
+      <p:sp>
+        <p:nvSpPr>
+          <p:cNvPr id="16" name="TextBox 15"/>
+          <p:cNvSpPr txBox="1"/>
+          <p:nvPr/>
+        </p:nvSpPr>
+        <p:spPr>
+          <a:xfrm>
+            <a:off x="515936" y="212035"/>
+            <a:ext cx="11676063" cy="553998"/>
+          </a:xfrm>
+          <a:prstGeom prst="rect">
+            <a:avLst/>
+          </a:prstGeom>
+          <a:noFill/>
+        </p:spPr>
+        <p:txBody>
+          <a:bodyPr wrap="square" lIns="0" tIns="0" rIns="0" bIns="0" rtlCol="0">
+            <a:spAutoFit/>
+          </a:bodyPr>
+          <a:lstStyle/>
+          <a:p>
+            <a:r>
+              <a:rPr lang="en-US" sz="3600" dirty="0" smtClean="0">
+                <a:solidFill>
+                  <a:schemeClr val="bg1"/>
+                </a:solidFill>
+              </a:rPr>
+              <a:t>Part III: Scenes of the next episode…</a:t>
+            </a:r>
+            <a:endParaRPr lang="es-AR" sz="3600" dirty="0">
+              <a:solidFill>
+                <a:schemeClr val="bg1"/>
+              </a:solidFill>
+            </a:endParaRPr>
+          </a:p>
+        </p:txBody>
+      </p:sp>
+      <p:sp>
+        <p:nvSpPr>
+          <p:cNvPr id="6" name="Content Placeholder 2"/>
+          <p:cNvSpPr txBox="1">
+            <a:spLocks/>
+          </p:cNvSpPr>
+          <p:nvPr/>
+        </p:nvSpPr>
+        <p:spPr>
+          <a:xfrm>
+            <a:off x="476534" y="1312325"/>
+            <a:ext cx="10987585" cy="4329621"/>
+          </a:xfrm>
+          <a:prstGeom prst="rect">
+            <a:avLst/>
+          </a:prstGeom>
+        </p:spPr>
+        <p:txBody>
+          <a:bodyPr vert="horz" lIns="91440" tIns="45720" rIns="91440" bIns="45720" rtlCol="0">
+            <a:noAutofit/>
+          </a:bodyPr>
+          <a:lstStyle>
+            <a:lvl1pPr marL="273050" marR="0" indent="-273050" algn="l" defTabSz="914400" rtl="0" eaLnBrk="1" fontAlgn="auto" latinLnBrk="0" hangingPunct="1">
+              <a:lnSpc>
+                <a:spcPct val="100000"/>
+              </a:lnSpc>
+              <a:spcBef>
+                <a:spcPts val="1200"/>
+              </a:spcBef>
+              <a:spcAft>
+                <a:spcPts val="0"/>
+              </a:spcAft>
+              <a:buClr>
+                <a:srgbClr val="DA1218"/>
+              </a:buClr>
+              <a:buSzTx/>
+              <a:buFont typeface="Wingdings" pitchFamily="2" charset="2"/>
+              <a:buChar char="§"/>
+              <a:tabLst/>
+              <a:defRPr lang="en-US" sz="2400" kern="1200">
+                <a:solidFill>
+                  <a:schemeClr val="tx1"/>
+                </a:solidFill>
+                <a:latin typeface="Arial" pitchFamily="34" charset="0"/>
+                <a:ea typeface="+mn-ea"/>
+                <a:cs typeface="Arial" pitchFamily="34" charset="0"/>
+              </a:defRPr>
+            </a:lvl1pPr>
+            <a:lvl2pPr marL="628650" marR="0" indent="-355600" algn="l" defTabSz="914400" rtl="0" eaLnBrk="1" fontAlgn="auto" latinLnBrk="0" hangingPunct="1">
+              <a:lnSpc>
+                <a:spcPct val="100000"/>
+              </a:lnSpc>
+              <a:spcBef>
+                <a:spcPct val="20000"/>
+              </a:spcBef>
+              <a:spcAft>
+                <a:spcPts val="0"/>
+              </a:spcAft>
+              <a:buClr>
+                <a:srgbClr val="DA1218"/>
+              </a:buClr>
+              <a:buSzTx/>
+              <a:buFont typeface="Wingdings" pitchFamily="2" charset="2"/>
+              <a:buChar char=""/>
+              <a:tabLst/>
+              <a:defRPr lang="en-US" sz="2000" kern="1200">
+                <a:solidFill>
+                  <a:schemeClr val="tx1"/>
+                </a:solidFill>
+                <a:latin typeface="Arial" pitchFamily="34" charset="0"/>
+                <a:ea typeface="+mn-ea"/>
+                <a:cs typeface="Arial" pitchFamily="34" charset="0"/>
+              </a:defRPr>
+            </a:lvl2pPr>
+            <a:lvl3pPr marL="903288" marR="0" indent="-274638" algn="l" defTabSz="914400" rtl="0" eaLnBrk="1" fontAlgn="auto" latinLnBrk="0" hangingPunct="1">
+              <a:lnSpc>
+                <a:spcPct val="100000"/>
+              </a:lnSpc>
+              <a:spcBef>
+                <a:spcPct val="20000"/>
+              </a:spcBef>
+              <a:spcAft>
+                <a:spcPts val="0"/>
+              </a:spcAft>
+              <a:buClr>
+                <a:srgbClr val="DA1218"/>
+              </a:buClr>
+              <a:buSzTx/>
+              <a:buFont typeface="Wingdings" pitchFamily="2" charset="2"/>
+              <a:buChar char="ü"/>
+              <a:tabLst/>
+              <a:defRPr lang="en-US" sz="1800" kern="1200">
+                <a:solidFill>
+                  <a:schemeClr val="tx1"/>
+                </a:solidFill>
+                <a:latin typeface="Arial" pitchFamily="34" charset="0"/>
+                <a:ea typeface="+mn-ea"/>
+                <a:cs typeface="Arial" pitchFamily="34" charset="0"/>
+              </a:defRPr>
+            </a:lvl3pPr>
+            <a:lvl4pPr marL="1081088" marR="0" indent="-177800" algn="l" defTabSz="914400" rtl="0" eaLnBrk="1" fontAlgn="auto" latinLnBrk="0" hangingPunct="1">
+              <a:lnSpc>
+                <a:spcPct val="100000"/>
+              </a:lnSpc>
+              <a:spcBef>
+                <a:spcPct val="20000"/>
+              </a:spcBef>
+              <a:spcAft>
+                <a:spcPts val="0"/>
+              </a:spcAft>
+              <a:buClr>
+                <a:srgbClr val="DA1218"/>
+              </a:buClr>
+              <a:buSzTx/>
+              <a:buFont typeface="Arial" pitchFamily="34" charset="0"/>
+              <a:buChar char="•"/>
+              <a:tabLst/>
+              <a:defRPr lang="en-US" sz="1600" kern="1200">
+                <a:solidFill>
+                  <a:schemeClr val="tx1"/>
+                </a:solidFill>
+                <a:latin typeface="Arial" pitchFamily="34" charset="0"/>
+                <a:ea typeface="+mn-ea"/>
+                <a:cs typeface="Arial" pitchFamily="34" charset="0"/>
+              </a:defRPr>
+            </a:lvl4pPr>
+            <a:lvl5pPr marL="1258888" marR="0" indent="-177800" algn="l" defTabSz="914400" rtl="0" eaLnBrk="1" fontAlgn="auto" latinLnBrk="0" hangingPunct="1">
+              <a:lnSpc>
+                <a:spcPct val="100000"/>
+              </a:lnSpc>
+              <a:spcBef>
+                <a:spcPct val="20000"/>
+              </a:spcBef>
+              <a:spcAft>
+                <a:spcPts val="0"/>
+              </a:spcAft>
+              <a:buClr>
+                <a:srgbClr val="DA1218"/>
+              </a:buClr>
+              <a:buSzPct val="100000"/>
+              <a:buFont typeface="Courier New" pitchFamily="49" charset="0"/>
+              <a:buChar char="o"/>
+              <a:tabLst/>
+              <a:defRPr lang="es-AR" sz="1400" kern="1200">
+                <a:solidFill>
+                  <a:schemeClr val="tx1"/>
+                </a:solidFill>
+                <a:latin typeface="Arial" pitchFamily="34" charset="0"/>
+                <a:ea typeface="+mn-ea"/>
+                <a:cs typeface="Arial" pitchFamily="34" charset="0"/>
+              </a:defRPr>
+            </a:lvl5pPr>
+            <a:lvl6pPr marL="2514600" indent="-228600" algn="l" defTabSz="914400" rtl="0" eaLnBrk="1" latinLnBrk="0" hangingPunct="1">
+              <a:spcBef>
+                <a:spcPct val="20000"/>
+              </a:spcBef>
+              <a:buFont typeface="Arial" pitchFamily="34" charset="0"/>
+              <a:buChar char="•"/>
+              <a:defRPr sz="2000" kern="1200">
+                <a:solidFill>
+                  <a:schemeClr val="tx1"/>
+                </a:solidFill>
+                <a:latin typeface="+mn-lt"/>
+                <a:ea typeface="+mn-ea"/>
+                <a:cs typeface="+mn-cs"/>
+              </a:defRPr>
+            </a:lvl6pPr>
+            <a:lvl7pPr marL="2971800" indent="-228600" algn="l" defTabSz="914400" rtl="0" eaLnBrk="1" latinLnBrk="0" hangingPunct="1">
+              <a:spcBef>
+                <a:spcPct val="20000"/>
+              </a:spcBef>
+              <a:buFont typeface="Arial" pitchFamily="34" charset="0"/>
+              <a:buChar char="•"/>
+              <a:defRPr sz="2000" kern="1200">
+                <a:solidFill>
+                  <a:schemeClr val="tx1"/>
+                </a:solidFill>
+                <a:latin typeface="+mn-lt"/>
+                <a:ea typeface="+mn-ea"/>
+                <a:cs typeface="+mn-cs"/>
+              </a:defRPr>
+            </a:lvl7pPr>
+            <a:lvl8pPr marL="3429000" indent="-228600" algn="l" defTabSz="914400" rtl="0" eaLnBrk="1" latinLnBrk="0" hangingPunct="1">
+              <a:spcBef>
+                <a:spcPct val="20000"/>
+              </a:spcBef>
+              <a:buFont typeface="Arial" pitchFamily="34" charset="0"/>
+              <a:buChar char="•"/>
+              <a:defRPr sz="2000" kern="1200">
+                <a:solidFill>
+                  <a:schemeClr val="tx1"/>
+                </a:solidFill>
+                <a:latin typeface="+mn-lt"/>
+                <a:ea typeface="+mn-ea"/>
+                <a:cs typeface="+mn-cs"/>
+              </a:defRPr>
+            </a:lvl8pPr>
+            <a:lvl9pPr marL="3886200" indent="-228600" algn="l" defTabSz="914400" rtl="0" eaLnBrk="1" latinLnBrk="0" hangingPunct="1">
+              <a:spcBef>
+                <a:spcPct val="20000"/>
+              </a:spcBef>
+              <a:buFont typeface="Arial" pitchFamily="34" charset="0"/>
+              <a:buChar char="•"/>
+              <a:defRPr sz="2000" kern="1200">
+                <a:solidFill>
+                  <a:schemeClr val="tx1"/>
+                </a:solidFill>
+                <a:latin typeface="+mn-lt"/>
+                <a:ea typeface="+mn-ea"/>
+                <a:cs typeface="+mn-cs"/>
+              </a:defRPr>
+            </a:lvl9pPr>
+          </a:lstStyle>
+          <a:p>
+            <a:pPr marL="0" lvl="1" indent="0">
+              <a:spcBef>
+                <a:spcPts val="1200"/>
+              </a:spcBef>
+              <a:buClrTx/>
+              <a:buFont typeface="Wingdings" panose="05000000000000000000" pitchFamily="2" charset="2"/>
+              <a:buChar char="§"/>
+            </a:pPr>
+            <a:r>
+              <a:rPr lang="en-GB" dirty="0" smtClean="0">
+                <a:latin typeface="Avenir 45 Book (Body)"/>
+              </a:rPr>
+              <a:t> No, it’s over, just kidding…</a:t>
+            </a:r>
+          </a:p>
+          <a:p>
+            <a:pPr marL="0" lvl="1" indent="0">
+              <a:spcBef>
+                <a:spcPts val="1200"/>
+              </a:spcBef>
+              <a:buClrTx/>
+              <a:buNone/>
+            </a:pPr>
+            <a:endParaRPr lang="en-GB" dirty="0">
+              <a:latin typeface="Avenir 45 Book (Body)"/>
+            </a:endParaRPr>
+          </a:p>
+          <a:p>
+            <a:pPr lvl="0" defTabSz="914363">
+              <a:lnSpc>
+                <a:spcPct val="90000"/>
+              </a:lnSpc>
+              <a:spcBef>
+                <a:spcPts val="0"/>
+              </a:spcBef>
+              <a:spcAft>
+                <a:spcPts val="400"/>
+              </a:spcAft>
+              <a:buClr>
+                <a:schemeClr val="tx1">
+                  <a:lumMod val="75000"/>
+                  <a:lumOff val="25000"/>
+                </a:schemeClr>
+              </a:buClr>
+              <a:buSzPct val="100000"/>
+              <a:buFont typeface="Wingdings" panose="05000000000000000000" pitchFamily="2" charset="2"/>
+              <a:buChar char="ä"/>
+            </a:pPr>
+            <a:endParaRPr lang="es-AR" sz="1600" b="1" dirty="0">
+              <a:solidFill>
+                <a:srgbClr val="000000"/>
+              </a:solidFill>
+              <a:latin typeface="Avenir 45 Book (Body)"/>
+              <a:cs typeface="+mn-cs"/>
+            </a:endParaRPr>
+          </a:p>
+        </p:txBody>
+      </p:sp>
+    </p:spTree>
+    <p:extLst>
+      <p:ext uri="{BB962C8B-B14F-4D97-AF65-F5344CB8AC3E}">
+        <p14:creationId xmlns:p14="http://schemas.microsoft.com/office/powerpoint/2010/main" val="2265722533"/>
+      </p:ext>
+    </p:extLst>
+  </p:cSld>
+  <p:clrMapOvr>
+    <a:masterClrMapping/>
+  </p:clrMapOvr>
+  <p:transition spd="slow">
+    <p:wipe/>
+  </p:transition>
+  <p:timing>
+    <p:tnLst>
+      <p:par>
+        <p:cTn id="1" dur="indefinite" restart="never" nodeType="tmRoot"/>
+      </p:par>
+    </p:tnLst>
+  </p:timing>
+</p:sld>
+</file>
+
+<file path=ppt/slides/slide31.xml><?xml version="1.0" encoding="utf-8"?>
 <p:sld xmlns:a="http://schemas.openxmlformats.org/drawingml/2006/main" xmlns:r="http://schemas.openxmlformats.org/officeDocument/2006/relationships" xmlns:p="http://schemas.openxmlformats.org/presentationml/2006/main">
   <p:cSld>
     <p:spTree>

</xml_diff>

<commit_message>
Enunciado + Cambios en Proyecto
</commit_message>
<xml_diff>
--- a/DesigningTestableApplications - Part II - DB Integration & Legacy Code.pptx
+++ b/DesigningTestableApplications - Part II - DB Integration & Legacy Code.pptx
@@ -6,10 +6,10 @@
     <p:sldMasterId id="2147483944" r:id="rId3"/>
   </p:sldMasterIdLst>
   <p:notesMasterIdLst>
-    <p:notesMasterId r:id="rId37"/>
+    <p:notesMasterId r:id="rId38"/>
   </p:notesMasterIdLst>
   <p:handoutMasterIdLst>
-    <p:handoutMasterId r:id="rId38"/>
+    <p:handoutMasterId r:id="rId39"/>
   </p:handoutMasterIdLst>
   <p:sldIdLst>
     <p:sldId id="321" r:id="rId4"/>
@@ -37,14 +37,15 @@
     <p:sldId id="390" r:id="rId26"/>
     <p:sldId id="407" r:id="rId27"/>
     <p:sldId id="389" r:id="rId28"/>
-    <p:sldId id="387" r:id="rId29"/>
-    <p:sldId id="383" r:id="rId30"/>
-    <p:sldId id="384" r:id="rId31"/>
-    <p:sldId id="378" r:id="rId32"/>
-    <p:sldId id="382" r:id="rId33"/>
-    <p:sldId id="386" r:id="rId34"/>
-    <p:sldId id="385" r:id="rId35"/>
-    <p:sldId id="349" r:id="rId36"/>
+    <p:sldId id="409" r:id="rId29"/>
+    <p:sldId id="387" r:id="rId30"/>
+    <p:sldId id="383" r:id="rId31"/>
+    <p:sldId id="384" r:id="rId32"/>
+    <p:sldId id="378" r:id="rId33"/>
+    <p:sldId id="382" r:id="rId34"/>
+    <p:sldId id="386" r:id="rId35"/>
+    <p:sldId id="385" r:id="rId36"/>
+    <p:sldId id="349" r:id="rId37"/>
   </p:sldIdLst>
   <p:sldSz cx="12192000" cy="6858000"/>
   <p:notesSz cx="6858000" cy="9144000"/>
@@ -257,7 +258,7 @@
           <a:p>
             <a:fld id="{D63D5444-F62C-42C3-A75A-D9DBA807730F}" type="datetimeFigureOut">
               <a:rPr lang="en-US" smtClean="0"/>
-              <a:t>10/20/2015</a:t>
+              <a:t>11/17/2015</a:t>
             </a:fld>
             <a:endParaRPr lang="en-US"/>
           </a:p>
@@ -422,7 +423,7 @@
           <a:p>
             <a:fld id="{12CAA1FA-7B6A-47D2-8D61-F225D71B51FF}" type="datetimeFigureOut">
               <a:rPr lang="en-US" smtClean="0"/>
-              <a:t>10/20/2015</a:t>
+              <a:t>11/17/2015</a:t>
             </a:fld>
             <a:endParaRPr lang="en-US"/>
           </a:p>
@@ -755,7 +756,7 @@
           <a:p>
             <a:fld id="{1B9A179D-2D27-49E2-B022-8EDDA2EFE682}" type="slidenum">
               <a:rPr lang="en-US" smtClean="0"/>
-              <a:t>30</a:t>
+              <a:t>31</a:t>
             </a:fld>
             <a:endParaRPr lang="en-US"/>
           </a:p>
@@ -839,7 +840,7 @@
           <a:p>
             <a:fld id="{1B9A179D-2D27-49E2-B022-8EDDA2EFE682}" type="slidenum">
               <a:rPr lang="en-US" smtClean="0"/>
-              <a:t>31</a:t>
+              <a:t>32</a:t>
             </a:fld>
             <a:endParaRPr lang="en-US"/>
           </a:p>
@@ -923,7 +924,7 @@
           <a:p>
             <a:fld id="{1B9A179D-2D27-49E2-B022-8EDDA2EFE682}" type="slidenum">
               <a:rPr lang="en-US" smtClean="0"/>
-              <a:t>32</a:t>
+              <a:t>33</a:t>
             </a:fld>
             <a:endParaRPr lang="en-US"/>
           </a:p>
@@ -17789,9 +17790,6 @@
               </a:rPr>
               <a:t>*</a:t>
             </a:r>
-            <a:endParaRPr lang="es-AR" sz="1800" dirty="0" smtClean="0">
-              <a:latin typeface="+mn-lt"/>
-            </a:endParaRPr>
           </a:p>
           <a:p>
             <a:pPr marL="641350" lvl="1" indent="-285750">
@@ -20777,17 +20775,7 @@
                 <a:latin typeface="+mn-lt"/>
                 <a:cs typeface="+mn-cs"/>
               </a:rPr>
-              <a:t>Has objects that cannot be easily </a:t>
-            </a:r>
-            <a:r>
-              <a:rPr lang="en-US" sz="1800" dirty="0" smtClean="0">
-                <a:solidFill>
-                  <a:srgbClr val="000000"/>
-                </a:solidFill>
-                <a:latin typeface="+mn-lt"/>
-                <a:cs typeface="+mn-cs"/>
-              </a:rPr>
-              <a:t>created</a:t>
+              <a:t>Has objects that cannot be easily created</a:t>
             </a:r>
           </a:p>
           <a:p>
@@ -24079,17 +24067,8 @@
               <a:rPr lang="en-GB" sz="2000" dirty="0" smtClean="0">
                 <a:latin typeface="+mn-lt"/>
               </a:rPr>
-              <a:t> Ensure tests properly test the expected application </a:t>
-            </a:r>
-            <a:r>
-              <a:rPr lang="en-GB" sz="2000" dirty="0" smtClean="0">
-                <a:latin typeface="+mn-lt"/>
-              </a:rPr>
-              <a:t>behaviour</a:t>
-            </a:r>
-            <a:endParaRPr lang="en-GB" sz="2000" dirty="0" smtClean="0">
-              <a:latin typeface="+mn-lt"/>
-            </a:endParaRPr>
+              <a:t> Ensure tests properly test the expected application behaviour</a:t>
+            </a:r>
           </a:p>
         </p:txBody>
       </p:sp>
@@ -24586,14 +24565,20 @@
               <a:buChar char="§"/>
             </a:pPr>
             <a:r>
-              <a:rPr lang="en-GB" sz="1600" dirty="0"/>
+              <a:rPr lang="en-GB" sz="1600" dirty="0">
+                <a:latin typeface="+mn-lt"/>
+              </a:rPr>
               <a:t>Identify hidden, dormant or undiscovered </a:t>
             </a:r>
             <a:r>
-              <a:rPr lang="en-GB" sz="1600" dirty="0" smtClean="0"/>
+              <a:rPr lang="en-GB" sz="1600" dirty="0" smtClean="0">
+                <a:latin typeface="+mn-lt"/>
+              </a:rPr>
               <a:t>bugs</a:t>
             </a:r>
-            <a:endParaRPr lang="en-US" sz="1600" dirty="0" smtClean="0"/>
+            <a:endParaRPr lang="en-US" sz="1600" dirty="0" smtClean="0">
+              <a:latin typeface="+mn-lt"/>
+            </a:endParaRPr>
           </a:p>
           <a:p>
             <a:pPr marL="641350" lvl="1" indent="-285750">
@@ -24602,15 +24587,21 @@
               <a:buChar char="§"/>
             </a:pPr>
             <a:r>
-              <a:rPr lang="en-US" sz="1600" dirty="0" smtClean="0"/>
+              <a:rPr lang="en-US" sz="1600" dirty="0" smtClean="0">
+                <a:latin typeface="+mn-lt"/>
+              </a:rPr>
               <a:t>Helps </a:t>
             </a:r>
             <a:r>
-              <a:rPr lang="en-US" sz="1600" dirty="0"/>
+              <a:rPr lang="en-US" sz="1600" dirty="0">
+                <a:latin typeface="+mn-lt"/>
+              </a:rPr>
               <a:t>identify improvement </a:t>
             </a:r>
             <a:r>
-              <a:rPr lang="en-US" sz="1600" dirty="0" smtClean="0"/>
+              <a:rPr lang="en-US" sz="1600" dirty="0" smtClean="0">
+                <a:latin typeface="+mn-lt"/>
+              </a:rPr>
               <a:t>opportunities</a:t>
             </a:r>
             <a:endParaRPr lang="en-GB" sz="1600" dirty="0" smtClean="0">
@@ -25870,19 +25861,7 @@
               <a:rPr lang="en-US" sz="1600" dirty="0" smtClean="0">
                 <a:cs typeface="Arial" pitchFamily="34" charset="0"/>
               </a:rPr>
-              <a:t>Find the place where you want to make the next change in order to add features </a:t>
-            </a:r>
-            <a:r>
-              <a:rPr lang="en-US" sz="1600" dirty="0" smtClean="0">
-                <a:cs typeface="Arial" pitchFamily="34" charset="0"/>
-              </a:rPr>
-              <a:t>or </a:t>
-            </a:r>
-            <a:r>
-              <a:rPr lang="en-US" sz="1600" dirty="0" smtClean="0">
-                <a:cs typeface="Arial" pitchFamily="34" charset="0"/>
-              </a:rPr>
-              <a:t>eliminate bugs</a:t>
+              <a:t>Find the place where you want to make the next change in order to add features or eliminate bugs</a:t>
             </a:r>
           </a:p>
           <a:p>
@@ -26302,6 +26281,789 @@
         </p:nvSpPr>
         <p:spPr>
           <a:xfrm>
+            <a:off x="515937" y="212035"/>
+            <a:ext cx="11013453" cy="553998"/>
+          </a:xfrm>
+          <a:prstGeom prst="rect">
+            <a:avLst/>
+          </a:prstGeom>
+          <a:noFill/>
+        </p:spPr>
+        <p:txBody>
+          <a:bodyPr wrap="square" lIns="0" tIns="0" rIns="0" bIns="0" rtlCol="0">
+            <a:spAutoFit/>
+          </a:bodyPr>
+          <a:lstStyle>
+            <a:defPPr>
+              <a:defRPr lang="en-US"/>
+            </a:defPPr>
+            <a:lvl1pPr>
+              <a:defRPr sz="3600">
+                <a:solidFill>
+                  <a:schemeClr val="bg1"/>
+                </a:solidFill>
+              </a:defRPr>
+            </a:lvl1pPr>
+          </a:lstStyle>
+          <a:p>
+            <a:r>
+              <a:rPr lang="en-US" dirty="0" smtClean="0"/>
+              <a:t>Coding time!</a:t>
+            </a:r>
+            <a:endParaRPr lang="en-US" dirty="0"/>
+          </a:p>
+        </p:txBody>
+      </p:sp>
+      <p:sp>
+        <p:nvSpPr>
+          <p:cNvPr id="5" name="Text Placeholder 1"/>
+          <p:cNvSpPr txBox="1">
+            <a:spLocks/>
+          </p:cNvSpPr>
+          <p:nvPr/>
+        </p:nvSpPr>
+        <p:spPr>
+          <a:xfrm>
+            <a:off x="465138" y="1117382"/>
+            <a:ext cx="11193462" cy="4710207"/>
+          </a:xfrm>
+          <a:prstGeom prst="rect">
+            <a:avLst/>
+          </a:prstGeom>
+        </p:spPr>
+        <p:txBody>
+          <a:bodyPr>
+            <a:noAutofit/>
+          </a:bodyPr>
+          <a:lstStyle>
+            <a:lvl1pPr marL="352425" indent="-352425" algn="l" defTabSz="914363" rtl="0" eaLnBrk="1" latinLnBrk="0" hangingPunct="1">
+              <a:lnSpc>
+                <a:spcPct val="90000"/>
+              </a:lnSpc>
+              <a:spcBef>
+                <a:spcPts val="0"/>
+              </a:spcBef>
+              <a:spcAft>
+                <a:spcPts val="400"/>
+              </a:spcAft>
+              <a:buClr>
+                <a:srgbClr val="C00000"/>
+              </a:buClr>
+              <a:buSzPct val="100000"/>
+              <a:buFont typeface="Wingdings" panose="05000000000000000000" pitchFamily="2" charset="2"/>
+              <a:buChar char="ì"/>
+              <a:defRPr lang="en-US" sz="2400" kern="1200">
+                <a:solidFill>
+                  <a:schemeClr val="tx1"/>
+                </a:solidFill>
+                <a:latin typeface="+mn-lt"/>
+                <a:ea typeface="+mn-ea"/>
+                <a:cs typeface="+mn-cs"/>
+              </a:defRPr>
+            </a:lvl1pPr>
+            <a:lvl2pPr marL="630238" indent="-271463" algn="l" defTabSz="914363" rtl="0" eaLnBrk="1" latinLnBrk="0" hangingPunct="1">
+              <a:lnSpc>
+                <a:spcPct val="90000"/>
+              </a:lnSpc>
+              <a:spcBef>
+                <a:spcPts val="0"/>
+              </a:spcBef>
+              <a:spcAft>
+                <a:spcPts val="400"/>
+              </a:spcAft>
+              <a:buClr>
+                <a:srgbClr val="C00000"/>
+              </a:buClr>
+              <a:buSzPct val="90000"/>
+              <a:buFont typeface="Wingdings" panose="05000000000000000000" pitchFamily="2" charset="2"/>
+              <a:buChar char=""/>
+              <a:tabLst>
+                <a:tab pos="630238" algn="l"/>
+              </a:tabLst>
+              <a:defRPr lang="en-US" sz="2000" kern="1200">
+                <a:solidFill>
+                  <a:schemeClr val="tx1"/>
+                </a:solidFill>
+                <a:latin typeface="+mn-lt"/>
+                <a:ea typeface="+mn-ea"/>
+                <a:cs typeface="+mn-cs"/>
+              </a:defRPr>
+            </a:lvl2pPr>
+            <a:lvl3pPr marL="803275" indent="-173038" algn="l" defTabSz="914363" rtl="0" eaLnBrk="1" latinLnBrk="0" hangingPunct="1">
+              <a:lnSpc>
+                <a:spcPct val="90000"/>
+              </a:lnSpc>
+              <a:spcBef>
+                <a:spcPts val="0"/>
+              </a:spcBef>
+              <a:spcAft>
+                <a:spcPts val="400"/>
+              </a:spcAft>
+              <a:buClr>
+                <a:srgbClr val="C00000"/>
+              </a:buClr>
+              <a:buSzPct val="90000"/>
+              <a:buFont typeface="Wingdings" panose="05000000000000000000" pitchFamily="2" charset="2"/>
+              <a:buChar char="§"/>
+              <a:defRPr lang="en-US" sz="1800" kern="1200">
+                <a:solidFill>
+                  <a:schemeClr val="tx1"/>
+                </a:solidFill>
+                <a:latin typeface="+mn-lt"/>
+                <a:ea typeface="+mn-ea"/>
+                <a:cs typeface="+mn-cs"/>
+              </a:defRPr>
+            </a:lvl3pPr>
+            <a:lvl4pPr marL="1074738" indent="-173038" algn="l" defTabSz="914363" rtl="0" eaLnBrk="1" latinLnBrk="0" hangingPunct="1">
+              <a:lnSpc>
+                <a:spcPct val="90000"/>
+              </a:lnSpc>
+              <a:spcBef>
+                <a:spcPts val="0"/>
+              </a:spcBef>
+              <a:spcAft>
+                <a:spcPts val="400"/>
+              </a:spcAft>
+              <a:buClr>
+                <a:srgbClr val="C00000"/>
+              </a:buClr>
+              <a:buSzPct val="90000"/>
+              <a:buFont typeface="Wingdings" panose="05000000000000000000" pitchFamily="2" charset="2"/>
+              <a:buChar char="ü"/>
+              <a:tabLst>
+                <a:tab pos="914400" algn="l"/>
+              </a:tabLst>
+              <a:defRPr lang="en-US" sz="1600" kern="1200">
+                <a:solidFill>
+                  <a:schemeClr val="tx1"/>
+                </a:solidFill>
+                <a:latin typeface="+mn-lt"/>
+                <a:ea typeface="+mn-ea"/>
+                <a:cs typeface="+mn-cs"/>
+              </a:defRPr>
+            </a:lvl4pPr>
+            <a:lvl5pPr marL="1346200" indent="-184150" algn="l" defTabSz="914363" rtl="0" eaLnBrk="1" latinLnBrk="0" hangingPunct="1">
+              <a:lnSpc>
+                <a:spcPct val="90000"/>
+              </a:lnSpc>
+              <a:spcBef>
+                <a:spcPts val="0"/>
+              </a:spcBef>
+              <a:spcAft>
+                <a:spcPts val="400"/>
+              </a:spcAft>
+              <a:buClr>
+                <a:srgbClr val="C00000"/>
+              </a:buClr>
+              <a:buSzPct val="90000"/>
+              <a:buFont typeface="Arial" pitchFamily="34" charset="0"/>
+              <a:buChar char="•"/>
+              <a:defRPr lang="en-US" sz="1600" kern="1200">
+                <a:solidFill>
+                  <a:schemeClr val="tx1"/>
+                </a:solidFill>
+                <a:latin typeface="+mn-lt"/>
+                <a:ea typeface="+mn-ea"/>
+                <a:cs typeface="+mn-cs"/>
+              </a:defRPr>
+            </a:lvl5pPr>
+            <a:lvl6pPr marL="2514499" indent="-228591" algn="l" defTabSz="914363" rtl="0" eaLnBrk="1" latinLnBrk="0" hangingPunct="1">
+              <a:spcBef>
+                <a:spcPct val="20000"/>
+              </a:spcBef>
+              <a:buFont typeface="Arial" pitchFamily="34" charset="0"/>
+              <a:buChar char="•"/>
+              <a:defRPr sz="2000" kern="1200">
+                <a:solidFill>
+                  <a:schemeClr val="tx1"/>
+                </a:solidFill>
+                <a:latin typeface="+mn-lt"/>
+                <a:ea typeface="+mn-ea"/>
+                <a:cs typeface="+mn-cs"/>
+              </a:defRPr>
+            </a:lvl6pPr>
+            <a:lvl7pPr marL="2971681" indent="-228591" algn="l" defTabSz="914363" rtl="0" eaLnBrk="1" latinLnBrk="0" hangingPunct="1">
+              <a:spcBef>
+                <a:spcPct val="20000"/>
+              </a:spcBef>
+              <a:buFont typeface="Arial" pitchFamily="34" charset="0"/>
+              <a:buChar char="•"/>
+              <a:defRPr sz="2000" kern="1200">
+                <a:solidFill>
+                  <a:schemeClr val="tx1"/>
+                </a:solidFill>
+                <a:latin typeface="+mn-lt"/>
+                <a:ea typeface="+mn-ea"/>
+                <a:cs typeface="+mn-cs"/>
+              </a:defRPr>
+            </a:lvl7pPr>
+            <a:lvl8pPr marL="3428863" indent="-228591" algn="l" defTabSz="914363" rtl="0" eaLnBrk="1" latinLnBrk="0" hangingPunct="1">
+              <a:spcBef>
+                <a:spcPct val="20000"/>
+              </a:spcBef>
+              <a:buFont typeface="Arial" pitchFamily="34" charset="0"/>
+              <a:buChar char="•"/>
+              <a:defRPr sz="2000" kern="1200">
+                <a:solidFill>
+                  <a:schemeClr val="tx1"/>
+                </a:solidFill>
+                <a:latin typeface="+mn-lt"/>
+                <a:ea typeface="+mn-ea"/>
+                <a:cs typeface="+mn-cs"/>
+              </a:defRPr>
+            </a:lvl8pPr>
+            <a:lvl9pPr marL="3886045" indent="-228591" algn="l" defTabSz="914363" rtl="0" eaLnBrk="1" latinLnBrk="0" hangingPunct="1">
+              <a:spcBef>
+                <a:spcPct val="20000"/>
+              </a:spcBef>
+              <a:buFont typeface="Arial" pitchFamily="34" charset="0"/>
+              <a:buChar char="•"/>
+              <a:defRPr sz="2000" kern="1200">
+                <a:solidFill>
+                  <a:schemeClr val="tx1"/>
+                </a:solidFill>
+                <a:latin typeface="+mn-lt"/>
+                <a:ea typeface="+mn-ea"/>
+                <a:cs typeface="+mn-cs"/>
+              </a:defRPr>
+            </a:lvl9pPr>
+          </a:lstStyle>
+          <a:p>
+            <a:pPr defTabSz="914400">
+              <a:lnSpc>
+                <a:spcPct val="100000"/>
+              </a:lnSpc>
+              <a:spcBef>
+                <a:spcPts val="1200"/>
+              </a:spcBef>
+              <a:spcAft>
+                <a:spcPts val="0"/>
+              </a:spcAft>
+              <a:buClrTx/>
+              <a:buSzTx/>
+              <a:buFont typeface="Wingdings" panose="05000000000000000000" pitchFamily="2" charset="2"/>
+              <a:buChar char="§"/>
+            </a:pPr>
+            <a:r>
+              <a:rPr lang="es-AR" sz="2000" dirty="0" smtClean="0">
+                <a:cs typeface="Arial" pitchFamily="34" charset="0"/>
+              </a:rPr>
+              <a:t>Enunciado </a:t>
+            </a:r>
+            <a:r>
+              <a:rPr lang="es-AR" sz="1600" dirty="0" smtClean="0">
+                <a:cs typeface="Arial" pitchFamily="34" charset="0"/>
+              </a:rPr>
+              <a:t>(</a:t>
+            </a:r>
+            <a:r>
+              <a:rPr lang="es-AR" sz="1600" dirty="0" err="1" smtClean="0">
+                <a:cs typeface="Arial" pitchFamily="34" charset="0"/>
+              </a:rPr>
+              <a:t>oops</a:t>
+            </a:r>
+            <a:r>
+              <a:rPr lang="es-AR" sz="1600" dirty="0" smtClean="0">
+                <a:cs typeface="Arial" pitchFamily="34" charset="0"/>
+              </a:rPr>
+              <a:t>, </a:t>
+            </a:r>
+            <a:r>
+              <a:rPr lang="es-AR" sz="1600" dirty="0" err="1" smtClean="0">
+                <a:cs typeface="Arial" pitchFamily="34" charset="0"/>
+              </a:rPr>
+              <a:t>we</a:t>
+            </a:r>
+            <a:r>
+              <a:rPr lang="es-AR" sz="1600" dirty="0" smtClean="0">
+                <a:cs typeface="Arial" pitchFamily="34" charset="0"/>
+              </a:rPr>
+              <a:t> </a:t>
+            </a:r>
+            <a:r>
+              <a:rPr lang="es-AR" sz="1600" dirty="0" err="1" smtClean="0">
+                <a:cs typeface="Arial" pitchFamily="34" charset="0"/>
+              </a:rPr>
+              <a:t>got</a:t>
+            </a:r>
+            <a:r>
+              <a:rPr lang="es-AR" sz="1600" dirty="0" smtClean="0">
+                <a:cs typeface="Arial" pitchFamily="34" charset="0"/>
+              </a:rPr>
+              <a:t> </a:t>
+            </a:r>
+            <a:r>
+              <a:rPr lang="es-AR" sz="1600" dirty="0" err="1" smtClean="0">
+                <a:cs typeface="Arial" pitchFamily="34" charset="0"/>
+              </a:rPr>
+              <a:t>the</a:t>
+            </a:r>
+            <a:r>
+              <a:rPr lang="es-AR" sz="1600" dirty="0" smtClean="0">
+                <a:cs typeface="Arial" pitchFamily="34" charset="0"/>
+              </a:rPr>
+              <a:t> </a:t>
+            </a:r>
+            <a:r>
+              <a:rPr lang="es-AR" sz="1600" dirty="0" err="1" smtClean="0">
+                <a:cs typeface="Arial" pitchFamily="34" charset="0"/>
+              </a:rPr>
+              <a:t>language</a:t>
+            </a:r>
+            <a:r>
+              <a:rPr lang="es-AR" sz="1600" dirty="0" smtClean="0">
+                <a:cs typeface="Arial" pitchFamily="34" charset="0"/>
+              </a:rPr>
+              <a:t> </a:t>
+            </a:r>
+            <a:r>
+              <a:rPr lang="es-AR" sz="1600" dirty="0" err="1" smtClean="0">
+                <a:cs typeface="Arial" pitchFamily="34" charset="0"/>
+              </a:rPr>
+              <a:t>wrong</a:t>
+            </a:r>
+            <a:r>
+              <a:rPr lang="es-AR" sz="1600" dirty="0" smtClean="0">
+                <a:cs typeface="Arial" pitchFamily="34" charset="0"/>
+              </a:rPr>
+              <a:t>!)</a:t>
+            </a:r>
+          </a:p>
+          <a:p>
+            <a:pPr lvl="1" defTabSz="914400">
+              <a:lnSpc>
+                <a:spcPct val="100000"/>
+              </a:lnSpc>
+              <a:spcBef>
+                <a:spcPts val="1200"/>
+              </a:spcBef>
+              <a:spcAft>
+                <a:spcPts val="0"/>
+              </a:spcAft>
+              <a:buClrTx/>
+              <a:buSzTx/>
+              <a:buFont typeface="Wingdings" panose="05000000000000000000" pitchFamily="2" charset="2"/>
+              <a:buChar char="§"/>
+            </a:pPr>
+            <a:r>
+              <a:rPr lang="es-AR" sz="1600" dirty="0" smtClean="0">
+                <a:cs typeface="Arial" pitchFamily="34" charset="0"/>
+              </a:rPr>
+              <a:t>Como la empresa está festejando su 10° aniversario, los directivos decidieron ofrecer una promoción especial.</a:t>
+            </a:r>
+          </a:p>
+          <a:p>
+            <a:pPr lvl="1" defTabSz="914400">
+              <a:lnSpc>
+                <a:spcPct val="100000"/>
+              </a:lnSpc>
+              <a:spcBef>
+                <a:spcPts val="1200"/>
+              </a:spcBef>
+              <a:spcAft>
+                <a:spcPts val="0"/>
+              </a:spcAft>
+              <a:buClrTx/>
+              <a:buSzTx/>
+              <a:buFont typeface="Wingdings" panose="05000000000000000000" pitchFamily="2" charset="2"/>
+              <a:buChar char="§"/>
+            </a:pPr>
+            <a:r>
+              <a:rPr lang="es-AR" sz="1600" dirty="0" smtClean="0">
+                <a:cs typeface="Arial" pitchFamily="34" charset="0"/>
+              </a:rPr>
+              <a:t>Los clientes que compren frecuentemente serán beneficiados a partir de un esquema de puntos obtenidos mediante cada compra, con los que podrán acceder a beneficios desopilantes.</a:t>
+            </a:r>
+          </a:p>
+          <a:p>
+            <a:pPr lvl="1" defTabSz="914400">
+              <a:lnSpc>
+                <a:spcPct val="100000"/>
+              </a:lnSpc>
+              <a:spcBef>
+                <a:spcPts val="1200"/>
+              </a:spcBef>
+              <a:spcAft>
+                <a:spcPts val="0"/>
+              </a:spcAft>
+              <a:buClrTx/>
+              <a:buSzTx/>
+              <a:buFont typeface="Wingdings" panose="05000000000000000000" pitchFamily="2" charset="2"/>
+              <a:buChar char="§"/>
+            </a:pPr>
+            <a:r>
+              <a:rPr lang="es-AR" sz="1600" dirty="0" smtClean="0">
+                <a:cs typeface="Arial" pitchFamily="34" charset="0"/>
+              </a:rPr>
+              <a:t>Los puntos se otorgarán según los siguientes rangos:</a:t>
+            </a:r>
+          </a:p>
+          <a:p>
+            <a:pPr lvl="2" defTabSz="914400">
+              <a:lnSpc>
+                <a:spcPct val="100000"/>
+              </a:lnSpc>
+              <a:spcBef>
+                <a:spcPts val="1200"/>
+              </a:spcBef>
+              <a:spcAft>
+                <a:spcPts val="0"/>
+              </a:spcAft>
+              <a:buClrTx/>
+              <a:buSzTx/>
+            </a:pPr>
+            <a:r>
+              <a:rPr lang="es-AR" sz="1400" dirty="0" smtClean="0">
+                <a:cs typeface="Arial" pitchFamily="34" charset="0"/>
+              </a:rPr>
+              <a:t>Compra entre $1 y $4999: Puntos otorgados = Monto Compra * 1</a:t>
+            </a:r>
+          </a:p>
+          <a:p>
+            <a:pPr lvl="2" defTabSz="914400">
+              <a:lnSpc>
+                <a:spcPct val="100000"/>
+              </a:lnSpc>
+              <a:spcBef>
+                <a:spcPts val="1200"/>
+              </a:spcBef>
+              <a:spcAft>
+                <a:spcPts val="0"/>
+              </a:spcAft>
+              <a:buClrTx/>
+              <a:buSzTx/>
+            </a:pPr>
+            <a:r>
+              <a:rPr lang="es-AR" sz="1400" dirty="0" smtClean="0">
+                <a:cs typeface="Arial" pitchFamily="34" charset="0"/>
+              </a:rPr>
+              <a:t>Compra entre $5000 y $9999: Puntos otorgados = Monto Compra * 2</a:t>
+            </a:r>
+          </a:p>
+          <a:p>
+            <a:pPr lvl="2" defTabSz="914400">
+              <a:lnSpc>
+                <a:spcPct val="100000"/>
+              </a:lnSpc>
+              <a:spcBef>
+                <a:spcPts val="1200"/>
+              </a:spcBef>
+              <a:spcAft>
+                <a:spcPts val="0"/>
+              </a:spcAft>
+              <a:buClrTx/>
+              <a:buSzTx/>
+            </a:pPr>
+            <a:r>
+              <a:rPr lang="es-AR" sz="1400" dirty="0" smtClean="0">
+                <a:cs typeface="Arial" pitchFamily="34" charset="0"/>
+              </a:rPr>
+              <a:t>Compra entre $10000 y $19999: Puntos otorgados = Monto Compra * 3</a:t>
+            </a:r>
+          </a:p>
+          <a:p>
+            <a:pPr lvl="2" defTabSz="914400">
+              <a:lnSpc>
+                <a:spcPct val="100000"/>
+              </a:lnSpc>
+              <a:spcBef>
+                <a:spcPts val="1200"/>
+              </a:spcBef>
+              <a:spcAft>
+                <a:spcPts val="0"/>
+              </a:spcAft>
+              <a:buClrTx/>
+              <a:buSzTx/>
+            </a:pPr>
+            <a:r>
+              <a:rPr lang="es-AR" sz="1400" dirty="0" smtClean="0">
+                <a:cs typeface="Arial" pitchFamily="34" charset="0"/>
+              </a:rPr>
+              <a:t>Compra mayor a $20000: Puntos otorgados = Monto Compra * 4</a:t>
+            </a:r>
+          </a:p>
+          <a:p>
+            <a:pPr defTabSz="914400">
+              <a:lnSpc>
+                <a:spcPct val="100000"/>
+              </a:lnSpc>
+              <a:spcBef>
+                <a:spcPts val="1200"/>
+              </a:spcBef>
+              <a:spcAft>
+                <a:spcPts val="0"/>
+              </a:spcAft>
+              <a:buClrTx/>
+              <a:buSzTx/>
+              <a:buFont typeface="Wingdings" panose="05000000000000000000" pitchFamily="2" charset="2"/>
+              <a:buChar char="§"/>
+            </a:pPr>
+            <a:r>
+              <a:rPr lang="es-AR" sz="2000" dirty="0" smtClean="0">
+                <a:cs typeface="Arial" pitchFamily="34" charset="0"/>
+              </a:rPr>
+              <a:t>Objetivo</a:t>
+            </a:r>
+          </a:p>
+          <a:p>
+            <a:pPr lvl="1" defTabSz="914400">
+              <a:lnSpc>
+                <a:spcPct val="100000"/>
+              </a:lnSpc>
+              <a:spcBef>
+                <a:spcPts val="1200"/>
+              </a:spcBef>
+              <a:spcAft>
+                <a:spcPts val="0"/>
+              </a:spcAft>
+              <a:buClrTx/>
+              <a:buSzTx/>
+              <a:buFont typeface="Wingdings" panose="05000000000000000000" pitchFamily="2" charset="2"/>
+              <a:buChar char="§"/>
+            </a:pPr>
+            <a:r>
+              <a:rPr lang="es-AR" sz="1600" dirty="0" smtClean="0">
+                <a:cs typeface="Arial" pitchFamily="34" charset="0"/>
+              </a:rPr>
+              <a:t>Implementar los nuevos requerimientos de negocio, asegurando mediante </a:t>
+            </a:r>
+            <a:r>
+              <a:rPr lang="es-AR" sz="1600" dirty="0" err="1" smtClean="0">
+                <a:cs typeface="Arial" pitchFamily="34" charset="0"/>
+              </a:rPr>
+              <a:t>tests</a:t>
+            </a:r>
+            <a:r>
+              <a:rPr lang="es-AR" sz="1600" dirty="0" smtClean="0">
+                <a:cs typeface="Arial" pitchFamily="34" charset="0"/>
+              </a:rPr>
+              <a:t> unitarios, que se cumplan adecuadamente y que no se vea afectada la funcionalidad actual de la aplicación.</a:t>
+            </a:r>
+          </a:p>
+          <a:p>
+            <a:pPr lvl="1" defTabSz="914400">
+              <a:lnSpc>
+                <a:spcPct val="100000"/>
+              </a:lnSpc>
+              <a:spcBef>
+                <a:spcPts val="1200"/>
+              </a:spcBef>
+              <a:spcAft>
+                <a:spcPts val="0"/>
+              </a:spcAft>
+              <a:buClrTx/>
+              <a:buSzTx/>
+              <a:buFont typeface="Wingdings" panose="05000000000000000000" pitchFamily="2" charset="2"/>
+              <a:buChar char="§"/>
+            </a:pPr>
+            <a:r>
+              <a:rPr lang="es-AR" sz="1600" dirty="0" smtClean="0">
+                <a:cs typeface="Arial" pitchFamily="34" charset="0"/>
+              </a:rPr>
+              <a:t>Los </a:t>
+            </a:r>
+            <a:r>
+              <a:rPr lang="es-AR" sz="1600" dirty="0" err="1" smtClean="0">
+                <a:cs typeface="Arial" pitchFamily="34" charset="0"/>
+              </a:rPr>
+              <a:t>tests</a:t>
+            </a:r>
+            <a:r>
+              <a:rPr lang="es-AR" sz="1600" dirty="0" smtClean="0">
+                <a:cs typeface="Arial" pitchFamily="34" charset="0"/>
+              </a:rPr>
+              <a:t> de integración que ya tiene la aplicación deben seguir ejecutando exitosamente.</a:t>
+            </a:r>
+          </a:p>
+          <a:p>
+            <a:pPr lvl="1" defTabSz="914400">
+              <a:lnSpc>
+                <a:spcPct val="100000"/>
+              </a:lnSpc>
+              <a:spcBef>
+                <a:spcPts val="1200"/>
+              </a:spcBef>
+              <a:spcAft>
+                <a:spcPts val="0"/>
+              </a:spcAft>
+              <a:buClrTx/>
+              <a:buSzTx/>
+              <a:buFont typeface="Wingdings" panose="05000000000000000000" pitchFamily="2" charset="2"/>
+              <a:buChar char="§"/>
+            </a:pPr>
+            <a:r>
+              <a:rPr lang="es-AR" sz="1600" dirty="0" smtClean="0">
+                <a:cs typeface="Arial" pitchFamily="34" charset="0"/>
+              </a:rPr>
+              <a:t>Se permite (y recomienda!) hacer todos los cambios que sean necesarios para que </a:t>
+            </a:r>
+            <a:br>
+              <a:rPr lang="es-AR" sz="1600" dirty="0" smtClean="0">
+                <a:cs typeface="Arial" pitchFamily="34" charset="0"/>
+              </a:rPr>
+            </a:br>
+            <a:r>
+              <a:rPr lang="es-AR" sz="1600" dirty="0" smtClean="0">
+                <a:cs typeface="Arial" pitchFamily="34" charset="0"/>
+              </a:rPr>
+              <a:t>la aplicación sea </a:t>
+            </a:r>
+            <a:r>
+              <a:rPr lang="es-AR" sz="1600" dirty="0" err="1" smtClean="0">
+                <a:cs typeface="Arial" pitchFamily="34" charset="0"/>
+              </a:rPr>
+              <a:t>testeable</a:t>
+            </a:r>
+            <a:r>
+              <a:rPr lang="es-AR" sz="1600" dirty="0" smtClean="0">
+                <a:cs typeface="Arial" pitchFamily="34" charset="0"/>
+              </a:rPr>
+              <a:t>.</a:t>
+            </a:r>
+            <a:endParaRPr lang="es-AR" sz="1600" dirty="0">
+              <a:cs typeface="Arial" pitchFamily="34" charset="0"/>
+            </a:endParaRPr>
+          </a:p>
+        </p:txBody>
+      </p:sp>
+    </p:spTree>
+    <p:extLst>
+      <p:ext uri="{BB962C8B-B14F-4D97-AF65-F5344CB8AC3E}">
+        <p14:creationId xmlns:p14="http://schemas.microsoft.com/office/powerpoint/2010/main" val="3113440951"/>
+      </p:ext>
+    </p:extLst>
+  </p:cSld>
+  <p:clrMapOvr>
+    <a:masterClrMapping/>
+  </p:clrMapOvr>
+  <p:transition spd="slow">
+    <p:wipe/>
+  </p:transition>
+  <p:timing>
+    <p:tnLst>
+      <p:par>
+        <p:cTn id="1" dur="indefinite" restart="never" nodeType="tmRoot"/>
+      </p:par>
+    </p:tnLst>
+  </p:timing>
+</p:sld>
+</file>
+
+<file path=ppt/slides/slide27.xml><?xml version="1.0" encoding="utf-8"?>
+<p:sld xmlns:a="http://schemas.openxmlformats.org/drawingml/2006/main" xmlns:r="http://schemas.openxmlformats.org/officeDocument/2006/relationships" xmlns:p="http://schemas.openxmlformats.org/presentationml/2006/main">
+  <p:cSld>
+    <p:spTree>
+      <p:nvGrpSpPr>
+        <p:cNvPr id="1" name=""/>
+        <p:cNvGrpSpPr/>
+        <p:nvPr/>
+      </p:nvGrpSpPr>
+      <p:grpSpPr>
+        <a:xfrm>
+          <a:off x="0" y="0"/>
+          <a:ext cx="0" cy="0"/>
+          <a:chOff x="0" y="0"/>
+          <a:chExt cx="0" cy="0"/>
+        </a:xfrm>
+      </p:grpSpPr>
+      <p:sp>
+        <p:nvSpPr>
+          <p:cNvPr id="15" name="Rectangle 14"/>
+          <p:cNvSpPr/>
+          <p:nvPr/>
+        </p:nvSpPr>
+        <p:spPr>
+          <a:xfrm>
+            <a:off x="-13252" y="1"/>
+            <a:ext cx="12218504" cy="1016000"/>
+          </a:xfrm>
+          <a:prstGeom prst="rect">
+            <a:avLst/>
+          </a:prstGeom>
+          <a:solidFill>
+            <a:srgbClr val="FF9600"/>
+          </a:solidFill>
+          <a:ln>
+            <a:noFill/>
+          </a:ln>
+        </p:spPr>
+        <p:style>
+          <a:lnRef idx="1">
+            <a:schemeClr val="accent6"/>
+          </a:lnRef>
+          <a:fillRef idx="3">
+            <a:schemeClr val="accent6"/>
+          </a:fillRef>
+          <a:effectRef idx="2">
+            <a:schemeClr val="accent6"/>
+          </a:effectRef>
+          <a:fontRef idx="minor">
+            <a:schemeClr val="lt1"/>
+          </a:fontRef>
+        </p:style>
+        <p:txBody>
+          <a:bodyPr anchor="ctr"/>
+          <a:lstStyle/>
+          <a:p>
+            <a:pPr marL="0" marR="0" lvl="0" indent="0" algn="ctr" defTabSz="914400" eaLnBrk="1" fontAlgn="auto" latinLnBrk="0" hangingPunct="1">
+              <a:lnSpc>
+                <a:spcPct val="100000"/>
+              </a:lnSpc>
+              <a:spcBef>
+                <a:spcPts val="0"/>
+              </a:spcBef>
+              <a:spcAft>
+                <a:spcPts val="0"/>
+              </a:spcAft>
+              <a:buClrTx/>
+              <a:buSzTx/>
+              <a:buFontTx/>
+              <a:buNone/>
+              <a:tabLst/>
+              <a:defRPr/>
+            </a:pPr>
+            <a:r>
+              <a:rPr kumimoji="0" lang="es-ES_tradnl" sz="1800" b="0" i="0" u="none" strike="noStrike" kern="0" cap="none" spc="0" normalizeH="0" baseline="0" noProof="0" dirty="0" smtClean="0">
+                <a:ln>
+                  <a:noFill/>
+                </a:ln>
+                <a:solidFill>
+                  <a:srgbClr val="FFFFFF"/>
+                </a:solidFill>
+                <a:effectLst/>
+                <a:uLnTx/>
+                <a:uFillTx/>
+                <a:latin typeface="Arial"/>
+                <a:ea typeface="ＭＳ Ｐゴシック" pitchFamily="-108" charset="-128"/>
+                <a:cs typeface="+mn-cs"/>
+              </a:rPr>
+              <a:t>  </a:t>
+            </a:r>
+            <a:endParaRPr kumimoji="0" lang="es-ES_tradnl" sz="1800" b="0" i="0" u="none" strike="noStrike" kern="0" cap="none" spc="0" normalizeH="0" baseline="0" noProof="0" dirty="0">
+              <a:ln>
+                <a:noFill/>
+              </a:ln>
+              <a:solidFill>
+                <a:srgbClr val="FFFFFF"/>
+              </a:solidFill>
+              <a:effectLst/>
+              <a:uLnTx/>
+              <a:uFillTx/>
+              <a:latin typeface="Arial"/>
+              <a:ea typeface="ＭＳ Ｐゴシック" pitchFamily="-108" charset="-128"/>
+              <a:cs typeface="+mn-cs"/>
+            </a:endParaRPr>
+          </a:p>
+        </p:txBody>
+      </p:sp>
+      <p:sp>
+        <p:nvSpPr>
+          <p:cNvPr id="16" name="TextBox 15"/>
+          <p:cNvSpPr txBox="1"/>
+          <p:nvPr/>
+        </p:nvSpPr>
+        <p:spPr>
+          <a:xfrm>
             <a:off x="515936" y="212035"/>
             <a:ext cx="11676063" cy="553998"/>
           </a:xfrm>
@@ -26638,7 +27400,7 @@
 </p:sld>
 </file>
 
-<file path=ppt/slides/slide27.xml><?xml version="1.0" encoding="utf-8"?>
+<file path=ppt/slides/slide28.xml><?xml version="1.0" encoding="utf-8"?>
 <p:sld xmlns:a="http://schemas.openxmlformats.org/drawingml/2006/main" xmlns:r="http://schemas.openxmlformats.org/officeDocument/2006/relationships" xmlns:p="http://schemas.openxmlformats.org/presentationml/2006/main">
   <p:cSld>
     <p:spTree>
@@ -26701,7 +27463,7 @@
 </p:sld>
 </file>
 
-<file path=ppt/slides/slide28.xml><?xml version="1.0" encoding="utf-8"?>
+<file path=ppt/slides/slide29.xml><?xml version="1.0" encoding="utf-8"?>
 <p:sld xmlns:a="http://schemas.openxmlformats.org/drawingml/2006/main" xmlns:r="http://schemas.openxmlformats.org/officeDocument/2006/relationships" xmlns:p="http://schemas.openxmlformats.org/presentationml/2006/main">
   <p:cSld>
     <p:spTree>
@@ -27162,69 +27924,6 @@
     <p:extLst>
       <p:ext uri="{BB962C8B-B14F-4D97-AF65-F5344CB8AC3E}">
         <p14:creationId xmlns:p14="http://schemas.microsoft.com/office/powerpoint/2010/main" val="4101275204"/>
-      </p:ext>
-    </p:extLst>
-  </p:cSld>
-  <p:clrMapOvr>
-    <a:masterClrMapping/>
-  </p:clrMapOvr>
-  <p:transition spd="slow">
-    <p:wipe/>
-  </p:transition>
-  <p:timing>
-    <p:tnLst>
-      <p:par>
-        <p:cTn id="1" dur="indefinite" restart="never" nodeType="tmRoot"/>
-      </p:par>
-    </p:tnLst>
-  </p:timing>
-</p:sld>
-</file>
-
-<file path=ppt/slides/slide29.xml><?xml version="1.0" encoding="utf-8"?>
-<p:sld xmlns:a="http://schemas.openxmlformats.org/drawingml/2006/main" xmlns:r="http://schemas.openxmlformats.org/officeDocument/2006/relationships" xmlns:p="http://schemas.openxmlformats.org/presentationml/2006/main">
-  <p:cSld>
-    <p:spTree>
-      <p:nvGrpSpPr>
-        <p:cNvPr id="1" name=""/>
-        <p:cNvGrpSpPr/>
-        <p:nvPr/>
-      </p:nvGrpSpPr>
-      <p:grpSpPr>
-        <a:xfrm>
-          <a:off x="0" y="0"/>
-          <a:ext cx="0" cy="0"/>
-          <a:chOff x="0" y="0"/>
-          <a:chExt cx="0" cy="0"/>
-        </a:xfrm>
-      </p:grpSpPr>
-      <p:sp>
-        <p:nvSpPr>
-          <p:cNvPr id="4" name="Title 3"/>
-          <p:cNvSpPr>
-            <a:spLocks noGrp="1"/>
-          </p:cNvSpPr>
-          <p:nvPr>
-            <p:ph type="ctrTitle"/>
-          </p:nvPr>
-        </p:nvSpPr>
-        <p:spPr/>
-        <p:txBody>
-          <a:bodyPr/>
-          <a:lstStyle/>
-          <a:p>
-            <a:r>
-              <a:rPr lang="es-AR" dirty="0" err="1" smtClean="0"/>
-              <a:t>Summary</a:t>
-            </a:r>
-            <a:endParaRPr lang="es-AR" dirty="0"/>
-          </a:p>
-        </p:txBody>
-      </p:sp>
-    </p:spTree>
-    <p:extLst>
-      <p:ext uri="{BB962C8B-B14F-4D97-AF65-F5344CB8AC3E}">
-        <p14:creationId xmlns:p14="http://schemas.microsoft.com/office/powerpoint/2010/main" val="689075145"/>
       </p:ext>
     </p:extLst>
   </p:cSld>
@@ -27873,519 +28572,31 @@
       </p:grpSpPr>
       <p:sp>
         <p:nvSpPr>
-          <p:cNvPr id="15" name="Rectangle 14"/>
-          <p:cNvSpPr/>
-          <p:nvPr/>
+          <p:cNvPr id="4" name="Title 3"/>
+          <p:cNvSpPr>
+            <a:spLocks noGrp="1"/>
+          </p:cNvSpPr>
+          <p:nvPr>
+            <p:ph type="ctrTitle"/>
+          </p:nvPr>
         </p:nvSpPr>
-        <p:spPr>
-          <a:xfrm>
-            <a:off x="-13252" y="1"/>
-            <a:ext cx="12218504" cy="1016000"/>
-          </a:xfrm>
-          <a:prstGeom prst="rect">
-            <a:avLst/>
-          </a:prstGeom>
-          <a:solidFill>
-            <a:srgbClr val="FF9600"/>
-          </a:solidFill>
-          <a:ln>
-            <a:noFill/>
-          </a:ln>
-        </p:spPr>
-        <p:style>
-          <a:lnRef idx="1">
-            <a:schemeClr val="accent6"/>
-          </a:lnRef>
-          <a:fillRef idx="3">
-            <a:schemeClr val="accent6"/>
-          </a:fillRef>
-          <a:effectRef idx="2">
-            <a:schemeClr val="accent6"/>
-          </a:effectRef>
-          <a:fontRef idx="minor">
-            <a:schemeClr val="lt1"/>
-          </a:fontRef>
-        </p:style>
+        <p:spPr/>
         <p:txBody>
-          <a:bodyPr anchor="ctr"/>
+          <a:bodyPr/>
           <a:lstStyle/>
           <a:p>
-            <a:pPr marL="0" marR="0" lvl="0" indent="0" algn="ctr" defTabSz="914400" eaLnBrk="1" fontAlgn="auto" latinLnBrk="0" hangingPunct="1">
-              <a:lnSpc>
-                <a:spcPct val="100000"/>
-              </a:lnSpc>
-              <a:spcBef>
-                <a:spcPts val="0"/>
-              </a:spcBef>
-              <a:spcAft>
-                <a:spcPts val="0"/>
-              </a:spcAft>
-              <a:buClrTx/>
-              <a:buSzTx/>
-              <a:buFontTx/>
-              <a:buNone/>
-              <a:tabLst/>
-              <a:defRPr/>
-            </a:pPr>
-            <a:r>
-              <a:rPr kumimoji="0" lang="es-ES_tradnl" sz="1800" b="0" i="0" u="none" strike="noStrike" kern="0" cap="none" spc="0" normalizeH="0" baseline="0" noProof="0" dirty="0" smtClean="0">
-                <a:ln>
-                  <a:noFill/>
-                </a:ln>
-                <a:solidFill>
-                  <a:srgbClr val="FFFFFF"/>
-                </a:solidFill>
-                <a:effectLst/>
-                <a:uLnTx/>
-                <a:uFillTx/>
-                <a:latin typeface="Arial"/>
-                <a:ea typeface="ＭＳ Ｐゴシック" pitchFamily="-108" charset="-128"/>
-                <a:cs typeface="+mn-cs"/>
-              </a:rPr>
-              <a:t>  </a:t>
-            </a:r>
-            <a:endParaRPr kumimoji="0" lang="es-ES_tradnl" sz="1800" b="0" i="0" u="none" strike="noStrike" kern="0" cap="none" spc="0" normalizeH="0" baseline="0" noProof="0" dirty="0">
-              <a:ln>
-                <a:noFill/>
-              </a:ln>
-              <a:solidFill>
-                <a:srgbClr val="FFFFFF"/>
-              </a:solidFill>
-              <a:effectLst/>
-              <a:uLnTx/>
-              <a:uFillTx/>
-              <a:latin typeface="Arial"/>
-              <a:ea typeface="ＭＳ Ｐゴシック" pitchFamily="-108" charset="-128"/>
-              <a:cs typeface="+mn-cs"/>
-            </a:endParaRPr>
-          </a:p>
-        </p:txBody>
-      </p:sp>
-      <p:sp>
-        <p:nvSpPr>
-          <p:cNvPr id="16" name="TextBox 15"/>
-          <p:cNvSpPr txBox="1"/>
-          <p:nvPr/>
-        </p:nvSpPr>
-        <p:spPr>
-          <a:xfrm>
-            <a:off x="515936" y="212035"/>
-            <a:ext cx="11676063" cy="553998"/>
-          </a:xfrm>
-          <a:prstGeom prst="rect">
-            <a:avLst/>
-          </a:prstGeom>
-          <a:noFill/>
-        </p:spPr>
-        <p:txBody>
-          <a:bodyPr wrap="square" lIns="0" tIns="0" rIns="0" bIns="0" rtlCol="0">
-            <a:spAutoFit/>
-          </a:bodyPr>
-          <a:lstStyle/>
-          <a:p>
-            <a:r>
-              <a:rPr lang="en-US" sz="3600" dirty="0" smtClean="0">
-                <a:solidFill>
-                  <a:schemeClr val="bg1"/>
-                </a:solidFill>
-              </a:rPr>
+            <a:r>
+              <a:rPr lang="es-AR" dirty="0" err="1" smtClean="0"/>
               <a:t>Summary</a:t>
             </a:r>
-            <a:endParaRPr lang="es-AR" sz="3600" dirty="0">
-              <a:solidFill>
-                <a:schemeClr val="bg1"/>
-              </a:solidFill>
-            </a:endParaRPr>
-          </a:p>
-        </p:txBody>
-      </p:sp>
-      <p:sp>
-        <p:nvSpPr>
-          <p:cNvPr id="6" name="Content Placeholder 2"/>
-          <p:cNvSpPr txBox="1">
-            <a:spLocks/>
-          </p:cNvSpPr>
-          <p:nvPr/>
-        </p:nvSpPr>
-        <p:spPr>
-          <a:xfrm>
-            <a:off x="476534" y="1312325"/>
-            <a:ext cx="10987585" cy="4329621"/>
-          </a:xfrm>
-          <a:prstGeom prst="rect">
-            <a:avLst/>
-          </a:prstGeom>
-        </p:spPr>
-        <p:txBody>
-          <a:bodyPr vert="horz" lIns="91440" tIns="45720" rIns="91440" bIns="45720" rtlCol="0">
-            <a:noAutofit/>
-          </a:bodyPr>
-          <a:lstStyle>
-            <a:lvl1pPr marL="273050" marR="0" indent="-273050" algn="l" defTabSz="914400" rtl="0" eaLnBrk="1" fontAlgn="auto" latinLnBrk="0" hangingPunct="1">
-              <a:lnSpc>
-                <a:spcPct val="100000"/>
-              </a:lnSpc>
-              <a:spcBef>
-                <a:spcPts val="1200"/>
-              </a:spcBef>
-              <a:spcAft>
-                <a:spcPts val="0"/>
-              </a:spcAft>
-              <a:buClr>
-                <a:srgbClr val="DA1218"/>
-              </a:buClr>
-              <a:buSzTx/>
-              <a:buFont typeface="Wingdings" pitchFamily="2" charset="2"/>
-              <a:buChar char="§"/>
-              <a:tabLst/>
-              <a:defRPr lang="en-US" sz="2400" kern="1200">
-                <a:solidFill>
-                  <a:schemeClr val="tx1"/>
-                </a:solidFill>
-                <a:latin typeface="Arial" pitchFamily="34" charset="0"/>
-                <a:ea typeface="+mn-ea"/>
-                <a:cs typeface="Arial" pitchFamily="34" charset="0"/>
-              </a:defRPr>
-            </a:lvl1pPr>
-            <a:lvl2pPr marL="628650" marR="0" indent="-355600" algn="l" defTabSz="914400" rtl="0" eaLnBrk="1" fontAlgn="auto" latinLnBrk="0" hangingPunct="1">
-              <a:lnSpc>
-                <a:spcPct val="100000"/>
-              </a:lnSpc>
-              <a:spcBef>
-                <a:spcPct val="20000"/>
-              </a:spcBef>
-              <a:spcAft>
-                <a:spcPts val="0"/>
-              </a:spcAft>
-              <a:buClr>
-                <a:srgbClr val="DA1218"/>
-              </a:buClr>
-              <a:buSzTx/>
-              <a:buFont typeface="Wingdings" pitchFamily="2" charset="2"/>
-              <a:buChar char=""/>
-              <a:tabLst/>
-              <a:defRPr lang="en-US" sz="2000" kern="1200">
-                <a:solidFill>
-                  <a:schemeClr val="tx1"/>
-                </a:solidFill>
-                <a:latin typeface="Arial" pitchFamily="34" charset="0"/>
-                <a:ea typeface="+mn-ea"/>
-                <a:cs typeface="Arial" pitchFamily="34" charset="0"/>
-              </a:defRPr>
-            </a:lvl2pPr>
-            <a:lvl3pPr marL="903288" marR="0" indent="-274638" algn="l" defTabSz="914400" rtl="0" eaLnBrk="1" fontAlgn="auto" latinLnBrk="0" hangingPunct="1">
-              <a:lnSpc>
-                <a:spcPct val="100000"/>
-              </a:lnSpc>
-              <a:spcBef>
-                <a:spcPct val="20000"/>
-              </a:spcBef>
-              <a:spcAft>
-                <a:spcPts val="0"/>
-              </a:spcAft>
-              <a:buClr>
-                <a:srgbClr val="DA1218"/>
-              </a:buClr>
-              <a:buSzTx/>
-              <a:buFont typeface="Wingdings" pitchFamily="2" charset="2"/>
-              <a:buChar char="ü"/>
-              <a:tabLst/>
-              <a:defRPr lang="en-US" sz="1800" kern="1200">
-                <a:solidFill>
-                  <a:schemeClr val="tx1"/>
-                </a:solidFill>
-                <a:latin typeface="Arial" pitchFamily="34" charset="0"/>
-                <a:ea typeface="+mn-ea"/>
-                <a:cs typeface="Arial" pitchFamily="34" charset="0"/>
-              </a:defRPr>
-            </a:lvl3pPr>
-            <a:lvl4pPr marL="1081088" marR="0" indent="-177800" algn="l" defTabSz="914400" rtl="0" eaLnBrk="1" fontAlgn="auto" latinLnBrk="0" hangingPunct="1">
-              <a:lnSpc>
-                <a:spcPct val="100000"/>
-              </a:lnSpc>
-              <a:spcBef>
-                <a:spcPct val="20000"/>
-              </a:spcBef>
-              <a:spcAft>
-                <a:spcPts val="0"/>
-              </a:spcAft>
-              <a:buClr>
-                <a:srgbClr val="DA1218"/>
-              </a:buClr>
-              <a:buSzTx/>
-              <a:buFont typeface="Arial" pitchFamily="34" charset="0"/>
-              <a:buChar char="•"/>
-              <a:tabLst/>
-              <a:defRPr lang="en-US" sz="1600" kern="1200">
-                <a:solidFill>
-                  <a:schemeClr val="tx1"/>
-                </a:solidFill>
-                <a:latin typeface="Arial" pitchFamily="34" charset="0"/>
-                <a:ea typeface="+mn-ea"/>
-                <a:cs typeface="Arial" pitchFamily="34" charset="0"/>
-              </a:defRPr>
-            </a:lvl4pPr>
-            <a:lvl5pPr marL="1258888" marR="0" indent="-177800" algn="l" defTabSz="914400" rtl="0" eaLnBrk="1" fontAlgn="auto" latinLnBrk="0" hangingPunct="1">
-              <a:lnSpc>
-                <a:spcPct val="100000"/>
-              </a:lnSpc>
-              <a:spcBef>
-                <a:spcPct val="20000"/>
-              </a:spcBef>
-              <a:spcAft>
-                <a:spcPts val="0"/>
-              </a:spcAft>
-              <a:buClr>
-                <a:srgbClr val="DA1218"/>
-              </a:buClr>
-              <a:buSzPct val="100000"/>
-              <a:buFont typeface="Courier New" pitchFamily="49" charset="0"/>
-              <a:buChar char="o"/>
-              <a:tabLst/>
-              <a:defRPr lang="es-AR" sz="1400" kern="1200">
-                <a:solidFill>
-                  <a:schemeClr val="tx1"/>
-                </a:solidFill>
-                <a:latin typeface="Arial" pitchFamily="34" charset="0"/>
-                <a:ea typeface="+mn-ea"/>
-                <a:cs typeface="Arial" pitchFamily="34" charset="0"/>
-              </a:defRPr>
-            </a:lvl5pPr>
-            <a:lvl6pPr marL="2514600" indent="-228600" algn="l" defTabSz="914400" rtl="0" eaLnBrk="1" latinLnBrk="0" hangingPunct="1">
-              <a:spcBef>
-                <a:spcPct val="20000"/>
-              </a:spcBef>
-              <a:buFont typeface="Arial" pitchFamily="34" charset="0"/>
-              <a:buChar char="•"/>
-              <a:defRPr sz="2000" kern="1200">
-                <a:solidFill>
-                  <a:schemeClr val="tx1"/>
-                </a:solidFill>
-                <a:latin typeface="+mn-lt"/>
-                <a:ea typeface="+mn-ea"/>
-                <a:cs typeface="+mn-cs"/>
-              </a:defRPr>
-            </a:lvl6pPr>
-            <a:lvl7pPr marL="2971800" indent="-228600" algn="l" defTabSz="914400" rtl="0" eaLnBrk="1" latinLnBrk="0" hangingPunct="1">
-              <a:spcBef>
-                <a:spcPct val="20000"/>
-              </a:spcBef>
-              <a:buFont typeface="Arial" pitchFamily="34" charset="0"/>
-              <a:buChar char="•"/>
-              <a:defRPr sz="2000" kern="1200">
-                <a:solidFill>
-                  <a:schemeClr val="tx1"/>
-                </a:solidFill>
-                <a:latin typeface="+mn-lt"/>
-                <a:ea typeface="+mn-ea"/>
-                <a:cs typeface="+mn-cs"/>
-              </a:defRPr>
-            </a:lvl7pPr>
-            <a:lvl8pPr marL="3429000" indent="-228600" algn="l" defTabSz="914400" rtl="0" eaLnBrk="1" latinLnBrk="0" hangingPunct="1">
-              <a:spcBef>
-                <a:spcPct val="20000"/>
-              </a:spcBef>
-              <a:buFont typeface="Arial" pitchFamily="34" charset="0"/>
-              <a:buChar char="•"/>
-              <a:defRPr sz="2000" kern="1200">
-                <a:solidFill>
-                  <a:schemeClr val="tx1"/>
-                </a:solidFill>
-                <a:latin typeface="+mn-lt"/>
-                <a:ea typeface="+mn-ea"/>
-                <a:cs typeface="+mn-cs"/>
-              </a:defRPr>
-            </a:lvl8pPr>
-            <a:lvl9pPr marL="3886200" indent="-228600" algn="l" defTabSz="914400" rtl="0" eaLnBrk="1" latinLnBrk="0" hangingPunct="1">
-              <a:spcBef>
-                <a:spcPct val="20000"/>
-              </a:spcBef>
-              <a:buFont typeface="Arial" pitchFamily="34" charset="0"/>
-              <a:buChar char="•"/>
-              <a:defRPr sz="2000" kern="1200">
-                <a:solidFill>
-                  <a:schemeClr val="tx1"/>
-                </a:solidFill>
-                <a:latin typeface="+mn-lt"/>
-                <a:ea typeface="+mn-ea"/>
-                <a:cs typeface="+mn-cs"/>
-              </a:defRPr>
-            </a:lvl9pPr>
-          </a:lstStyle>
-          <a:p>
-            <a:pPr marL="0" lvl="1" indent="0">
-              <a:spcBef>
-                <a:spcPts val="1200"/>
-              </a:spcBef>
-              <a:buClrTx/>
-              <a:buNone/>
-            </a:pPr>
-            <a:r>
-              <a:rPr lang="en-GB" dirty="0" smtClean="0">
-                <a:latin typeface="Avenir 45 Book (Body)"/>
-              </a:rPr>
-              <a:t>These practices:</a:t>
-            </a:r>
-          </a:p>
-          <a:p>
-            <a:pPr marL="0" lvl="1" indent="0">
-              <a:spcBef>
-                <a:spcPts val="1200"/>
-              </a:spcBef>
-              <a:buClrTx/>
-              <a:buFont typeface="Wingdings" panose="05000000000000000000" pitchFamily="2" charset="2"/>
-              <a:buChar char="§"/>
-            </a:pPr>
-            <a:endParaRPr lang="en-GB" dirty="0" smtClean="0">
-              <a:latin typeface="Avenir 45 Book (Body)"/>
-            </a:endParaRPr>
-          </a:p>
-          <a:p>
-            <a:pPr marL="0" lvl="1" indent="0">
-              <a:spcBef>
-                <a:spcPts val="1200"/>
-              </a:spcBef>
-              <a:buClrTx/>
-              <a:buFont typeface="Wingdings" panose="05000000000000000000" pitchFamily="2" charset="2"/>
-              <a:buChar char="§"/>
-            </a:pPr>
-            <a:r>
-              <a:rPr lang="en-GB" dirty="0" smtClean="0">
-                <a:latin typeface="Avenir 45 Book (Body)"/>
-              </a:rPr>
-              <a:t> Make your code more maintainable</a:t>
-            </a:r>
-            <a:endParaRPr lang="en-GB" dirty="0">
-              <a:latin typeface="Avenir 45 Book (Body)"/>
-            </a:endParaRPr>
-          </a:p>
-          <a:p>
-            <a:pPr marL="0" lvl="1" indent="0">
-              <a:spcBef>
-                <a:spcPts val="1200"/>
-              </a:spcBef>
-              <a:buClrTx/>
-              <a:buFont typeface="Wingdings" panose="05000000000000000000" pitchFamily="2" charset="2"/>
-              <a:buChar char="§"/>
-            </a:pPr>
-            <a:r>
-              <a:rPr lang="en-GB" dirty="0">
-                <a:latin typeface="Avenir 45 Book (Body)"/>
-              </a:rPr>
-              <a:t> </a:t>
-            </a:r>
-            <a:r>
-              <a:rPr lang="en-GB" dirty="0" smtClean="0">
-                <a:latin typeface="Avenir 45 Book (Body)"/>
-              </a:rPr>
-              <a:t>Minimize the number of errors in the final product</a:t>
-            </a:r>
-          </a:p>
-          <a:p>
-            <a:pPr marL="0" lvl="1" indent="0">
-              <a:spcBef>
-                <a:spcPts val="1200"/>
-              </a:spcBef>
-              <a:buClrTx/>
-              <a:buFont typeface="Wingdings" panose="05000000000000000000" pitchFamily="2" charset="2"/>
-              <a:buChar char="§"/>
-            </a:pPr>
-            <a:r>
-              <a:rPr lang="en-GB" dirty="0" smtClean="0">
-                <a:latin typeface="Avenir 45 Book (Body)"/>
-              </a:rPr>
-              <a:t> Allow early detection of errors in the development environment</a:t>
-            </a:r>
-          </a:p>
-          <a:p>
-            <a:pPr marL="0" lvl="1" indent="0">
-              <a:spcBef>
-                <a:spcPts val="1200"/>
-              </a:spcBef>
-              <a:buClrTx/>
-              <a:buFont typeface="Wingdings" panose="05000000000000000000" pitchFamily="2" charset="2"/>
-              <a:buChar char="§"/>
-            </a:pPr>
-            <a:r>
-              <a:rPr lang="en-GB" dirty="0">
-                <a:latin typeface="Avenir 45 Book (Body)"/>
-              </a:rPr>
-              <a:t> </a:t>
-            </a:r>
-            <a:r>
-              <a:rPr lang="en-GB" dirty="0" smtClean="0">
-                <a:latin typeface="Avenir 45 Book (Body)"/>
-              </a:rPr>
-              <a:t>Reduce development and maintenance time over the project’s lifecycle</a:t>
-            </a:r>
-          </a:p>
-          <a:p>
-            <a:pPr marL="0" lvl="1" indent="0">
-              <a:spcBef>
-                <a:spcPts val="1200"/>
-              </a:spcBef>
-              <a:buClrTx/>
-              <a:buFont typeface="Wingdings" panose="05000000000000000000" pitchFamily="2" charset="2"/>
-              <a:buChar char="§"/>
-            </a:pPr>
-            <a:r>
-              <a:rPr lang="en-GB" b="1" dirty="0" smtClean="0">
-                <a:latin typeface="Avenir 45 Book (Body)"/>
-              </a:rPr>
-              <a:t> Improve the quality of the final product</a:t>
-            </a:r>
-            <a:endParaRPr lang="en-GB" b="1" dirty="0">
-              <a:latin typeface="Avenir 45 Book (Body)"/>
-            </a:endParaRPr>
-          </a:p>
-          <a:p>
-            <a:pPr marL="0" lvl="1" indent="0">
-              <a:spcBef>
-                <a:spcPts val="1200"/>
-              </a:spcBef>
-              <a:buClrTx/>
-              <a:buFont typeface="Wingdings" panose="05000000000000000000" pitchFamily="2" charset="2"/>
-              <a:buChar char="§"/>
-            </a:pPr>
-            <a:endParaRPr lang="en-GB" dirty="0">
-              <a:latin typeface="Avenir 45 Book (Body)"/>
-            </a:endParaRPr>
-          </a:p>
-          <a:p>
-            <a:pPr lvl="0" defTabSz="914363">
-              <a:lnSpc>
-                <a:spcPct val="90000"/>
-              </a:lnSpc>
-              <a:spcBef>
-                <a:spcPts val="0"/>
-              </a:spcBef>
-              <a:spcAft>
-                <a:spcPts val="400"/>
-              </a:spcAft>
-              <a:buClr>
-                <a:schemeClr val="tx1">
-                  <a:lumMod val="75000"/>
-                  <a:lumOff val="25000"/>
-                </a:schemeClr>
-              </a:buClr>
-              <a:buSzPct val="100000"/>
-              <a:buFont typeface="Wingdings" panose="05000000000000000000" pitchFamily="2" charset="2"/>
-              <a:buChar char="ä"/>
-            </a:pPr>
-            <a:endParaRPr lang="es-AR" sz="1600" b="1" dirty="0">
-              <a:solidFill>
-                <a:srgbClr val="000000"/>
-              </a:solidFill>
-              <a:latin typeface="Avenir 45 Book (Body)"/>
-              <a:cs typeface="+mn-cs"/>
-            </a:endParaRPr>
+            <a:endParaRPr lang="es-AR" dirty="0"/>
           </a:p>
         </p:txBody>
       </p:sp>
     </p:spTree>
     <p:extLst>
       <p:ext uri="{BB962C8B-B14F-4D97-AF65-F5344CB8AC3E}">
-        <p14:creationId xmlns:p14="http://schemas.microsoft.com/office/powerpoint/2010/main" val="3539865254"/>
+        <p14:creationId xmlns:p14="http://schemas.microsoft.com/office/powerpoint/2010/main" val="689075145"/>
       </p:ext>
     </p:extLst>
   </p:cSld>
@@ -28772,28 +28983,10 @@
               <a:buNone/>
             </a:pPr>
             <a:r>
-              <a:rPr lang="en-US" dirty="0" smtClean="0">
-                <a:latin typeface="Avenir 45 Book (Body)"/>
-              </a:rPr>
-              <a:t>These </a:t>
-            </a:r>
-            <a:r>
-              <a:rPr lang="en-US" dirty="0">
-                <a:latin typeface="Avenir 45 Book (Body)"/>
-              </a:rPr>
-              <a:t>practices </a:t>
-            </a:r>
-            <a:r>
-              <a:rPr lang="en-US" dirty="0" smtClean="0">
-                <a:latin typeface="Avenir 45 Book (Body)"/>
-              </a:rPr>
-              <a:t>will also</a:t>
-            </a:r>
-            <a:r>
               <a:rPr lang="en-GB" dirty="0" smtClean="0">
                 <a:latin typeface="Avenir 45 Book (Body)"/>
               </a:rPr>
-              <a:t>:</a:t>
+              <a:t>These practices:</a:t>
             </a:r>
           </a:p>
           <a:p>
@@ -28822,8 +29015,11 @@
               <a:rPr lang="en-GB" dirty="0" smtClean="0">
                 <a:latin typeface="Avenir 45 Book (Body)"/>
               </a:rPr>
-              <a:t> Improve the development team’s internal organization</a:t>
-            </a:r>
+              <a:t> Make your code more maintainable</a:t>
+            </a:r>
+            <a:endParaRPr lang="en-GB" dirty="0">
+              <a:latin typeface="Avenir 45 Book (Body)"/>
+            </a:endParaRPr>
           </a:p>
           <a:p>
             <a:pPr marL="0" lvl="1" indent="0">
@@ -28844,7 +29040,7 @@
               <a:rPr lang="en-GB" dirty="0" smtClean="0">
                 <a:latin typeface="Avenir 45 Book (Body)"/>
               </a:rPr>
-              <a:t>Maintain a current build always available for testing, demos or deployment</a:t>
+              <a:t>Minimize the number of errors in the final product</a:t>
             </a:r>
           </a:p>
           <a:p>
@@ -28860,8 +29056,59 @@
               <a:rPr lang="en-GB" dirty="0" smtClean="0">
                 <a:latin typeface="Avenir 45 Book (Body)"/>
               </a:rPr>
-              <a:t> Allow you to generate metrics of code quality, test coverage, etc.</a:t>
-            </a:r>
+              <a:t> Allow early detection of errors in the development environment</a:t>
+            </a:r>
+          </a:p>
+          <a:p>
+            <a:pPr marL="0" lvl="1" indent="0">
+              <a:spcBef>
+                <a:spcPts val="1200"/>
+              </a:spcBef>
+              <a:buClrTx/>
+              <a:buFont typeface="Wingdings" panose="05000000000000000000" pitchFamily="2" charset="2"/>
+              <a:buChar char="§"/>
+            </a:pPr>
+            <a:r>
+              <a:rPr lang="en-GB" dirty="0">
+                <a:latin typeface="Avenir 45 Book (Body)"/>
+              </a:rPr>
+              <a:t> </a:t>
+            </a:r>
+            <a:r>
+              <a:rPr lang="en-GB" dirty="0" smtClean="0">
+                <a:latin typeface="Avenir 45 Book (Body)"/>
+              </a:rPr>
+              <a:t>Reduce development and maintenance time over the project’s lifecycle</a:t>
+            </a:r>
+          </a:p>
+          <a:p>
+            <a:pPr marL="0" lvl="1" indent="0">
+              <a:spcBef>
+                <a:spcPts val="1200"/>
+              </a:spcBef>
+              <a:buClrTx/>
+              <a:buFont typeface="Wingdings" panose="05000000000000000000" pitchFamily="2" charset="2"/>
+              <a:buChar char="§"/>
+            </a:pPr>
+            <a:r>
+              <a:rPr lang="en-GB" b="1" dirty="0" smtClean="0">
+                <a:latin typeface="Avenir 45 Book (Body)"/>
+              </a:rPr>
+              <a:t> Improve the quality of the final product</a:t>
+            </a:r>
+            <a:endParaRPr lang="en-GB" b="1" dirty="0">
+              <a:latin typeface="Avenir 45 Book (Body)"/>
+            </a:endParaRPr>
+          </a:p>
+          <a:p>
+            <a:pPr marL="0" lvl="1" indent="0">
+              <a:spcBef>
+                <a:spcPts val="1200"/>
+              </a:spcBef>
+              <a:buClrTx/>
+              <a:buFont typeface="Wingdings" panose="05000000000000000000" pitchFamily="2" charset="2"/>
+              <a:buChar char="§"/>
+            </a:pPr>
             <a:endParaRPr lang="en-GB" dirty="0">
               <a:latin typeface="Avenir 45 Book (Body)"/>
             </a:endParaRPr>
@@ -28900,7 +29147,7 @@
     </p:spTree>
     <p:extLst>
       <p:ext uri="{BB962C8B-B14F-4D97-AF65-F5344CB8AC3E}">
-        <p14:creationId xmlns:p14="http://schemas.microsoft.com/office/powerpoint/2010/main" val="1925881899"/>
+        <p14:creationId xmlns:p14="http://schemas.microsoft.com/office/powerpoint/2010/main" val="3539865254"/>
       </p:ext>
     </p:extLst>
   </p:cSld>
@@ -29055,7 +29302,7 @@
                   <a:schemeClr val="bg1"/>
                 </a:solidFill>
               </a:rPr>
-              <a:t>Part III: Scenes of the next episode…</a:t>
+              <a:t>Summary</a:t>
             </a:r>
             <a:endParaRPr lang="es-AR" sz="3600" dirty="0">
               <a:solidFill>
@@ -29284,14 +29531,31 @@
                 <a:spcPts val="1200"/>
               </a:spcBef>
               <a:buClrTx/>
-              <a:buFont typeface="Wingdings" panose="05000000000000000000" pitchFamily="2" charset="2"/>
-              <a:buChar char="§"/>
+              <a:buNone/>
             </a:pPr>
+            <a:r>
+              <a:rPr lang="en-US" dirty="0" smtClean="0">
+                <a:latin typeface="Avenir 45 Book (Body)"/>
+              </a:rPr>
+              <a:t>These </a:t>
+            </a:r>
+            <a:r>
+              <a:rPr lang="en-US" dirty="0">
+                <a:latin typeface="Avenir 45 Book (Body)"/>
+              </a:rPr>
+              <a:t>practices </a:t>
+            </a:r>
+            <a:r>
+              <a:rPr lang="en-US" dirty="0" smtClean="0">
+                <a:latin typeface="Avenir 45 Book (Body)"/>
+              </a:rPr>
+              <a:t>will also</a:t>
+            </a:r>
             <a:r>
               <a:rPr lang="en-GB" dirty="0" smtClean="0">
                 <a:latin typeface="Avenir 45 Book (Body)"/>
               </a:rPr>
-              <a:t> No, it’s over, just kidding…</a:t>
+              <a:t>:</a:t>
             </a:r>
           </a:p>
           <a:p>
@@ -29300,8 +29564,66 @@
                 <a:spcPts val="1200"/>
               </a:spcBef>
               <a:buClrTx/>
-              <a:buNone/>
+              <a:buFont typeface="Wingdings" panose="05000000000000000000" pitchFamily="2" charset="2"/>
+              <a:buChar char="§"/>
             </a:pPr>
+            <a:endParaRPr lang="en-GB" dirty="0" smtClean="0">
+              <a:latin typeface="Avenir 45 Book (Body)"/>
+            </a:endParaRPr>
+          </a:p>
+          <a:p>
+            <a:pPr marL="0" lvl="1" indent="0">
+              <a:spcBef>
+                <a:spcPts val="1200"/>
+              </a:spcBef>
+              <a:buClrTx/>
+              <a:buFont typeface="Wingdings" panose="05000000000000000000" pitchFamily="2" charset="2"/>
+              <a:buChar char="§"/>
+            </a:pPr>
+            <a:r>
+              <a:rPr lang="en-GB" dirty="0" smtClean="0">
+                <a:latin typeface="Avenir 45 Book (Body)"/>
+              </a:rPr>
+              <a:t> Improve the development team’s internal organization</a:t>
+            </a:r>
+          </a:p>
+          <a:p>
+            <a:pPr marL="0" lvl="1" indent="0">
+              <a:spcBef>
+                <a:spcPts val="1200"/>
+              </a:spcBef>
+              <a:buClrTx/>
+              <a:buFont typeface="Wingdings" panose="05000000000000000000" pitchFamily="2" charset="2"/>
+              <a:buChar char="§"/>
+            </a:pPr>
+            <a:r>
+              <a:rPr lang="en-GB" dirty="0">
+                <a:latin typeface="Avenir 45 Book (Body)"/>
+              </a:rPr>
+              <a:t> </a:t>
+            </a:r>
+            <a:r>
+              <a:rPr lang="en-GB" dirty="0" smtClean="0">
+                <a:latin typeface="Avenir 45 Book (Body)"/>
+              </a:rPr>
+              <a:t>Maintain a current build always available for testing, demos or deployment</a:t>
+            </a:r>
+          </a:p>
+          <a:p>
+            <a:pPr marL="0" lvl="1" indent="0">
+              <a:spcBef>
+                <a:spcPts val="1200"/>
+              </a:spcBef>
+              <a:buClrTx/>
+              <a:buFont typeface="Wingdings" panose="05000000000000000000" pitchFamily="2" charset="2"/>
+              <a:buChar char="§"/>
+            </a:pPr>
+            <a:r>
+              <a:rPr lang="en-GB" dirty="0" smtClean="0">
+                <a:latin typeface="Avenir 45 Book (Body)"/>
+              </a:rPr>
+              <a:t> Allow you to generate metrics of code quality, test coverage, etc.</a:t>
+            </a:r>
             <a:endParaRPr lang="en-GB" dirty="0">
               <a:latin typeface="Avenir 45 Book (Body)"/>
             </a:endParaRPr>
@@ -29340,6 +29662,446 @@
     </p:spTree>
     <p:extLst>
       <p:ext uri="{BB962C8B-B14F-4D97-AF65-F5344CB8AC3E}">
+        <p14:creationId xmlns:p14="http://schemas.microsoft.com/office/powerpoint/2010/main" val="1925881899"/>
+      </p:ext>
+    </p:extLst>
+  </p:cSld>
+  <p:clrMapOvr>
+    <a:masterClrMapping/>
+  </p:clrMapOvr>
+  <p:transition spd="slow">
+    <p:wipe/>
+  </p:transition>
+  <p:timing>
+    <p:tnLst>
+      <p:par>
+        <p:cTn id="1" dur="indefinite" restart="never" nodeType="tmRoot"/>
+      </p:par>
+    </p:tnLst>
+  </p:timing>
+</p:sld>
+</file>
+
+<file path=ppt/slides/slide33.xml><?xml version="1.0" encoding="utf-8"?>
+<p:sld xmlns:a="http://schemas.openxmlformats.org/drawingml/2006/main" xmlns:r="http://schemas.openxmlformats.org/officeDocument/2006/relationships" xmlns:p="http://schemas.openxmlformats.org/presentationml/2006/main">
+  <p:cSld>
+    <p:spTree>
+      <p:nvGrpSpPr>
+        <p:cNvPr id="1" name=""/>
+        <p:cNvGrpSpPr/>
+        <p:nvPr/>
+      </p:nvGrpSpPr>
+      <p:grpSpPr>
+        <a:xfrm>
+          <a:off x="0" y="0"/>
+          <a:ext cx="0" cy="0"/>
+          <a:chOff x="0" y="0"/>
+          <a:chExt cx="0" cy="0"/>
+        </a:xfrm>
+      </p:grpSpPr>
+      <p:sp>
+        <p:nvSpPr>
+          <p:cNvPr id="15" name="Rectangle 14"/>
+          <p:cNvSpPr/>
+          <p:nvPr/>
+        </p:nvSpPr>
+        <p:spPr>
+          <a:xfrm>
+            <a:off x="-13252" y="1"/>
+            <a:ext cx="12218504" cy="1016000"/>
+          </a:xfrm>
+          <a:prstGeom prst="rect">
+            <a:avLst/>
+          </a:prstGeom>
+          <a:solidFill>
+            <a:srgbClr val="FF9600"/>
+          </a:solidFill>
+          <a:ln>
+            <a:noFill/>
+          </a:ln>
+        </p:spPr>
+        <p:style>
+          <a:lnRef idx="1">
+            <a:schemeClr val="accent6"/>
+          </a:lnRef>
+          <a:fillRef idx="3">
+            <a:schemeClr val="accent6"/>
+          </a:fillRef>
+          <a:effectRef idx="2">
+            <a:schemeClr val="accent6"/>
+          </a:effectRef>
+          <a:fontRef idx="minor">
+            <a:schemeClr val="lt1"/>
+          </a:fontRef>
+        </p:style>
+        <p:txBody>
+          <a:bodyPr anchor="ctr"/>
+          <a:lstStyle/>
+          <a:p>
+            <a:pPr marL="0" marR="0" lvl="0" indent="0" algn="ctr" defTabSz="914400" eaLnBrk="1" fontAlgn="auto" latinLnBrk="0" hangingPunct="1">
+              <a:lnSpc>
+                <a:spcPct val="100000"/>
+              </a:lnSpc>
+              <a:spcBef>
+                <a:spcPts val="0"/>
+              </a:spcBef>
+              <a:spcAft>
+                <a:spcPts val="0"/>
+              </a:spcAft>
+              <a:buClrTx/>
+              <a:buSzTx/>
+              <a:buFontTx/>
+              <a:buNone/>
+              <a:tabLst/>
+              <a:defRPr/>
+            </a:pPr>
+            <a:r>
+              <a:rPr kumimoji="0" lang="es-ES_tradnl" sz="1800" b="0" i="0" u="none" strike="noStrike" kern="0" cap="none" spc="0" normalizeH="0" baseline="0" noProof="0" dirty="0" smtClean="0">
+                <a:ln>
+                  <a:noFill/>
+                </a:ln>
+                <a:solidFill>
+                  <a:srgbClr val="FFFFFF"/>
+                </a:solidFill>
+                <a:effectLst/>
+                <a:uLnTx/>
+                <a:uFillTx/>
+                <a:latin typeface="Arial"/>
+                <a:ea typeface="ＭＳ Ｐゴシック" pitchFamily="-108" charset="-128"/>
+                <a:cs typeface="+mn-cs"/>
+              </a:rPr>
+              <a:t>  </a:t>
+            </a:r>
+            <a:endParaRPr kumimoji="0" lang="es-ES_tradnl" sz="1800" b="0" i="0" u="none" strike="noStrike" kern="0" cap="none" spc="0" normalizeH="0" baseline="0" noProof="0" dirty="0">
+              <a:ln>
+                <a:noFill/>
+              </a:ln>
+              <a:solidFill>
+                <a:srgbClr val="FFFFFF"/>
+              </a:solidFill>
+              <a:effectLst/>
+              <a:uLnTx/>
+              <a:uFillTx/>
+              <a:latin typeface="Arial"/>
+              <a:ea typeface="ＭＳ Ｐゴシック" pitchFamily="-108" charset="-128"/>
+              <a:cs typeface="+mn-cs"/>
+            </a:endParaRPr>
+          </a:p>
+        </p:txBody>
+      </p:sp>
+      <p:sp>
+        <p:nvSpPr>
+          <p:cNvPr id="16" name="TextBox 15"/>
+          <p:cNvSpPr txBox="1"/>
+          <p:nvPr/>
+        </p:nvSpPr>
+        <p:spPr>
+          <a:xfrm>
+            <a:off x="515936" y="212035"/>
+            <a:ext cx="11676063" cy="553998"/>
+          </a:xfrm>
+          <a:prstGeom prst="rect">
+            <a:avLst/>
+          </a:prstGeom>
+          <a:noFill/>
+        </p:spPr>
+        <p:txBody>
+          <a:bodyPr wrap="square" lIns="0" tIns="0" rIns="0" bIns="0" rtlCol="0">
+            <a:spAutoFit/>
+          </a:bodyPr>
+          <a:lstStyle/>
+          <a:p>
+            <a:r>
+              <a:rPr lang="en-US" sz="3600" dirty="0" smtClean="0">
+                <a:solidFill>
+                  <a:schemeClr val="bg1"/>
+                </a:solidFill>
+              </a:rPr>
+              <a:t>Part III: Scenes of the next episode…</a:t>
+            </a:r>
+            <a:endParaRPr lang="es-AR" sz="3600" dirty="0">
+              <a:solidFill>
+                <a:schemeClr val="bg1"/>
+              </a:solidFill>
+            </a:endParaRPr>
+          </a:p>
+        </p:txBody>
+      </p:sp>
+      <p:sp>
+        <p:nvSpPr>
+          <p:cNvPr id="6" name="Content Placeholder 2"/>
+          <p:cNvSpPr txBox="1">
+            <a:spLocks/>
+          </p:cNvSpPr>
+          <p:nvPr/>
+        </p:nvSpPr>
+        <p:spPr>
+          <a:xfrm>
+            <a:off x="476534" y="1312325"/>
+            <a:ext cx="10987585" cy="4329621"/>
+          </a:xfrm>
+          <a:prstGeom prst="rect">
+            <a:avLst/>
+          </a:prstGeom>
+        </p:spPr>
+        <p:txBody>
+          <a:bodyPr vert="horz" lIns="91440" tIns="45720" rIns="91440" bIns="45720" rtlCol="0">
+            <a:noAutofit/>
+          </a:bodyPr>
+          <a:lstStyle>
+            <a:lvl1pPr marL="273050" marR="0" indent="-273050" algn="l" defTabSz="914400" rtl="0" eaLnBrk="1" fontAlgn="auto" latinLnBrk="0" hangingPunct="1">
+              <a:lnSpc>
+                <a:spcPct val="100000"/>
+              </a:lnSpc>
+              <a:spcBef>
+                <a:spcPts val="1200"/>
+              </a:spcBef>
+              <a:spcAft>
+                <a:spcPts val="0"/>
+              </a:spcAft>
+              <a:buClr>
+                <a:srgbClr val="DA1218"/>
+              </a:buClr>
+              <a:buSzTx/>
+              <a:buFont typeface="Wingdings" pitchFamily="2" charset="2"/>
+              <a:buChar char="§"/>
+              <a:tabLst/>
+              <a:defRPr lang="en-US" sz="2400" kern="1200">
+                <a:solidFill>
+                  <a:schemeClr val="tx1"/>
+                </a:solidFill>
+                <a:latin typeface="Arial" pitchFamily="34" charset="0"/>
+                <a:ea typeface="+mn-ea"/>
+                <a:cs typeface="Arial" pitchFamily="34" charset="0"/>
+              </a:defRPr>
+            </a:lvl1pPr>
+            <a:lvl2pPr marL="628650" marR="0" indent="-355600" algn="l" defTabSz="914400" rtl="0" eaLnBrk="1" fontAlgn="auto" latinLnBrk="0" hangingPunct="1">
+              <a:lnSpc>
+                <a:spcPct val="100000"/>
+              </a:lnSpc>
+              <a:spcBef>
+                <a:spcPct val="20000"/>
+              </a:spcBef>
+              <a:spcAft>
+                <a:spcPts val="0"/>
+              </a:spcAft>
+              <a:buClr>
+                <a:srgbClr val="DA1218"/>
+              </a:buClr>
+              <a:buSzTx/>
+              <a:buFont typeface="Wingdings" pitchFamily="2" charset="2"/>
+              <a:buChar char=""/>
+              <a:tabLst/>
+              <a:defRPr lang="en-US" sz="2000" kern="1200">
+                <a:solidFill>
+                  <a:schemeClr val="tx1"/>
+                </a:solidFill>
+                <a:latin typeface="Arial" pitchFamily="34" charset="0"/>
+                <a:ea typeface="+mn-ea"/>
+                <a:cs typeface="Arial" pitchFamily="34" charset="0"/>
+              </a:defRPr>
+            </a:lvl2pPr>
+            <a:lvl3pPr marL="903288" marR="0" indent="-274638" algn="l" defTabSz="914400" rtl="0" eaLnBrk="1" fontAlgn="auto" latinLnBrk="0" hangingPunct="1">
+              <a:lnSpc>
+                <a:spcPct val="100000"/>
+              </a:lnSpc>
+              <a:spcBef>
+                <a:spcPct val="20000"/>
+              </a:spcBef>
+              <a:spcAft>
+                <a:spcPts val="0"/>
+              </a:spcAft>
+              <a:buClr>
+                <a:srgbClr val="DA1218"/>
+              </a:buClr>
+              <a:buSzTx/>
+              <a:buFont typeface="Wingdings" pitchFamily="2" charset="2"/>
+              <a:buChar char="ü"/>
+              <a:tabLst/>
+              <a:defRPr lang="en-US" sz="1800" kern="1200">
+                <a:solidFill>
+                  <a:schemeClr val="tx1"/>
+                </a:solidFill>
+                <a:latin typeface="Arial" pitchFamily="34" charset="0"/>
+                <a:ea typeface="+mn-ea"/>
+                <a:cs typeface="Arial" pitchFamily="34" charset="0"/>
+              </a:defRPr>
+            </a:lvl3pPr>
+            <a:lvl4pPr marL="1081088" marR="0" indent="-177800" algn="l" defTabSz="914400" rtl="0" eaLnBrk="1" fontAlgn="auto" latinLnBrk="0" hangingPunct="1">
+              <a:lnSpc>
+                <a:spcPct val="100000"/>
+              </a:lnSpc>
+              <a:spcBef>
+                <a:spcPct val="20000"/>
+              </a:spcBef>
+              <a:spcAft>
+                <a:spcPts val="0"/>
+              </a:spcAft>
+              <a:buClr>
+                <a:srgbClr val="DA1218"/>
+              </a:buClr>
+              <a:buSzTx/>
+              <a:buFont typeface="Arial" pitchFamily="34" charset="0"/>
+              <a:buChar char="•"/>
+              <a:tabLst/>
+              <a:defRPr lang="en-US" sz="1600" kern="1200">
+                <a:solidFill>
+                  <a:schemeClr val="tx1"/>
+                </a:solidFill>
+                <a:latin typeface="Arial" pitchFamily="34" charset="0"/>
+                <a:ea typeface="+mn-ea"/>
+                <a:cs typeface="Arial" pitchFamily="34" charset="0"/>
+              </a:defRPr>
+            </a:lvl4pPr>
+            <a:lvl5pPr marL="1258888" marR="0" indent="-177800" algn="l" defTabSz="914400" rtl="0" eaLnBrk="1" fontAlgn="auto" latinLnBrk="0" hangingPunct="1">
+              <a:lnSpc>
+                <a:spcPct val="100000"/>
+              </a:lnSpc>
+              <a:spcBef>
+                <a:spcPct val="20000"/>
+              </a:spcBef>
+              <a:spcAft>
+                <a:spcPts val="0"/>
+              </a:spcAft>
+              <a:buClr>
+                <a:srgbClr val="DA1218"/>
+              </a:buClr>
+              <a:buSzPct val="100000"/>
+              <a:buFont typeface="Courier New" pitchFamily="49" charset="0"/>
+              <a:buChar char="o"/>
+              <a:tabLst/>
+              <a:defRPr lang="es-AR" sz="1400" kern="1200">
+                <a:solidFill>
+                  <a:schemeClr val="tx1"/>
+                </a:solidFill>
+                <a:latin typeface="Arial" pitchFamily="34" charset="0"/>
+                <a:ea typeface="+mn-ea"/>
+                <a:cs typeface="Arial" pitchFamily="34" charset="0"/>
+              </a:defRPr>
+            </a:lvl5pPr>
+            <a:lvl6pPr marL="2514600" indent="-228600" algn="l" defTabSz="914400" rtl="0" eaLnBrk="1" latinLnBrk="0" hangingPunct="1">
+              <a:spcBef>
+                <a:spcPct val="20000"/>
+              </a:spcBef>
+              <a:buFont typeface="Arial" pitchFamily="34" charset="0"/>
+              <a:buChar char="•"/>
+              <a:defRPr sz="2000" kern="1200">
+                <a:solidFill>
+                  <a:schemeClr val="tx1"/>
+                </a:solidFill>
+                <a:latin typeface="+mn-lt"/>
+                <a:ea typeface="+mn-ea"/>
+                <a:cs typeface="+mn-cs"/>
+              </a:defRPr>
+            </a:lvl6pPr>
+            <a:lvl7pPr marL="2971800" indent="-228600" algn="l" defTabSz="914400" rtl="0" eaLnBrk="1" latinLnBrk="0" hangingPunct="1">
+              <a:spcBef>
+                <a:spcPct val="20000"/>
+              </a:spcBef>
+              <a:buFont typeface="Arial" pitchFamily="34" charset="0"/>
+              <a:buChar char="•"/>
+              <a:defRPr sz="2000" kern="1200">
+                <a:solidFill>
+                  <a:schemeClr val="tx1"/>
+                </a:solidFill>
+                <a:latin typeface="+mn-lt"/>
+                <a:ea typeface="+mn-ea"/>
+                <a:cs typeface="+mn-cs"/>
+              </a:defRPr>
+            </a:lvl7pPr>
+            <a:lvl8pPr marL="3429000" indent="-228600" algn="l" defTabSz="914400" rtl="0" eaLnBrk="1" latinLnBrk="0" hangingPunct="1">
+              <a:spcBef>
+                <a:spcPct val="20000"/>
+              </a:spcBef>
+              <a:buFont typeface="Arial" pitchFamily="34" charset="0"/>
+              <a:buChar char="•"/>
+              <a:defRPr sz="2000" kern="1200">
+                <a:solidFill>
+                  <a:schemeClr val="tx1"/>
+                </a:solidFill>
+                <a:latin typeface="+mn-lt"/>
+                <a:ea typeface="+mn-ea"/>
+                <a:cs typeface="+mn-cs"/>
+              </a:defRPr>
+            </a:lvl8pPr>
+            <a:lvl9pPr marL="3886200" indent="-228600" algn="l" defTabSz="914400" rtl="0" eaLnBrk="1" latinLnBrk="0" hangingPunct="1">
+              <a:spcBef>
+                <a:spcPct val="20000"/>
+              </a:spcBef>
+              <a:buFont typeface="Arial" pitchFamily="34" charset="0"/>
+              <a:buChar char="•"/>
+              <a:defRPr sz="2000" kern="1200">
+                <a:solidFill>
+                  <a:schemeClr val="tx1"/>
+                </a:solidFill>
+                <a:latin typeface="+mn-lt"/>
+                <a:ea typeface="+mn-ea"/>
+                <a:cs typeface="+mn-cs"/>
+              </a:defRPr>
+            </a:lvl9pPr>
+          </a:lstStyle>
+          <a:p>
+            <a:pPr marL="0" lvl="1" indent="0">
+              <a:spcBef>
+                <a:spcPts val="1200"/>
+              </a:spcBef>
+              <a:buClrTx/>
+              <a:buFont typeface="Wingdings" panose="05000000000000000000" pitchFamily="2" charset="2"/>
+              <a:buChar char="§"/>
+            </a:pPr>
+            <a:r>
+              <a:rPr lang="en-GB" dirty="0" smtClean="0">
+                <a:latin typeface="Avenir 45 Book (Body)"/>
+              </a:rPr>
+              <a:t> No, it’s over, just kidding…</a:t>
+            </a:r>
+          </a:p>
+          <a:p>
+            <a:pPr marL="0" lvl="1" indent="0">
+              <a:spcBef>
+                <a:spcPts val="1200"/>
+              </a:spcBef>
+              <a:buClrTx/>
+              <a:buNone/>
+            </a:pPr>
+            <a:endParaRPr lang="en-GB" dirty="0">
+              <a:latin typeface="Avenir 45 Book (Body)"/>
+            </a:endParaRPr>
+          </a:p>
+          <a:p>
+            <a:pPr lvl="0" defTabSz="914363">
+              <a:lnSpc>
+                <a:spcPct val="90000"/>
+              </a:lnSpc>
+              <a:spcBef>
+                <a:spcPts val="0"/>
+              </a:spcBef>
+              <a:spcAft>
+                <a:spcPts val="400"/>
+              </a:spcAft>
+              <a:buClr>
+                <a:schemeClr val="tx1">
+                  <a:lumMod val="75000"/>
+                  <a:lumOff val="25000"/>
+                </a:schemeClr>
+              </a:buClr>
+              <a:buSzPct val="100000"/>
+              <a:buFont typeface="Wingdings" panose="05000000000000000000" pitchFamily="2" charset="2"/>
+              <a:buChar char="ä"/>
+            </a:pPr>
+            <a:endParaRPr lang="es-AR" sz="1600" b="1" dirty="0">
+              <a:solidFill>
+                <a:srgbClr val="000000"/>
+              </a:solidFill>
+              <a:latin typeface="Avenir 45 Book (Body)"/>
+              <a:cs typeface="+mn-cs"/>
+            </a:endParaRPr>
+          </a:p>
+        </p:txBody>
+      </p:sp>
+    </p:spTree>
+    <p:extLst>
+      <p:ext uri="{BB962C8B-B14F-4D97-AF65-F5344CB8AC3E}">
         <p14:creationId xmlns:p14="http://schemas.microsoft.com/office/powerpoint/2010/main" val="2265722533"/>
       </p:ext>
     </p:extLst>
@@ -29360,7 +30122,7 @@
 </p:sld>
 </file>
 
-<file path=ppt/slides/slide33.xml><?xml version="1.0" encoding="utf-8"?>
+<file path=ppt/slides/slide34.xml><?xml version="1.0" encoding="utf-8"?>
 <p:sld xmlns:a="http://schemas.openxmlformats.org/drawingml/2006/main" xmlns:r="http://schemas.openxmlformats.org/officeDocument/2006/relationships" xmlns:p="http://schemas.openxmlformats.org/presentationml/2006/main">
   <p:cSld>
     <p:spTree>

</xml_diff>

<commit_message>
Refactor Solution + PPT Part III
</commit_message>
<xml_diff>
--- a/DesigningTestableApplications - Part II - DB Integration & Legacy Code.pptx
+++ b/DesigningTestableApplications - Part II - DB Integration & Legacy Code.pptx
@@ -258,7 +258,7 @@
           <a:p>
             <a:fld id="{D63D5444-F62C-42C3-A75A-D9DBA807730F}" type="datetimeFigureOut">
               <a:rPr lang="en-US" smtClean="0"/>
-              <a:t>11/17/2015</a:t>
+              <a:t>2/16/2016</a:t>
             </a:fld>
             <a:endParaRPr lang="en-US"/>
           </a:p>
@@ -423,7 +423,7 @@
           <a:p>
             <a:fld id="{12CAA1FA-7B6A-47D2-8D61-F225D71B51FF}" type="datetimeFigureOut">
               <a:rPr lang="en-US" smtClean="0"/>
-              <a:t>11/17/2015</a:t>
+              <a:t>2/16/2016</a:t>
             </a:fld>
             <a:endParaRPr lang="en-US"/>
           </a:p>
@@ -30053,8 +30053,31 @@
               <a:rPr lang="en-GB" dirty="0" smtClean="0">
                 <a:latin typeface="Avenir 45 Book (Body)"/>
               </a:rPr>
-              <a:t> No, it’s over, just kidding…</a:t>
-            </a:r>
+              <a:t> </a:t>
+            </a:r>
+            <a:r>
+              <a:rPr lang="es-AR" dirty="0" err="1"/>
+              <a:t>Unit</a:t>
+            </a:r>
+            <a:r>
+              <a:rPr lang="es-AR" dirty="0"/>
+              <a:t> </a:t>
+            </a:r>
+            <a:r>
+              <a:rPr lang="es-AR" dirty="0" err="1"/>
+              <a:t>Testing</a:t>
+            </a:r>
+            <a:r>
+              <a:rPr lang="es-AR" dirty="0"/>
+              <a:t> JavaScript </a:t>
+            </a:r>
+            <a:r>
+              <a:rPr lang="es-AR" dirty="0" err="1"/>
+              <a:t>views</a:t>
+            </a:r>
+            <a:endParaRPr lang="en-GB" dirty="0" smtClean="0">
+              <a:latin typeface="Avenir 45 Book (Body)"/>
+            </a:endParaRPr>
           </a:p>
           <a:p>
             <a:pPr marL="0" lvl="1" indent="0">

</xml_diff>